<commit_message>
Updated the Meeting Minutes from yesterday with a complete statement & added the Git contribution figure to the presentation
</commit_message>
<xml_diff>
--- a/Assignments/Presentations/2015.06.14_Presentation.pptx
+++ b/Assignments/Presentations/2015.06.14_Presentation.pptx
@@ -5,7 +5,7 @@
     <p:sldMasterId id="2147483696" r:id="rId1"/>
   </p:sldMasterIdLst>
   <p:notesMasterIdLst>
-    <p:notesMasterId r:id="rId15"/>
+    <p:notesMasterId r:id="rId9"/>
   </p:notesMasterIdLst>
   <p:sldIdLst>
     <p:sldId id="285" r:id="rId2"/>
@@ -13,14 +13,8 @@
     <p:sldId id="301" r:id="rId4"/>
     <p:sldId id="286" r:id="rId5"/>
     <p:sldId id="303" r:id="rId6"/>
-    <p:sldId id="302" r:id="rId7"/>
-    <p:sldId id="287" r:id="rId8"/>
-    <p:sldId id="297" r:id="rId9"/>
-    <p:sldId id="291" r:id="rId10"/>
-    <p:sldId id="292" r:id="rId11"/>
-    <p:sldId id="296" r:id="rId12"/>
-    <p:sldId id="293" r:id="rId13"/>
-    <p:sldId id="295" r:id="rId14"/>
+    <p:sldId id="305" r:id="rId7"/>
+    <p:sldId id="306" r:id="rId8"/>
   </p:sldIdLst>
   <p:sldSz cx="12192000" cy="6858000"/>
   <p:notesSz cx="6858000" cy="9144000"/>
@@ -382,7 +376,9 @@
   <c:spPr>
     <a:noFill/>
     <a:ln>
-      <a:noFill/>
+      <a:solidFill>
+        <a:schemeClr val="accent4"/>
+      </a:solidFill>
     </a:ln>
     <a:effectLst/>
   </c:spPr>
@@ -3095,13 +3091,6 @@
             </a:rPr>
             <a:t> Interaction with other contributors</a:t>
           </a:r>
-          <a:endParaRPr lang="fr-FR" sz="1050" dirty="0" smtClean="0">
-            <a:solidFill>
-              <a:schemeClr val="accent3">
-                <a:lumMod val="75000"/>
-              </a:schemeClr>
-            </a:solidFill>
-          </a:endParaRPr>
         </a:p>
       </dgm:t>
     </dgm:pt>
@@ -3949,79 +3938,79 @@
     </dgm:pt>
   </dgm:ptLst>
   <dgm:cxnLst>
+    <dgm:cxn modelId="{FC395D7D-EDD8-402B-B114-D200F9A9E7E2}" srcId="{72C3D7C4-1FD3-4E91-B977-28931B3F5ABA}" destId="{A3AC2FB3-0EB1-4B08-81CB-415AD7D924BD}" srcOrd="1" destOrd="0" parTransId="{2B8D19A5-F9C2-4727-A570-45A82536B46A}" sibTransId="{0FB1D22F-A717-416D-996E-E2C5DBCE4FF3}"/>
+    <dgm:cxn modelId="{DDBBA678-AD8E-41FE-BD65-2D3C769198F2}" type="presOf" srcId="{F5EF96F3-82A8-497D-917C-BC7445CD45BC}" destId="{06BACB2E-25D6-491F-9902-6DE6A89C06CD}" srcOrd="0" destOrd="4" presId="urn:microsoft.com/office/officeart/2005/8/layout/hList6"/>
+    <dgm:cxn modelId="{64BC6DBF-E184-45F6-A5D3-6B7F1802F38D}" srcId="{498996AE-4AE4-493E-85FE-F243E011573C}" destId="{0F97B7B9-C085-4D5B-971D-A65CB4C29F66}" srcOrd="1" destOrd="0" parTransId="{CFD2C302-92B2-4A8C-83D7-F6422F15A5EF}" sibTransId="{D202FFD1-8D7C-4D98-A07D-8FBC3A34B848}"/>
+    <dgm:cxn modelId="{ED06762B-FC36-4EB7-BB42-21BF2D41A4BC}" srcId="{9DB0AEFC-F7C0-4A47-A9D2-B66B67BDF166}" destId="{0EB01263-FD3B-4AC7-BF83-D803022CDB57}" srcOrd="0" destOrd="0" parTransId="{B7ADEEA4-5653-4A7C-A171-75A7C360D0C6}" sibTransId="{EF439DA5-2B90-41D6-942D-A9D10364DF29}"/>
+    <dgm:cxn modelId="{1AEBB793-C715-4571-8F8B-F0663D661153}" srcId="{0EB01263-FD3B-4AC7-BF83-D803022CDB57}" destId="{B196A722-E82D-49E7-A43B-B2DE9174D042}" srcOrd="1" destOrd="0" parTransId="{4A52D62C-336E-4896-9BFA-2AC0BB8CCA72}" sibTransId="{6465AB99-B41B-4687-AEDE-0EC7C4DA1254}"/>
+    <dgm:cxn modelId="{0BEAD79E-FCBE-4D8F-843D-43FDFAFE730C}" type="presOf" srcId="{1EFEFBA2-B851-4A8A-BB22-00008FF41747}" destId="{06BACB2E-25D6-491F-9902-6DE6A89C06CD}" srcOrd="0" destOrd="0" presId="urn:microsoft.com/office/officeart/2005/8/layout/hList6"/>
+    <dgm:cxn modelId="{8A3BC528-2D42-4A0A-B95B-60FEB4DC7FB5}" type="presOf" srcId="{5252D8DF-F7ED-47A9-8F1F-1C3DE6A4722F}" destId="{71E9AA40-D3B4-4753-B77F-6CFE495E434F}" srcOrd="0" destOrd="0" presId="urn:microsoft.com/office/officeart/2005/8/layout/hList6"/>
+    <dgm:cxn modelId="{0DFF0C0F-D9EC-4E62-887A-D052689154E7}" type="presOf" srcId="{A7E412B7-27EE-4512-911E-68B463084553}" destId="{3DD4DCC5-CD2A-4C80-9516-43D7C916D6B5}" srcOrd="0" destOrd="5" presId="urn:microsoft.com/office/officeart/2005/8/layout/hList6"/>
+    <dgm:cxn modelId="{79C2B499-FC9E-4EF2-9AD9-3D7C89C0FC3D}" type="presOf" srcId="{CCF0FB11-FBA1-45FE-9378-D89F5B3CD54F}" destId="{06BACB2E-25D6-491F-9902-6DE6A89C06CD}" srcOrd="0" destOrd="2" presId="urn:microsoft.com/office/officeart/2005/8/layout/hList6"/>
+    <dgm:cxn modelId="{B68DA213-A0EC-4E2D-BFAD-FB4A32754442}" srcId="{27B8F497-EEFE-4724-A7DB-6F628DE3891D}" destId="{CCF0FB11-FBA1-45FE-9378-D89F5B3CD54F}" srcOrd="0" destOrd="0" parTransId="{34E0EB66-5006-4A57-B5EC-D5DAD4DCAAD8}" sibTransId="{EB9952C1-7CED-419D-AA04-CBC94BDBCAA5}"/>
+    <dgm:cxn modelId="{4B146B3D-1D4F-4979-974C-F51B971B0DB4}" srcId="{9DB0AEFC-F7C0-4A47-A9D2-B66B67BDF166}" destId="{D760DDB8-0289-40E9-9715-B6E03035CD20}" srcOrd="1" destOrd="0" parTransId="{418BFCA9-ADF9-4154-8C0E-C8BBB94EE0F5}" sibTransId="{5E203340-B9D1-4A51-8377-0DB15908F943}"/>
+    <dgm:cxn modelId="{FDDCEA24-EC7C-4D5D-8506-BA871DE2B185}" type="presOf" srcId="{498996AE-4AE4-493E-85FE-F243E011573C}" destId="{21D06AF9-7B68-4C50-825D-0A7D198CBF3A}" srcOrd="0" destOrd="1" presId="urn:microsoft.com/office/officeart/2005/8/layout/hList6"/>
+    <dgm:cxn modelId="{7084742B-C65A-457E-8399-BC407230678B}" type="presOf" srcId="{7107FF6F-355C-479F-868D-84C11CD2F69F}" destId="{21D06AF9-7B68-4C50-825D-0A7D198CBF3A}" srcOrd="0" destOrd="8" presId="urn:microsoft.com/office/officeart/2005/8/layout/hList6"/>
+    <dgm:cxn modelId="{3243A3DB-FAE9-4FA7-BE95-130B0022A262}" srcId="{27B8F497-EEFE-4724-A7DB-6F628DE3891D}" destId="{153C2728-0D46-4336-BCD5-B73E74FC5CFF}" srcOrd="4" destOrd="0" parTransId="{06BE9495-93B9-4B7D-A13A-D78EBD6A8851}" sibTransId="{D4E387F7-0C5F-4639-8537-57320B415B5C}"/>
+    <dgm:cxn modelId="{E642C729-0B74-4E15-93A9-C07E7A274090}" type="presOf" srcId="{72C3D7C4-1FD3-4E91-B977-28931B3F5ABA}" destId="{3DD4DCC5-CD2A-4C80-9516-43D7C916D6B5}" srcOrd="0" destOrd="0" presId="urn:microsoft.com/office/officeart/2005/8/layout/hList6"/>
+    <dgm:cxn modelId="{05D05F4D-A4C7-4304-B0A9-389F05CC2E11}" srcId="{72C3D7C4-1FD3-4E91-B977-28931B3F5ABA}" destId="{8060FE38-94C9-45D0-A618-12DAAC482145}" srcOrd="7" destOrd="0" parTransId="{61FAE307-BC03-4CB9-B9C3-8AF901F5CA93}" sibTransId="{7AB311FF-CFF5-416A-ADC5-23F42AE7362B}"/>
+    <dgm:cxn modelId="{628E5962-57DF-4D87-97D9-0192FBFDD090}" srcId="{2BE55610-4D28-42E0-8267-558A7085E18F}" destId="{498996AE-4AE4-493E-85FE-F243E011573C}" srcOrd="0" destOrd="0" parTransId="{083F37AC-F742-4756-9721-03926A31C2E0}" sibTransId="{48AF3B71-218F-4F8C-B4DE-6B2DE20F7BC5}"/>
+    <dgm:cxn modelId="{A409618B-F9B4-434E-8080-C1E81A8E848C}" srcId="{498996AE-4AE4-493E-85FE-F243E011573C}" destId="{00C52DB7-3417-4F6B-B717-76196F512E98}" srcOrd="2" destOrd="0" parTransId="{B019318C-8DCB-4417-8172-D25D40A6AB63}" sibTransId="{8D8F9D44-A46A-48DA-A7A5-5460AA7C4ADB}"/>
+    <dgm:cxn modelId="{4800A4EE-6F16-46D8-84D1-83B908998DA3}" srcId="{72C3D7C4-1FD3-4E91-B977-28931B3F5ABA}" destId="{6C89E8F9-F492-45E6-8918-60E8E347286B}" srcOrd="5" destOrd="0" parTransId="{D3A19BD5-5EF9-4F4A-A53B-A482174EDFCA}" sibTransId="{46BCADFF-F8C3-4EBF-8866-723D1B07C2AA}"/>
+    <dgm:cxn modelId="{6017BAA6-EA3D-47F1-A724-6EBF2C0CEED8}" type="presOf" srcId="{C4398932-60E9-428B-BB59-BB2FDF42C249}" destId="{F1E2BDB2-0BA9-4FD2-86F9-2CAEA5A63A20}" srcOrd="0" destOrd="6" presId="urn:microsoft.com/office/officeart/2005/8/layout/hList6"/>
+    <dgm:cxn modelId="{8163B6AE-2C6D-448B-950A-BFE70C74FC7C}" type="presOf" srcId="{5E6EC759-EDF1-444D-A55D-A9E18EFE3F70}" destId="{21D06AF9-7B68-4C50-825D-0A7D198CBF3A}" srcOrd="0" destOrd="2" presId="urn:microsoft.com/office/officeart/2005/8/layout/hList6"/>
+    <dgm:cxn modelId="{637D461F-FCB7-49FF-88C2-641C42C908C4}" srcId="{27B8F497-EEFE-4724-A7DB-6F628DE3891D}" destId="{F5EF96F3-82A8-497D-917C-BC7445CD45BC}" srcOrd="2" destOrd="0" parTransId="{D33605C6-6F05-4E2A-B706-3342807760A1}" sibTransId="{36FB1E9D-C9C2-40C1-A606-44D4C7A462E5}"/>
+    <dgm:cxn modelId="{AE803186-1124-46E1-8F1A-37AB7FE2A10B}" srcId="{1EFEFBA2-B851-4A8A-BB22-00008FF41747}" destId="{27B8F497-EEFE-4724-A7DB-6F628DE3891D}" srcOrd="0" destOrd="0" parTransId="{326F6861-A2B9-4697-8835-2FE6175350B9}" sibTransId="{CBB21267-DEF5-4514-82CE-4C0594486F84}"/>
+    <dgm:cxn modelId="{383F837F-9DCE-4D5D-B5F0-67D53EEA6EDB}" srcId="{5252D8DF-F7ED-47A9-8F1F-1C3DE6A4722F}" destId="{72C3D7C4-1FD3-4E91-B977-28931B3F5ABA}" srcOrd="0" destOrd="0" parTransId="{C7E336E9-2747-4995-A749-2C4A0C296DB1}" sibTransId="{C47984D0-4B72-491D-8DA1-F5AEAAF743E6}"/>
+    <dgm:cxn modelId="{009C5720-69F2-4568-A764-B25366A409CF}" type="presOf" srcId="{00C52DB7-3417-4F6B-B717-76196F512E98}" destId="{21D06AF9-7B68-4C50-825D-0A7D198CBF3A}" srcOrd="0" destOrd="4" presId="urn:microsoft.com/office/officeart/2005/8/layout/hList6"/>
+    <dgm:cxn modelId="{37BFBA5A-B457-486E-BF6A-F3C1A42C9351}" srcId="{498996AE-4AE4-493E-85FE-F243E011573C}" destId="{66B0C640-CB58-484B-A666-981FE46A3EAA}" srcOrd="3" destOrd="0" parTransId="{FA016A62-5D47-475B-AD26-75E551EC4E2A}" sibTransId="{A0B68A0B-723F-45B4-AB16-3FE329370EF8}"/>
+    <dgm:cxn modelId="{889E55EE-FE36-468A-8DBC-BD802B8B4A24}" type="presOf" srcId="{D760DDB8-0289-40E9-9715-B6E03035CD20}" destId="{F1E2BDB2-0BA9-4FD2-86F9-2CAEA5A63A20}" srcOrd="0" destOrd="4" presId="urn:microsoft.com/office/officeart/2005/8/layout/hList6"/>
+    <dgm:cxn modelId="{F3A2B4D6-BB4E-42BA-B583-A65FB9B18334}" srcId="{2BE55610-4D28-42E0-8267-558A7085E18F}" destId="{7107FF6F-355C-479F-868D-84C11CD2F69F}" srcOrd="1" destOrd="0" parTransId="{7A65574C-3B6E-4B7B-B4F2-48654D15DA37}" sibTransId="{B5AFDB0E-9BE2-4139-B603-4FE23277675B}"/>
+    <dgm:cxn modelId="{5681C565-D35A-4FEA-A0B2-C51EC399EE0C}" srcId="{5252D8DF-F7ED-47A9-8F1F-1C3DE6A4722F}" destId="{9DB0AEFC-F7C0-4A47-A9D2-B66B67BDF166}" srcOrd="3" destOrd="0" parTransId="{A4CF8F00-895D-40E4-8450-D92BA3CAA82B}" sibTransId="{89C62A47-94B4-428D-B017-3F9FAE42CBB2}"/>
+    <dgm:cxn modelId="{DC737BB5-46A0-4833-9E70-387B8B74F8DE}" type="presOf" srcId="{153C2728-0D46-4336-BCD5-B73E74FC5CFF}" destId="{06BACB2E-25D6-491F-9902-6DE6A89C06CD}" srcOrd="0" destOrd="6" presId="urn:microsoft.com/office/officeart/2005/8/layout/hList6"/>
+    <dgm:cxn modelId="{6F7C1151-AB38-40FB-821A-629BFB12E557}" type="presOf" srcId="{646CE12A-CECA-48AC-A6F0-D8C0AF1C344D}" destId="{06BACB2E-25D6-491F-9902-6DE6A89C06CD}" srcOrd="0" destOrd="3" presId="urn:microsoft.com/office/officeart/2005/8/layout/hList6"/>
+    <dgm:cxn modelId="{2B85F91F-55BD-4B02-AA08-C0B65713F31F}" srcId="{1EFEFBA2-B851-4A8A-BB22-00008FF41747}" destId="{BCC200FD-3EDA-402F-9FA0-E859602A5A1D}" srcOrd="1" destOrd="0" parTransId="{875838BA-E0E0-438A-85B2-AC0EA2C1DB02}" sibTransId="{B448DEC5-1698-4538-8792-F53B01B2F969}"/>
+    <dgm:cxn modelId="{1D920CBD-5AC4-49BE-9836-7DE50700D2E7}" type="presOf" srcId="{0EB01263-FD3B-4AC7-BF83-D803022CDB57}" destId="{F1E2BDB2-0BA9-4FD2-86F9-2CAEA5A63A20}" srcOrd="0" destOrd="1" presId="urn:microsoft.com/office/officeart/2005/8/layout/hList6"/>
+    <dgm:cxn modelId="{CA22A8C7-43EA-4A0A-8376-1678CD2C8F5F}" srcId="{27B8F497-EEFE-4724-A7DB-6F628DE3891D}" destId="{884C298F-B263-464A-B100-EA57B8F7D880}" srcOrd="3" destOrd="0" parTransId="{ABA02B3A-F5EF-425E-8A8E-D2E5E59C10D6}" sibTransId="{4EA44750-611F-47B6-A612-4262179F900F}"/>
+    <dgm:cxn modelId="{1D5FBDE2-344C-40F2-AD28-A0A693BD1E6C}" srcId="{27B8F497-EEFE-4724-A7DB-6F628DE3891D}" destId="{646CE12A-CECA-48AC-A6F0-D8C0AF1C344D}" srcOrd="1" destOrd="0" parTransId="{4B24C949-5D2C-4001-9511-74A535573CF9}" sibTransId="{34E80F1F-E87B-4A1F-AD19-F99AC153B487}"/>
+    <dgm:cxn modelId="{7F46FBAF-3A70-4E9E-AEF2-7D7DCE3ABAA5}" type="presOf" srcId="{B196A722-E82D-49E7-A43B-B2DE9174D042}" destId="{F1E2BDB2-0BA9-4FD2-86F9-2CAEA5A63A20}" srcOrd="0" destOrd="3" presId="urn:microsoft.com/office/officeart/2005/8/layout/hList6"/>
+    <dgm:cxn modelId="{2D90F8A9-3573-4108-A716-0C9B3D5AFBF1}" type="presOf" srcId="{A500FA09-F245-42CB-B0DE-04ADA5451810}" destId="{21D06AF9-7B68-4C50-825D-0A7D198CBF3A}" srcOrd="0" destOrd="9" presId="urn:microsoft.com/office/officeart/2005/8/layout/hList6"/>
+    <dgm:cxn modelId="{59B9FC00-6C5A-43E4-86F4-8523DE87FB65}" type="presOf" srcId="{46960BC8-27AA-45F8-AEEF-22352CF1450C}" destId="{06BACB2E-25D6-491F-9902-6DE6A89C06CD}" srcOrd="0" destOrd="8" presId="urn:microsoft.com/office/officeart/2005/8/layout/hList6"/>
+    <dgm:cxn modelId="{E389C86B-CE2C-40D6-8881-6563E6CB36FC}" type="presOf" srcId="{F5D42B0E-A74A-4B70-A5D1-5044D8743CE2}" destId="{F1E2BDB2-0BA9-4FD2-86F9-2CAEA5A63A20}" srcOrd="0" destOrd="2" presId="urn:microsoft.com/office/officeart/2005/8/layout/hList6"/>
+    <dgm:cxn modelId="{760045C8-BE67-45A2-B186-1DA090D0BC85}" type="presOf" srcId="{BCC200FD-3EDA-402F-9FA0-E859602A5A1D}" destId="{06BACB2E-25D6-491F-9902-6DE6A89C06CD}" srcOrd="0" destOrd="7" presId="urn:microsoft.com/office/officeart/2005/8/layout/hList6"/>
+    <dgm:cxn modelId="{4B9EEC82-B3C0-456B-B515-86C02DE74C6D}" type="presOf" srcId="{A3AC2FB3-0EB1-4B08-81CB-415AD7D924BD}" destId="{3DD4DCC5-CD2A-4C80-9516-43D7C916D6B5}" srcOrd="0" destOrd="2" presId="urn:microsoft.com/office/officeart/2005/8/layout/hList6"/>
+    <dgm:cxn modelId="{B7A0A54C-838F-4B77-95CA-A112C7778DD1}" type="presOf" srcId="{6C89E8F9-F492-45E6-8918-60E8E347286B}" destId="{3DD4DCC5-CD2A-4C80-9516-43D7C916D6B5}" srcOrd="0" destOrd="6" presId="urn:microsoft.com/office/officeart/2005/8/layout/hList6"/>
+    <dgm:cxn modelId="{35AE9547-F862-45D3-BE5A-E6241C543C34}" srcId="{5252D8DF-F7ED-47A9-8F1F-1C3DE6A4722F}" destId="{1EFEFBA2-B851-4A8A-BB22-00008FF41747}" srcOrd="1" destOrd="0" parTransId="{5237344E-3C45-4CD5-8679-16503A91AA7C}" sibTransId="{E95B4B51-66E9-4F52-9C30-23146904BC20}"/>
+    <dgm:cxn modelId="{D86379E3-BFCB-450D-A779-5A8F6DF98537}" type="presOf" srcId="{F2F81127-8604-4ECD-9F9E-207835E79493}" destId="{3DD4DCC5-CD2A-4C80-9516-43D7C916D6B5}" srcOrd="0" destOrd="4" presId="urn:microsoft.com/office/officeart/2005/8/layout/hList6"/>
+    <dgm:cxn modelId="{0DE55D2D-33B4-4963-9CA5-925682AFA090}" srcId="{72C3D7C4-1FD3-4E91-B977-28931B3F5ABA}" destId="{501AD31A-A917-4AA9-BB27-AC42F939E6C7}" srcOrd="2" destOrd="0" parTransId="{6FA99C3A-F407-417F-83DE-0391C15E10E9}" sibTransId="{7CF3A3B9-782C-4075-B06F-2F935C3C2DE2}"/>
+    <dgm:cxn modelId="{55566EB4-584D-46AE-9E54-F668131D18F5}" type="presOf" srcId="{3134A35E-5F85-4AA0-82AC-DC8AF808B10B}" destId="{3DD4DCC5-CD2A-4C80-9516-43D7C916D6B5}" srcOrd="0" destOrd="9" presId="urn:microsoft.com/office/officeart/2005/8/layout/hList6"/>
+    <dgm:cxn modelId="{F6FA470A-E621-47ED-9878-4D70D29B0033}" type="presOf" srcId="{27B8F497-EEFE-4724-A7DB-6F628DE3891D}" destId="{06BACB2E-25D6-491F-9902-6DE6A89C06CD}" srcOrd="0" destOrd="1" presId="urn:microsoft.com/office/officeart/2005/8/layout/hList6"/>
+    <dgm:cxn modelId="{C856C6C7-A09A-4BA5-8A8D-BD383C92DD2A}" srcId="{498996AE-4AE4-493E-85FE-F243E011573C}" destId="{65820A23-5088-47CA-BA30-3E010FED1EA7}" srcOrd="5" destOrd="0" parTransId="{0DA9102F-0E40-4EC0-87BC-0EF6CF238FC0}" sibTransId="{00602E1F-F497-452C-86E2-CED535679DDC}"/>
+    <dgm:cxn modelId="{FC8B8949-7253-4FB4-9BAB-AB2204650A4A}" type="presOf" srcId="{8060FE38-94C9-45D0-A618-12DAAC482145}" destId="{3DD4DCC5-CD2A-4C80-9516-43D7C916D6B5}" srcOrd="0" destOrd="8" presId="urn:microsoft.com/office/officeart/2005/8/layout/hList6"/>
     <dgm:cxn modelId="{6648831F-7A32-468B-8243-3135752783F3}" type="presOf" srcId="{7A1C1FF7-6355-49B1-87E0-60DAEACD27AD}" destId="{F1E2BDB2-0BA9-4FD2-86F9-2CAEA5A63A20}" srcOrd="0" destOrd="5" presId="urn:microsoft.com/office/officeart/2005/8/layout/hList6"/>
-    <dgm:cxn modelId="{6017BAA6-EA3D-47F1-A724-6EBF2C0CEED8}" type="presOf" srcId="{C4398932-60E9-428B-BB59-BB2FDF42C249}" destId="{F1E2BDB2-0BA9-4FD2-86F9-2CAEA5A63A20}" srcOrd="0" destOrd="6" presId="urn:microsoft.com/office/officeart/2005/8/layout/hList6"/>
-    <dgm:cxn modelId="{CA22A8C7-43EA-4A0A-8376-1678CD2C8F5F}" srcId="{27B8F497-EEFE-4724-A7DB-6F628DE3891D}" destId="{884C298F-B263-464A-B100-EA57B8F7D880}" srcOrd="3" destOrd="0" parTransId="{ABA02B3A-F5EF-425E-8A8E-D2E5E59C10D6}" sibTransId="{4EA44750-611F-47B6-A612-4262179F900F}"/>
+    <dgm:cxn modelId="{D4D17999-A1DE-45DF-88D3-6DC17F9EFCE5}" srcId="{498996AE-4AE4-493E-85FE-F243E011573C}" destId="{DCAA0985-226B-4387-B730-F449DFD3C2E3}" srcOrd="4" destOrd="0" parTransId="{823A40A3-55FB-4600-ADD5-DBD0C2AEC55C}" sibTransId="{88A1FB42-90BC-454F-97CA-1ACC5136176B}"/>
+    <dgm:cxn modelId="{5AB5BC65-6AFB-4EEA-A208-DF1AE0DADD1C}" type="presOf" srcId="{66B0C640-CB58-484B-A666-981FE46A3EAA}" destId="{21D06AF9-7B68-4C50-825D-0A7D198CBF3A}" srcOrd="0" destOrd="5" presId="urn:microsoft.com/office/officeart/2005/8/layout/hList6"/>
+    <dgm:cxn modelId="{09500580-C35A-4C3C-8080-5BEF0AB7E5C4}" type="presOf" srcId="{65820A23-5088-47CA-BA30-3E010FED1EA7}" destId="{21D06AF9-7B68-4C50-825D-0A7D198CBF3A}" srcOrd="0" destOrd="7" presId="urn:microsoft.com/office/officeart/2005/8/layout/hList6"/>
+    <dgm:cxn modelId="{17706F1F-9A48-4FB3-AFC9-7F173426B60D}" srcId="{72C3D7C4-1FD3-4E91-B977-28931B3F5ABA}" destId="{A7E412B7-27EE-4512-911E-68B463084553}" srcOrd="4" destOrd="0" parTransId="{10DE53D3-699E-4FAB-93E6-2D4B0644106C}" sibTransId="{0A18CE13-150F-44E7-9CBF-4C503416DB9C}"/>
+    <dgm:cxn modelId="{03CE11BA-8B87-4DDC-BB40-C3AC1B5AF75B}" type="presOf" srcId="{3C62CD8E-8D76-477F-9DB6-910BDF743BA0}" destId="{3DD4DCC5-CD2A-4C80-9516-43D7C916D6B5}" srcOrd="0" destOrd="1" presId="urn:microsoft.com/office/officeart/2005/8/layout/hList6"/>
+    <dgm:cxn modelId="{547B59A2-9048-495E-9898-70ECA9498859}" type="presOf" srcId="{2BE55610-4D28-42E0-8267-558A7085E18F}" destId="{21D06AF9-7B68-4C50-825D-0A7D198CBF3A}" srcOrd="0" destOrd="0" presId="urn:microsoft.com/office/officeart/2005/8/layout/hList6"/>
+    <dgm:cxn modelId="{42F76715-AFEB-4F17-93DB-8ADEB8228C3E}" srcId="{9DB0AEFC-F7C0-4A47-A9D2-B66B67BDF166}" destId="{C4398932-60E9-428B-BB59-BB2FDF42C249}" srcOrd="3" destOrd="0" parTransId="{3D0B83B2-1075-4391-96AD-404B4EC50D02}" sibTransId="{413CF9B1-273D-4A5D-A540-DEA45D415D55}"/>
+    <dgm:cxn modelId="{DE556CC3-DF24-4E13-A34B-765D89621F82}" srcId="{5252D8DF-F7ED-47A9-8F1F-1C3DE6A4722F}" destId="{2BE55610-4D28-42E0-8267-558A7085E18F}" srcOrd="2" destOrd="0" parTransId="{0412D34D-808E-40C7-8F02-8DB8FF4954D5}" sibTransId="{6F471C58-641B-49B6-9FAA-ED99D26EF7F1}"/>
+    <dgm:cxn modelId="{2D15631C-8040-45D9-ADE8-6CC3B32092BC}" srcId="{72C3D7C4-1FD3-4E91-B977-28931B3F5ABA}" destId="{BFA6EAEA-D702-4114-802D-1D05CB97BDA4}" srcOrd="6" destOrd="0" parTransId="{A6625999-54BE-479A-9837-A4952987CE4D}" sibTransId="{96E32F97-D294-4F13-A842-48D9E400D2DE}"/>
+    <dgm:cxn modelId="{6955C85A-D5BB-44F7-9537-5C04E372D714}" srcId="{9DB0AEFC-F7C0-4A47-A9D2-B66B67BDF166}" destId="{7A1C1FF7-6355-49B1-87E0-60DAEACD27AD}" srcOrd="2" destOrd="0" parTransId="{9B50F22F-7C27-4615-A141-2BE7584B5239}" sibTransId="{E42DFC01-96EA-412A-A668-EAA80CFE8962}"/>
+    <dgm:cxn modelId="{C9D6D3FC-57F6-411A-B743-6C974C49B44D}" type="presOf" srcId="{0F97B7B9-C085-4D5B-971D-A65CB4C29F66}" destId="{21D06AF9-7B68-4C50-825D-0A7D198CBF3A}" srcOrd="0" destOrd="3" presId="urn:microsoft.com/office/officeart/2005/8/layout/hList6"/>
+    <dgm:cxn modelId="{62F1CC26-A54F-4355-8CF1-9538ADE97A0A}" type="presOf" srcId="{501AD31A-A917-4AA9-BB27-AC42F939E6C7}" destId="{3DD4DCC5-CD2A-4C80-9516-43D7C916D6B5}" srcOrd="0" destOrd="3" presId="urn:microsoft.com/office/officeart/2005/8/layout/hList6"/>
+    <dgm:cxn modelId="{E9865A40-51BA-42A8-8ED1-FC7226692B6E}" type="presOf" srcId="{884C298F-B263-464A-B100-EA57B8F7D880}" destId="{06BACB2E-25D6-491F-9902-6DE6A89C06CD}" srcOrd="0" destOrd="5" presId="urn:microsoft.com/office/officeart/2005/8/layout/hList6"/>
     <dgm:cxn modelId="{340637D5-1948-4365-8839-9CE07222EBA5}" srcId="{498996AE-4AE4-493E-85FE-F243E011573C}" destId="{5E6EC759-EDF1-444D-A55D-A9E18EFE3F70}" srcOrd="0" destOrd="0" parTransId="{F19CC7AA-3C5B-4D8E-8479-B3D326318C7E}" sibTransId="{5E72C6B2-3576-469F-95BF-CB19BB54CC5B}"/>
-    <dgm:cxn modelId="{E642C729-0B74-4E15-93A9-C07E7A274090}" type="presOf" srcId="{72C3D7C4-1FD3-4E91-B977-28931B3F5ABA}" destId="{3DD4DCC5-CD2A-4C80-9516-43D7C916D6B5}" srcOrd="0" destOrd="0" presId="urn:microsoft.com/office/officeart/2005/8/layout/hList6"/>
-    <dgm:cxn modelId="{D4D17999-A1DE-45DF-88D3-6DC17F9EFCE5}" srcId="{498996AE-4AE4-493E-85FE-F243E011573C}" destId="{DCAA0985-226B-4387-B730-F449DFD3C2E3}" srcOrd="4" destOrd="0" parTransId="{823A40A3-55FB-4600-ADD5-DBD0C2AEC55C}" sibTransId="{88A1FB42-90BC-454F-97CA-1ACC5136176B}"/>
-    <dgm:cxn modelId="{2B85F91F-55BD-4B02-AA08-C0B65713F31F}" srcId="{1EFEFBA2-B851-4A8A-BB22-00008FF41747}" destId="{BCC200FD-3EDA-402F-9FA0-E859602A5A1D}" srcOrd="1" destOrd="0" parTransId="{875838BA-E0E0-438A-85B2-AC0EA2C1DB02}" sibTransId="{B448DEC5-1698-4538-8792-F53B01B2F969}"/>
-    <dgm:cxn modelId="{1AEBB793-C715-4571-8F8B-F0663D661153}" srcId="{0EB01263-FD3B-4AC7-BF83-D803022CDB57}" destId="{B196A722-E82D-49E7-A43B-B2DE9174D042}" srcOrd="1" destOrd="0" parTransId="{4A52D62C-336E-4896-9BFA-2AC0BB8CCA72}" sibTransId="{6465AB99-B41B-4687-AEDE-0EC7C4DA1254}"/>
-    <dgm:cxn modelId="{760045C8-BE67-45A2-B186-1DA090D0BC85}" type="presOf" srcId="{BCC200FD-3EDA-402F-9FA0-E859602A5A1D}" destId="{06BACB2E-25D6-491F-9902-6DE6A89C06CD}" srcOrd="0" destOrd="7" presId="urn:microsoft.com/office/officeart/2005/8/layout/hList6"/>
-    <dgm:cxn modelId="{1D920CBD-5AC4-49BE-9836-7DE50700D2E7}" type="presOf" srcId="{0EB01263-FD3B-4AC7-BF83-D803022CDB57}" destId="{F1E2BDB2-0BA9-4FD2-86F9-2CAEA5A63A20}" srcOrd="0" destOrd="1" presId="urn:microsoft.com/office/officeart/2005/8/layout/hList6"/>
-    <dgm:cxn modelId="{FC395D7D-EDD8-402B-B114-D200F9A9E7E2}" srcId="{72C3D7C4-1FD3-4E91-B977-28931B3F5ABA}" destId="{A3AC2FB3-0EB1-4B08-81CB-415AD7D924BD}" srcOrd="1" destOrd="0" parTransId="{2B8D19A5-F9C2-4727-A570-45A82536B46A}" sibTransId="{0FB1D22F-A717-416D-996E-E2C5DBCE4FF3}"/>
-    <dgm:cxn modelId="{37BFBA5A-B457-486E-BF6A-F3C1A42C9351}" srcId="{498996AE-4AE4-493E-85FE-F243E011573C}" destId="{66B0C640-CB58-484B-A666-981FE46A3EAA}" srcOrd="3" destOrd="0" parTransId="{FA016A62-5D47-475B-AD26-75E551EC4E2A}" sibTransId="{A0B68A0B-723F-45B4-AB16-3FE329370EF8}"/>
-    <dgm:cxn modelId="{5AB5BC65-6AFB-4EEA-A208-DF1AE0DADD1C}" type="presOf" srcId="{66B0C640-CB58-484B-A666-981FE46A3EAA}" destId="{21D06AF9-7B68-4C50-825D-0A7D198CBF3A}" srcOrd="0" destOrd="5" presId="urn:microsoft.com/office/officeart/2005/8/layout/hList6"/>
-    <dgm:cxn modelId="{6955C85A-D5BB-44F7-9537-5C04E372D714}" srcId="{9DB0AEFC-F7C0-4A47-A9D2-B66B67BDF166}" destId="{7A1C1FF7-6355-49B1-87E0-60DAEACD27AD}" srcOrd="2" destOrd="0" parTransId="{9B50F22F-7C27-4615-A141-2BE7584B5239}" sibTransId="{E42DFC01-96EA-412A-A668-EAA80CFE8962}"/>
-    <dgm:cxn modelId="{0DFF0C0F-D9EC-4E62-887A-D052689154E7}" type="presOf" srcId="{A7E412B7-27EE-4512-911E-68B463084553}" destId="{3DD4DCC5-CD2A-4C80-9516-43D7C916D6B5}" srcOrd="0" destOrd="5" presId="urn:microsoft.com/office/officeart/2005/8/layout/hList6"/>
-    <dgm:cxn modelId="{09500580-C35A-4C3C-8080-5BEF0AB7E5C4}" type="presOf" srcId="{65820A23-5088-47CA-BA30-3E010FED1EA7}" destId="{21D06AF9-7B68-4C50-825D-0A7D198CBF3A}" srcOrd="0" destOrd="7" presId="urn:microsoft.com/office/officeart/2005/8/layout/hList6"/>
-    <dgm:cxn modelId="{55566EB4-584D-46AE-9E54-F668131D18F5}" type="presOf" srcId="{3134A35E-5F85-4AA0-82AC-DC8AF808B10B}" destId="{3DD4DCC5-CD2A-4C80-9516-43D7C916D6B5}" srcOrd="0" destOrd="9" presId="urn:microsoft.com/office/officeart/2005/8/layout/hList6"/>
-    <dgm:cxn modelId="{A409618B-F9B4-434E-8080-C1E81A8E848C}" srcId="{498996AE-4AE4-493E-85FE-F243E011573C}" destId="{00C52DB7-3417-4F6B-B717-76196F512E98}" srcOrd="2" destOrd="0" parTransId="{B019318C-8DCB-4417-8172-D25D40A6AB63}" sibTransId="{8D8F9D44-A46A-48DA-A7A5-5460AA7C4ADB}"/>
-    <dgm:cxn modelId="{2D15631C-8040-45D9-ADE8-6CC3B32092BC}" srcId="{72C3D7C4-1FD3-4E91-B977-28931B3F5ABA}" destId="{BFA6EAEA-D702-4114-802D-1D05CB97BDA4}" srcOrd="6" destOrd="0" parTransId="{A6625999-54BE-479A-9837-A4952987CE4D}" sibTransId="{96E32F97-D294-4F13-A842-48D9E400D2DE}"/>
-    <dgm:cxn modelId="{62F1CC26-A54F-4355-8CF1-9538ADE97A0A}" type="presOf" srcId="{501AD31A-A917-4AA9-BB27-AC42F939E6C7}" destId="{3DD4DCC5-CD2A-4C80-9516-43D7C916D6B5}" srcOrd="0" destOrd="3" presId="urn:microsoft.com/office/officeart/2005/8/layout/hList6"/>
-    <dgm:cxn modelId="{ED06762B-FC36-4EB7-BB42-21BF2D41A4BC}" srcId="{9DB0AEFC-F7C0-4A47-A9D2-B66B67BDF166}" destId="{0EB01263-FD3B-4AC7-BF83-D803022CDB57}" srcOrd="0" destOrd="0" parTransId="{B7ADEEA4-5653-4A7C-A171-75A7C360D0C6}" sibTransId="{EF439DA5-2B90-41D6-942D-A9D10364DF29}"/>
+    <dgm:cxn modelId="{8019387C-88C3-4DCF-810D-DE8619DEB540}" srcId="{72C3D7C4-1FD3-4E91-B977-28931B3F5ABA}" destId="{3C62CD8E-8D76-477F-9DB6-910BDF743BA0}" srcOrd="0" destOrd="0" parTransId="{ACB6940E-F7AB-4B27-A4AF-138986DD3A81}" sibTransId="{15123142-6E4E-45E4-807A-07C399AF1AF7}"/>
+    <dgm:cxn modelId="{487D58D9-3B31-4424-9840-F9C066D7CF4E}" srcId="{1EFEFBA2-B851-4A8A-BB22-00008FF41747}" destId="{46960BC8-27AA-45F8-AEEF-22352CF1450C}" srcOrd="2" destOrd="0" parTransId="{CDFC704C-CE99-4629-BDE1-B0283A7800AE}" sibTransId="{EBBA58DB-C3E1-4881-9269-F2C8513B005E}"/>
+    <dgm:cxn modelId="{C69C6571-5DCB-489E-BA78-B97A4F67D892}" type="presOf" srcId="{DCAA0985-226B-4387-B730-F449DFD3C2E3}" destId="{21D06AF9-7B68-4C50-825D-0A7D198CBF3A}" srcOrd="0" destOrd="6" presId="urn:microsoft.com/office/officeart/2005/8/layout/hList6"/>
+    <dgm:cxn modelId="{4D8E0CA6-ADA0-4773-A89A-E9F7C1E688F9}" srcId="{0EB01263-FD3B-4AC7-BF83-D803022CDB57}" destId="{F5D42B0E-A74A-4B70-A5D1-5044D8743CE2}" srcOrd="0" destOrd="0" parTransId="{7A6CE080-2E23-488F-B819-CE4A3AF04735}" sibTransId="{D55899BE-9D08-4A57-AE57-4825F1B359F3}"/>
+    <dgm:cxn modelId="{0F0AF83D-F9E7-40C1-B4B7-F7B2DDCA42D9}" srcId="{2BE55610-4D28-42E0-8267-558A7085E18F}" destId="{A500FA09-F245-42CB-B0DE-04ADA5451810}" srcOrd="2" destOrd="0" parTransId="{603B18AA-B746-4BE6-8BEA-FD31384938C6}" sibTransId="{AAC1C1C9-4CEC-49A8-AF46-36E16998BC0D}"/>
     <dgm:cxn modelId="{B5F2A0E4-3E0E-4D85-B283-6E56FCA57801}" type="presOf" srcId="{9DB0AEFC-F7C0-4A47-A9D2-B66B67BDF166}" destId="{F1E2BDB2-0BA9-4FD2-86F9-2CAEA5A63A20}" srcOrd="0" destOrd="0" presId="urn:microsoft.com/office/officeart/2005/8/layout/hList6"/>
-    <dgm:cxn modelId="{DDBBA678-AD8E-41FE-BD65-2D3C769198F2}" type="presOf" srcId="{F5EF96F3-82A8-497D-917C-BC7445CD45BC}" destId="{06BACB2E-25D6-491F-9902-6DE6A89C06CD}" srcOrd="0" destOrd="4" presId="urn:microsoft.com/office/officeart/2005/8/layout/hList6"/>
-    <dgm:cxn modelId="{5681C565-D35A-4FEA-A0B2-C51EC399EE0C}" srcId="{5252D8DF-F7ED-47A9-8F1F-1C3DE6A4722F}" destId="{9DB0AEFC-F7C0-4A47-A9D2-B66B67BDF166}" srcOrd="3" destOrd="0" parTransId="{A4CF8F00-895D-40E4-8450-D92BA3CAA82B}" sibTransId="{89C62A47-94B4-428D-B017-3F9FAE42CBB2}"/>
-    <dgm:cxn modelId="{7084742B-C65A-457E-8399-BC407230678B}" type="presOf" srcId="{7107FF6F-355C-479F-868D-84C11CD2F69F}" destId="{21D06AF9-7B68-4C50-825D-0A7D198CBF3A}" srcOrd="0" destOrd="8" presId="urn:microsoft.com/office/officeart/2005/8/layout/hList6"/>
-    <dgm:cxn modelId="{59B9FC00-6C5A-43E4-86F4-8523DE87FB65}" type="presOf" srcId="{46960BC8-27AA-45F8-AEEF-22352CF1450C}" destId="{06BACB2E-25D6-491F-9902-6DE6A89C06CD}" srcOrd="0" destOrd="8" presId="urn:microsoft.com/office/officeart/2005/8/layout/hList6"/>
-    <dgm:cxn modelId="{03CE11BA-8B87-4DDC-BB40-C3AC1B5AF75B}" type="presOf" srcId="{3C62CD8E-8D76-477F-9DB6-910BDF743BA0}" destId="{3DD4DCC5-CD2A-4C80-9516-43D7C916D6B5}" srcOrd="0" destOrd="1" presId="urn:microsoft.com/office/officeart/2005/8/layout/hList6"/>
-    <dgm:cxn modelId="{D86379E3-BFCB-450D-A779-5A8F6DF98537}" type="presOf" srcId="{F2F81127-8604-4ECD-9F9E-207835E79493}" destId="{3DD4DCC5-CD2A-4C80-9516-43D7C916D6B5}" srcOrd="0" destOrd="4" presId="urn:microsoft.com/office/officeart/2005/8/layout/hList6"/>
-    <dgm:cxn modelId="{4B9EEC82-B3C0-456B-B515-86C02DE74C6D}" type="presOf" srcId="{A3AC2FB3-0EB1-4B08-81CB-415AD7D924BD}" destId="{3DD4DCC5-CD2A-4C80-9516-43D7C916D6B5}" srcOrd="0" destOrd="2" presId="urn:microsoft.com/office/officeart/2005/8/layout/hList6"/>
-    <dgm:cxn modelId="{64BC6DBF-E184-45F6-A5D3-6B7F1802F38D}" srcId="{498996AE-4AE4-493E-85FE-F243E011573C}" destId="{0F97B7B9-C085-4D5B-971D-A65CB4C29F66}" srcOrd="1" destOrd="0" parTransId="{CFD2C302-92B2-4A8C-83D7-F6422F15A5EF}" sibTransId="{D202FFD1-8D7C-4D98-A07D-8FBC3A34B848}"/>
-    <dgm:cxn modelId="{8163B6AE-2C6D-448B-950A-BFE70C74FC7C}" type="presOf" srcId="{5E6EC759-EDF1-444D-A55D-A9E18EFE3F70}" destId="{21D06AF9-7B68-4C50-825D-0A7D198CBF3A}" srcOrd="0" destOrd="2" presId="urn:microsoft.com/office/officeart/2005/8/layout/hList6"/>
-    <dgm:cxn modelId="{4B146B3D-1D4F-4979-974C-F51B971B0DB4}" srcId="{9DB0AEFC-F7C0-4A47-A9D2-B66B67BDF166}" destId="{D760DDB8-0289-40E9-9715-B6E03035CD20}" srcOrd="1" destOrd="0" parTransId="{418BFCA9-ADF9-4154-8C0E-C8BBB94EE0F5}" sibTransId="{5E203340-B9D1-4A51-8377-0DB15908F943}"/>
-    <dgm:cxn modelId="{637D461F-FCB7-49FF-88C2-641C42C908C4}" srcId="{27B8F497-EEFE-4724-A7DB-6F628DE3891D}" destId="{F5EF96F3-82A8-497D-917C-BC7445CD45BC}" srcOrd="2" destOrd="0" parTransId="{D33605C6-6F05-4E2A-B706-3342807760A1}" sibTransId="{36FB1E9D-C9C2-40C1-A606-44D4C7A462E5}"/>
-    <dgm:cxn modelId="{7F46FBAF-3A70-4E9E-AEF2-7D7DCE3ABAA5}" type="presOf" srcId="{B196A722-E82D-49E7-A43B-B2DE9174D042}" destId="{F1E2BDB2-0BA9-4FD2-86F9-2CAEA5A63A20}" srcOrd="0" destOrd="3" presId="urn:microsoft.com/office/officeart/2005/8/layout/hList6"/>
-    <dgm:cxn modelId="{009C5720-69F2-4568-A764-B25366A409CF}" type="presOf" srcId="{00C52DB7-3417-4F6B-B717-76196F512E98}" destId="{21D06AF9-7B68-4C50-825D-0A7D198CBF3A}" srcOrd="0" destOrd="4" presId="urn:microsoft.com/office/officeart/2005/8/layout/hList6"/>
-    <dgm:cxn modelId="{3243A3DB-FAE9-4FA7-BE95-130B0022A262}" srcId="{27B8F497-EEFE-4724-A7DB-6F628DE3891D}" destId="{153C2728-0D46-4336-BCD5-B73E74FC5CFF}" srcOrd="4" destOrd="0" parTransId="{06BE9495-93B9-4B7D-A13A-D78EBD6A8851}" sibTransId="{D4E387F7-0C5F-4639-8537-57320B415B5C}"/>
-    <dgm:cxn modelId="{F6FA470A-E621-47ED-9878-4D70D29B0033}" type="presOf" srcId="{27B8F497-EEFE-4724-A7DB-6F628DE3891D}" destId="{06BACB2E-25D6-491F-9902-6DE6A89C06CD}" srcOrd="0" destOrd="1" presId="urn:microsoft.com/office/officeart/2005/8/layout/hList6"/>
-    <dgm:cxn modelId="{487D58D9-3B31-4424-9840-F9C066D7CF4E}" srcId="{1EFEFBA2-B851-4A8A-BB22-00008FF41747}" destId="{46960BC8-27AA-45F8-AEEF-22352CF1450C}" srcOrd="2" destOrd="0" parTransId="{CDFC704C-CE99-4629-BDE1-B0283A7800AE}" sibTransId="{EBBA58DB-C3E1-4881-9269-F2C8513B005E}"/>
-    <dgm:cxn modelId="{383F837F-9DCE-4D5D-B5F0-67D53EEA6EDB}" srcId="{5252D8DF-F7ED-47A9-8F1F-1C3DE6A4722F}" destId="{72C3D7C4-1FD3-4E91-B977-28931B3F5ABA}" srcOrd="0" destOrd="0" parTransId="{C7E336E9-2747-4995-A749-2C4A0C296DB1}" sibTransId="{C47984D0-4B72-491D-8DA1-F5AEAAF743E6}"/>
-    <dgm:cxn modelId="{1D5FBDE2-344C-40F2-AD28-A0A693BD1E6C}" srcId="{27B8F497-EEFE-4724-A7DB-6F628DE3891D}" destId="{646CE12A-CECA-48AC-A6F0-D8C0AF1C344D}" srcOrd="1" destOrd="0" parTransId="{4B24C949-5D2C-4001-9511-74A535573CF9}" sibTransId="{34E80F1F-E87B-4A1F-AD19-F99AC153B487}"/>
-    <dgm:cxn modelId="{2D90F8A9-3573-4108-A716-0C9B3D5AFBF1}" type="presOf" srcId="{A500FA09-F245-42CB-B0DE-04ADA5451810}" destId="{21D06AF9-7B68-4C50-825D-0A7D198CBF3A}" srcOrd="0" destOrd="9" presId="urn:microsoft.com/office/officeart/2005/8/layout/hList6"/>
-    <dgm:cxn modelId="{B68DA213-A0EC-4E2D-BFAD-FB4A32754442}" srcId="{27B8F497-EEFE-4724-A7DB-6F628DE3891D}" destId="{CCF0FB11-FBA1-45FE-9378-D89F5B3CD54F}" srcOrd="0" destOrd="0" parTransId="{34E0EB66-5006-4A57-B5EC-D5DAD4DCAAD8}" sibTransId="{EB9952C1-7CED-419D-AA04-CBC94BDBCAA5}"/>
-    <dgm:cxn modelId="{E389C86B-CE2C-40D6-8881-6563E6CB36FC}" type="presOf" srcId="{F5D42B0E-A74A-4B70-A5D1-5044D8743CE2}" destId="{F1E2BDB2-0BA9-4FD2-86F9-2CAEA5A63A20}" srcOrd="0" destOrd="2" presId="urn:microsoft.com/office/officeart/2005/8/layout/hList6"/>
-    <dgm:cxn modelId="{0F0AF83D-F9E7-40C1-B4B7-F7B2DDCA42D9}" srcId="{2BE55610-4D28-42E0-8267-558A7085E18F}" destId="{A500FA09-F245-42CB-B0DE-04ADA5451810}" srcOrd="2" destOrd="0" parTransId="{603B18AA-B746-4BE6-8BEA-FD31384938C6}" sibTransId="{AAC1C1C9-4CEC-49A8-AF46-36E16998BC0D}"/>
     <dgm:cxn modelId="{9FE6B04F-043F-4842-94C7-BFE97A8E63FB}" srcId="{72C3D7C4-1FD3-4E91-B977-28931B3F5ABA}" destId="{3134A35E-5F85-4AA0-82AC-DC8AF808B10B}" srcOrd="8" destOrd="0" parTransId="{4996416F-3E3B-4A82-B815-CAAA109D65A0}" sibTransId="{9C551CA4-A023-4452-9361-07B91AA4E205}"/>
     <dgm:cxn modelId="{DE27CD1D-0730-48AE-A71D-F3A1B69FEC3E}" type="presOf" srcId="{BFA6EAEA-D702-4114-802D-1D05CB97BDA4}" destId="{3DD4DCC5-CD2A-4C80-9516-43D7C916D6B5}" srcOrd="0" destOrd="7" presId="urn:microsoft.com/office/officeart/2005/8/layout/hList6"/>
-    <dgm:cxn modelId="{0BEAD79E-FCBE-4D8F-843D-43FDFAFE730C}" type="presOf" srcId="{1EFEFBA2-B851-4A8A-BB22-00008FF41747}" destId="{06BACB2E-25D6-491F-9902-6DE6A89C06CD}" srcOrd="0" destOrd="0" presId="urn:microsoft.com/office/officeart/2005/8/layout/hList6"/>
-    <dgm:cxn modelId="{8019387C-88C3-4DCF-810D-DE8619DEB540}" srcId="{72C3D7C4-1FD3-4E91-B977-28931B3F5ABA}" destId="{3C62CD8E-8D76-477F-9DB6-910BDF743BA0}" srcOrd="0" destOrd="0" parTransId="{ACB6940E-F7AB-4B27-A4AF-138986DD3A81}" sibTransId="{15123142-6E4E-45E4-807A-07C399AF1AF7}"/>
-    <dgm:cxn modelId="{C9D6D3FC-57F6-411A-B743-6C974C49B44D}" type="presOf" srcId="{0F97B7B9-C085-4D5B-971D-A65CB4C29F66}" destId="{21D06AF9-7B68-4C50-825D-0A7D198CBF3A}" srcOrd="0" destOrd="3" presId="urn:microsoft.com/office/officeart/2005/8/layout/hList6"/>
-    <dgm:cxn modelId="{35AE9547-F862-45D3-BE5A-E6241C543C34}" srcId="{5252D8DF-F7ED-47A9-8F1F-1C3DE6A4722F}" destId="{1EFEFBA2-B851-4A8A-BB22-00008FF41747}" srcOrd="1" destOrd="0" parTransId="{5237344E-3C45-4CD5-8679-16503A91AA7C}" sibTransId="{E95B4B51-66E9-4F52-9C30-23146904BC20}"/>
-    <dgm:cxn modelId="{42F76715-AFEB-4F17-93DB-8ADEB8228C3E}" srcId="{9DB0AEFC-F7C0-4A47-A9D2-B66B67BDF166}" destId="{C4398932-60E9-428B-BB59-BB2FDF42C249}" srcOrd="3" destOrd="0" parTransId="{3D0B83B2-1075-4391-96AD-404B4EC50D02}" sibTransId="{413CF9B1-273D-4A5D-A540-DEA45D415D55}"/>
-    <dgm:cxn modelId="{889E55EE-FE36-468A-8DBC-BD802B8B4A24}" type="presOf" srcId="{D760DDB8-0289-40E9-9715-B6E03035CD20}" destId="{F1E2BDB2-0BA9-4FD2-86F9-2CAEA5A63A20}" srcOrd="0" destOrd="4" presId="urn:microsoft.com/office/officeart/2005/8/layout/hList6"/>
-    <dgm:cxn modelId="{B7A0A54C-838F-4B77-95CA-A112C7778DD1}" type="presOf" srcId="{6C89E8F9-F492-45E6-8918-60E8E347286B}" destId="{3DD4DCC5-CD2A-4C80-9516-43D7C916D6B5}" srcOrd="0" destOrd="6" presId="urn:microsoft.com/office/officeart/2005/8/layout/hList6"/>
-    <dgm:cxn modelId="{79C2B499-FC9E-4EF2-9AD9-3D7C89C0FC3D}" type="presOf" srcId="{CCF0FB11-FBA1-45FE-9378-D89F5B3CD54F}" destId="{06BACB2E-25D6-491F-9902-6DE6A89C06CD}" srcOrd="0" destOrd="2" presId="urn:microsoft.com/office/officeart/2005/8/layout/hList6"/>
-    <dgm:cxn modelId="{6F7C1151-AB38-40FB-821A-629BFB12E557}" type="presOf" srcId="{646CE12A-CECA-48AC-A6F0-D8C0AF1C344D}" destId="{06BACB2E-25D6-491F-9902-6DE6A89C06CD}" srcOrd="0" destOrd="3" presId="urn:microsoft.com/office/officeart/2005/8/layout/hList6"/>
-    <dgm:cxn modelId="{AE803186-1124-46E1-8F1A-37AB7FE2A10B}" srcId="{1EFEFBA2-B851-4A8A-BB22-00008FF41747}" destId="{27B8F497-EEFE-4724-A7DB-6F628DE3891D}" srcOrd="0" destOrd="0" parTransId="{326F6861-A2B9-4697-8835-2FE6175350B9}" sibTransId="{CBB21267-DEF5-4514-82CE-4C0594486F84}"/>
-    <dgm:cxn modelId="{E9865A40-51BA-42A8-8ED1-FC7226692B6E}" type="presOf" srcId="{884C298F-B263-464A-B100-EA57B8F7D880}" destId="{06BACB2E-25D6-491F-9902-6DE6A89C06CD}" srcOrd="0" destOrd="5" presId="urn:microsoft.com/office/officeart/2005/8/layout/hList6"/>
-    <dgm:cxn modelId="{4D8E0CA6-ADA0-4773-A89A-E9F7C1E688F9}" srcId="{0EB01263-FD3B-4AC7-BF83-D803022CDB57}" destId="{F5D42B0E-A74A-4B70-A5D1-5044D8743CE2}" srcOrd="0" destOrd="0" parTransId="{7A6CE080-2E23-488F-B819-CE4A3AF04735}" sibTransId="{D55899BE-9D08-4A57-AE57-4825F1B359F3}"/>
-    <dgm:cxn modelId="{628E5962-57DF-4D87-97D9-0192FBFDD090}" srcId="{2BE55610-4D28-42E0-8267-558A7085E18F}" destId="{498996AE-4AE4-493E-85FE-F243E011573C}" srcOrd="0" destOrd="0" parTransId="{083F37AC-F742-4756-9721-03926A31C2E0}" sibTransId="{48AF3B71-218F-4F8C-B4DE-6B2DE20F7BC5}"/>
-    <dgm:cxn modelId="{FDDCEA24-EC7C-4D5D-8506-BA871DE2B185}" type="presOf" srcId="{498996AE-4AE4-493E-85FE-F243E011573C}" destId="{21D06AF9-7B68-4C50-825D-0A7D198CBF3A}" srcOrd="0" destOrd="1" presId="urn:microsoft.com/office/officeart/2005/8/layout/hList6"/>
-    <dgm:cxn modelId="{547B59A2-9048-495E-9898-70ECA9498859}" type="presOf" srcId="{2BE55610-4D28-42E0-8267-558A7085E18F}" destId="{21D06AF9-7B68-4C50-825D-0A7D198CBF3A}" srcOrd="0" destOrd="0" presId="urn:microsoft.com/office/officeart/2005/8/layout/hList6"/>
-    <dgm:cxn modelId="{DC737BB5-46A0-4833-9E70-387B8B74F8DE}" type="presOf" srcId="{153C2728-0D46-4336-BCD5-B73E74FC5CFF}" destId="{06BACB2E-25D6-491F-9902-6DE6A89C06CD}" srcOrd="0" destOrd="6" presId="urn:microsoft.com/office/officeart/2005/8/layout/hList6"/>
-    <dgm:cxn modelId="{0DE55D2D-33B4-4963-9CA5-925682AFA090}" srcId="{72C3D7C4-1FD3-4E91-B977-28931B3F5ABA}" destId="{501AD31A-A917-4AA9-BB27-AC42F939E6C7}" srcOrd="2" destOrd="0" parTransId="{6FA99C3A-F407-417F-83DE-0391C15E10E9}" sibTransId="{7CF3A3B9-782C-4075-B06F-2F935C3C2DE2}"/>
     <dgm:cxn modelId="{1AF38BB0-8239-4FB1-AD88-E895B84302D6}" srcId="{72C3D7C4-1FD3-4E91-B977-28931B3F5ABA}" destId="{F2F81127-8604-4ECD-9F9E-207835E79493}" srcOrd="3" destOrd="0" parTransId="{99A45E88-8DDE-48D1-8F65-2DC2BFDC1B91}" sibTransId="{D3A54DFC-B2DF-4EA2-B582-F300D0C6C9D1}"/>
-    <dgm:cxn modelId="{C69C6571-5DCB-489E-BA78-B97A4F67D892}" type="presOf" srcId="{DCAA0985-226B-4387-B730-F449DFD3C2E3}" destId="{21D06AF9-7B68-4C50-825D-0A7D198CBF3A}" srcOrd="0" destOrd="6" presId="urn:microsoft.com/office/officeart/2005/8/layout/hList6"/>
-    <dgm:cxn modelId="{DE556CC3-DF24-4E13-A34B-765D89621F82}" srcId="{5252D8DF-F7ED-47A9-8F1F-1C3DE6A4722F}" destId="{2BE55610-4D28-42E0-8267-558A7085E18F}" srcOrd="2" destOrd="0" parTransId="{0412D34D-808E-40C7-8F02-8DB8FF4954D5}" sibTransId="{6F471C58-641B-49B6-9FAA-ED99D26EF7F1}"/>
-    <dgm:cxn modelId="{F3A2B4D6-BB4E-42BA-B583-A65FB9B18334}" srcId="{2BE55610-4D28-42E0-8267-558A7085E18F}" destId="{7107FF6F-355C-479F-868D-84C11CD2F69F}" srcOrd="1" destOrd="0" parTransId="{7A65574C-3B6E-4B7B-B4F2-48654D15DA37}" sibTransId="{B5AFDB0E-9BE2-4139-B603-4FE23277675B}"/>
-    <dgm:cxn modelId="{17706F1F-9A48-4FB3-AFC9-7F173426B60D}" srcId="{72C3D7C4-1FD3-4E91-B977-28931B3F5ABA}" destId="{A7E412B7-27EE-4512-911E-68B463084553}" srcOrd="4" destOrd="0" parTransId="{10DE53D3-699E-4FAB-93E6-2D4B0644106C}" sibTransId="{0A18CE13-150F-44E7-9CBF-4C503416DB9C}"/>
-    <dgm:cxn modelId="{05D05F4D-A4C7-4304-B0A9-389F05CC2E11}" srcId="{72C3D7C4-1FD3-4E91-B977-28931B3F5ABA}" destId="{8060FE38-94C9-45D0-A618-12DAAC482145}" srcOrd="7" destOrd="0" parTransId="{61FAE307-BC03-4CB9-B9C3-8AF901F5CA93}" sibTransId="{7AB311FF-CFF5-416A-ADC5-23F42AE7362B}"/>
-    <dgm:cxn modelId="{8A3BC528-2D42-4A0A-B95B-60FEB4DC7FB5}" type="presOf" srcId="{5252D8DF-F7ED-47A9-8F1F-1C3DE6A4722F}" destId="{71E9AA40-D3B4-4753-B77F-6CFE495E434F}" srcOrd="0" destOrd="0" presId="urn:microsoft.com/office/officeart/2005/8/layout/hList6"/>
-    <dgm:cxn modelId="{FC8B8949-7253-4FB4-9BAB-AB2204650A4A}" type="presOf" srcId="{8060FE38-94C9-45D0-A618-12DAAC482145}" destId="{3DD4DCC5-CD2A-4C80-9516-43D7C916D6B5}" srcOrd="0" destOrd="8" presId="urn:microsoft.com/office/officeart/2005/8/layout/hList6"/>
-    <dgm:cxn modelId="{4800A4EE-6F16-46D8-84D1-83B908998DA3}" srcId="{72C3D7C4-1FD3-4E91-B977-28931B3F5ABA}" destId="{6C89E8F9-F492-45E6-8918-60E8E347286B}" srcOrd="5" destOrd="0" parTransId="{D3A19BD5-5EF9-4F4A-A53B-A482174EDFCA}" sibTransId="{46BCADFF-F8C3-4EBF-8866-723D1B07C2AA}"/>
-    <dgm:cxn modelId="{C856C6C7-A09A-4BA5-8A8D-BD383C92DD2A}" srcId="{498996AE-4AE4-493E-85FE-F243E011573C}" destId="{65820A23-5088-47CA-BA30-3E010FED1EA7}" srcOrd="5" destOrd="0" parTransId="{0DA9102F-0E40-4EC0-87BC-0EF6CF238FC0}" sibTransId="{00602E1F-F497-452C-86E2-CED535679DDC}"/>
     <dgm:cxn modelId="{3456E43E-2BF4-4189-BAA6-9FF04BCBCAE8}" type="presParOf" srcId="{71E9AA40-D3B4-4753-B77F-6CFE495E434F}" destId="{3DD4DCC5-CD2A-4C80-9516-43D7C916D6B5}" srcOrd="0" destOrd="0" presId="urn:microsoft.com/office/officeart/2005/8/layout/hList6"/>
     <dgm:cxn modelId="{27C76C3C-ED65-4DF4-9734-04FAEAE44E9B}" type="presParOf" srcId="{71E9AA40-D3B4-4753-B77F-6CFE495E434F}" destId="{8FD0C632-C2B7-419D-B173-A6F16D83E195}" srcOrd="1" destOrd="0" presId="urn:microsoft.com/office/officeart/2005/8/layout/hList6"/>
     <dgm:cxn modelId="{D7E53C49-447D-4BF7-99C4-AB115A02D1F5}" type="presParOf" srcId="{71E9AA40-D3B4-4753-B77F-6CFE495E434F}" destId="{06BACB2E-25D6-491F-9902-6DE6A89C06CD}" srcOrd="2" destOrd="0" presId="urn:microsoft.com/office/officeart/2005/8/layout/hList6"/>
@@ -5547,13 +5536,6 @@
             </a:rPr>
             <a:t> Interaction with other contributors</a:t>
           </a:r>
-          <a:endParaRPr lang="fr-FR" sz="1050" kern="1200" dirty="0" smtClean="0">
-            <a:solidFill>
-              <a:schemeClr val="accent3">
-                <a:lumMod val="75000"/>
-              </a:schemeClr>
-            </a:solidFill>
-          </a:endParaRPr>
         </a:p>
         <a:p>
           <a:pPr marL="57150" lvl="1" indent="-57150" algn="l" defTabSz="466725">
@@ -6895,7 +6877,7 @@
           <a:p>
             <a:fld id="{DDCCA47B-3C97-470F-9E92-6634E455912F}" type="datetimeFigureOut">
               <a:rPr lang="en-US" smtClean="0"/>
-              <a:t>6/14/2015</a:t>
+              <a:t>6/15/2015</a:t>
             </a:fld>
             <a:endParaRPr lang="en-US"/>
           </a:p>
@@ -7473,7 +7455,7 @@
           <a:p>
             <a:fld id="{02594452-2088-46C7-8121-271356E8511E}" type="datetime1">
               <a:rPr lang="fr-FR" smtClean="0"/>
-              <a:t>14/06/2015</a:t>
+              <a:t>15/06/2015</a:t>
             </a:fld>
             <a:endParaRPr lang="fr-FR"/>
           </a:p>
@@ -7685,7 +7667,7 @@
           <a:p>
             <a:fld id="{FF739EE9-E6DE-4CFF-9ECE-0F54FDE20F4B}" type="datetime1">
               <a:rPr lang="fr-FR" smtClean="0"/>
-              <a:t>14/06/2015</a:t>
+              <a:t>15/06/2015</a:t>
             </a:fld>
             <a:endParaRPr lang="fr-FR"/>
           </a:p>
@@ -7945,7 +7927,7 @@
           <a:p>
             <a:fld id="{058B513E-FE9D-418D-A202-255A4E4C6AC5}" type="datetime1">
               <a:rPr lang="fr-FR" smtClean="0"/>
-              <a:t>14/06/2015</a:t>
+              <a:t>15/06/2015</a:t>
             </a:fld>
             <a:endParaRPr lang="fr-FR"/>
           </a:p>
@@ -8119,7 +8101,7 @@
           <a:p>
             <a:fld id="{B3951D82-E167-4565-95B5-D8341A5A6D5B}" type="datetime1">
               <a:rPr lang="fr-FR" smtClean="0"/>
-              <a:t>14/06/2015</a:t>
+              <a:t>15/06/2015</a:t>
             </a:fld>
             <a:endParaRPr lang="fr-FR"/>
           </a:p>
@@ -8466,7 +8448,7 @@
           <a:p>
             <a:fld id="{6F395423-CF2A-41A1-B998-779941211E29}" type="datetime1">
               <a:rPr lang="fr-FR" smtClean="0"/>
-              <a:t>14/06/2015</a:t>
+              <a:t>15/06/2015</a:t>
             </a:fld>
             <a:endParaRPr lang="fr-FR"/>
           </a:p>
@@ -8745,7 +8727,7 @@
           <a:p>
             <a:fld id="{7B31CB30-7913-4FD5-8453-6D9FF22AA427}" type="datetime1">
               <a:rPr lang="fr-FR" smtClean="0"/>
-              <a:t>14/06/2015</a:t>
+              <a:t>15/06/2015</a:t>
             </a:fld>
             <a:endParaRPr lang="fr-FR"/>
           </a:p>
@@ -9128,7 +9110,7 @@
           <a:p>
             <a:fld id="{8F14C0EE-E481-43F3-94DA-D1A25CEC40DE}" type="datetime1">
               <a:rPr lang="fr-FR" smtClean="0"/>
-              <a:t>14/06/2015</a:t>
+              <a:t>15/06/2015</a:t>
             </a:fld>
             <a:endParaRPr lang="fr-FR"/>
           </a:p>
@@ -9250,7 +9232,7 @@
           <a:p>
             <a:fld id="{531EB399-98EB-4874-922C-FD316CDCF690}" type="datetime1">
               <a:rPr lang="fr-FR" smtClean="0"/>
-              <a:t>14/06/2015</a:t>
+              <a:t>15/06/2015</a:t>
             </a:fld>
             <a:endParaRPr lang="fr-FR"/>
           </a:p>
@@ -9425,7 +9407,7 @@
           <a:p>
             <a:fld id="{3ECF0B9D-8152-464B-A496-6DA29EB38900}" type="datetime1">
               <a:rPr lang="fr-FR" smtClean="0"/>
-              <a:t>14/06/2015</a:t>
+              <a:t>15/06/2015</a:t>
             </a:fld>
             <a:endParaRPr lang="fr-FR"/>
           </a:p>
@@ -9783,7 +9765,7 @@
           <a:p>
             <a:fld id="{EB72BB81-321C-47C9-8EF1-F64E7E3280BC}" type="datetime1">
               <a:rPr lang="fr-FR" smtClean="0"/>
-              <a:t>14/06/2015</a:t>
+              <a:t>15/06/2015</a:t>
             </a:fld>
             <a:endParaRPr lang="fr-FR"/>
           </a:p>
@@ -10164,7 +10146,7 @@
           <a:p>
             <a:fld id="{310F2307-685A-4E72-8E0A-45F85857C52E}" type="datetime1">
               <a:rPr lang="fr-FR" smtClean="0"/>
-              <a:t>14/06/2015</a:t>
+              <a:t>15/06/2015</a:t>
             </a:fld>
             <a:endParaRPr lang="fr-FR"/>
           </a:p>
@@ -10455,7 +10437,7 @@
           <a:p>
             <a:fld id="{B82A1CD3-8443-43C6-8EE4-FA26CE5A5F83}" type="datetime1">
               <a:rPr lang="fr-FR" smtClean="0"/>
-              <a:t>14/06/2015</a:t>
+              <a:t>15/06/2015</a:t>
             </a:fld>
             <a:endParaRPr lang="fr-FR"/>
           </a:p>
@@ -11049,11 +11031,7 @@
           <a:p>
             <a:r>
               <a:rPr lang="en-US" sz="6000" dirty="0" smtClean="0"/>
-              <a:t>FUEL </a:t>
-            </a:r>
-            <a:r>
-              <a:rPr lang="en-US" sz="6000" dirty="0" smtClean="0"/>
-              <a:t>CELL INDUSTRY ANALYSIS REPORT</a:t>
+              <a:t>FUEL CELL INDUSTRY ANALYSIS REPORT</a:t>
             </a:r>
             <a:endParaRPr lang="en-US" sz="6000" dirty="0"/>
           </a:p>
@@ -11157,19 +11135,7 @@
             </a:r>
             <a:r>
               <a:rPr lang="fr-FR" dirty="0" smtClean="0"/>
-              <a:t> </a:t>
-            </a:r>
-            <a:r>
-              <a:rPr lang="fr-FR" dirty="0" smtClean="0"/>
-              <a:t>- </a:t>
-            </a:r>
-            <a:r>
-              <a:rPr lang="fr-FR" dirty="0" smtClean="0"/>
-              <a:t>17</a:t>
-            </a:r>
-            <a:r>
-              <a:rPr lang="fr-FR" dirty="0" smtClean="0"/>
-              <a:t>/06/2015</a:t>
+              <a:t> - 17/06/2015</a:t>
             </a:r>
             <a:endParaRPr lang="fr-FR" dirty="0"/>
           </a:p>
@@ -11216,2035 +11182,6 @@
       </p:par>
     </p:tnLst>
   </p:timing>
-</p:sld>
-</file>
-
-<file path=ppt/slides/slide10.xml><?xml version="1.0" encoding="utf-8"?>
-<p:sld xmlns:a="http://schemas.openxmlformats.org/drawingml/2006/main" xmlns:r="http://schemas.openxmlformats.org/officeDocument/2006/relationships" xmlns:p="http://schemas.openxmlformats.org/presentationml/2006/main">
-  <p:cSld>
-    <p:spTree>
-      <p:nvGrpSpPr>
-        <p:cNvPr id="1" name=""/>
-        <p:cNvGrpSpPr/>
-        <p:nvPr/>
-      </p:nvGrpSpPr>
-      <p:grpSpPr>
-        <a:xfrm>
-          <a:off x="0" y="0"/>
-          <a:ext cx="0" cy="0"/>
-          <a:chOff x="0" y="0"/>
-          <a:chExt cx="0" cy="0"/>
-        </a:xfrm>
-      </p:grpSpPr>
-      <p:sp>
-        <p:nvSpPr>
-          <p:cNvPr id="2" name="Title 1"/>
-          <p:cNvSpPr>
-            <a:spLocks noGrp="1"/>
-          </p:cNvSpPr>
-          <p:nvPr>
-            <p:ph type="title"/>
-          </p:nvPr>
-        </p:nvSpPr>
-        <p:spPr/>
-        <p:txBody>
-          <a:bodyPr/>
-          <a:lstStyle/>
-          <a:p>
-            <a:r>
-              <a:rPr lang="en-US" dirty="0" smtClean="0"/>
-              <a:t>Process Data</a:t>
-            </a:r>
-            <a:endParaRPr lang="en-US" dirty="0"/>
-          </a:p>
-        </p:txBody>
-      </p:sp>
-      <p:pic>
-        <p:nvPicPr>
-          <p:cNvPr id="4" name="Espace réservé du contenu 3"/>
-          <p:cNvPicPr>
-            <a:picLocks noGrp="1" noChangeAspect="1"/>
-          </p:cNvPicPr>
-          <p:nvPr>
-            <p:ph idx="1"/>
-          </p:nvPr>
-        </p:nvPicPr>
-        <p:blipFill>
-          <a:blip r:embed="rId2"/>
-          <a:stretch>
-            <a:fillRect/>
-          </a:stretch>
-        </p:blipFill>
-        <p:spPr>
-          <a:xfrm>
-            <a:off x="1683067" y="2140178"/>
-            <a:ext cx="8886825" cy="2447925"/>
-          </a:xfrm>
-          <a:prstGeom prst="rect">
-            <a:avLst/>
-          </a:prstGeom>
-          <a:ln>
-            <a:solidFill>
-              <a:schemeClr val="accent5"/>
-            </a:solidFill>
-          </a:ln>
-        </p:spPr>
-      </p:pic>
-      <p:sp>
-        <p:nvSpPr>
-          <p:cNvPr id="5" name="ZoneTexte 4"/>
-          <p:cNvSpPr txBox="1"/>
-          <p:nvPr/>
-        </p:nvSpPr>
-        <p:spPr>
-          <a:xfrm>
-            <a:off x="4513943" y="4588103"/>
-            <a:ext cx="6055949" cy="369332"/>
-          </a:xfrm>
-          <a:prstGeom prst="rect">
-            <a:avLst/>
-          </a:prstGeom>
-          <a:noFill/>
-        </p:spPr>
-        <p:txBody>
-          <a:bodyPr wrap="square" rtlCol="0">
-            <a:spAutoFit/>
-          </a:bodyPr>
-          <a:lstStyle/>
-          <a:p>
-            <a:pPr algn="r"/>
-            <a:r>
-              <a:rPr lang="fr-FR" i="1" dirty="0" err="1" smtClean="0">
-                <a:solidFill>
-                  <a:schemeClr val="accent3"/>
-                </a:solidFill>
-              </a:rPr>
-              <a:t>BambuGMS</a:t>
-            </a:r>
-            <a:r>
-              <a:rPr lang="fr-FR" i="1" dirty="0" smtClean="0">
-                <a:solidFill>
-                  <a:schemeClr val="accent3"/>
-                </a:solidFill>
-              </a:rPr>
-              <a:t> Group contributions. </a:t>
-            </a:r>
-            <a:r>
-              <a:rPr lang="fr-FR" i="1" dirty="0" err="1" smtClean="0">
-                <a:solidFill>
-                  <a:schemeClr val="accent3"/>
-                </a:solidFill>
-              </a:rPr>
-              <a:t>GitHub</a:t>
-            </a:r>
-            <a:r>
-              <a:rPr lang="fr-FR" i="1" dirty="0" smtClean="0">
-                <a:solidFill>
-                  <a:schemeClr val="accent3"/>
-                </a:solidFill>
-              </a:rPr>
-              <a:t>, Inc.</a:t>
-            </a:r>
-            <a:endParaRPr lang="fr-FR" i="1" dirty="0">
-              <a:solidFill>
-                <a:schemeClr val="accent3"/>
-              </a:solidFill>
-            </a:endParaRPr>
-          </a:p>
-        </p:txBody>
-      </p:sp>
-      <p:sp>
-        <p:nvSpPr>
-          <p:cNvPr id="6" name="Espace réservé du pied de page 5"/>
-          <p:cNvSpPr>
-            <a:spLocks noGrp="1"/>
-          </p:cNvSpPr>
-          <p:nvPr>
-            <p:ph type="ftr" sz="quarter" idx="11"/>
-          </p:nvPr>
-        </p:nvSpPr>
-        <p:spPr/>
-        <p:txBody>
-          <a:bodyPr/>
-          <a:lstStyle/>
-          <a:p>
-            <a:r>
-              <a:rPr lang="fr-FR" smtClean="0"/>
-              <a:t>Banmbu - 20/05/2015</a:t>
-            </a:r>
-            <a:endParaRPr lang="fr-FR"/>
-          </a:p>
-        </p:txBody>
-      </p:sp>
-      <p:sp>
-        <p:nvSpPr>
-          <p:cNvPr id="7" name="Espace réservé du numéro de diapositive 6"/>
-          <p:cNvSpPr>
-            <a:spLocks noGrp="1"/>
-          </p:cNvSpPr>
-          <p:nvPr>
-            <p:ph type="sldNum" sz="quarter" idx="12"/>
-          </p:nvPr>
-        </p:nvSpPr>
-        <p:spPr/>
-        <p:txBody>
-          <a:bodyPr/>
-          <a:lstStyle/>
-          <a:p>
-            <a:fld id="{D376626B-8044-4126-A03C-8C0AE257EC41}" type="slidenum">
-              <a:rPr lang="fr-FR" smtClean="0"/>
-              <a:t>10</a:t>
-            </a:fld>
-            <a:endParaRPr lang="fr-FR"/>
-          </a:p>
-        </p:txBody>
-      </p:sp>
-    </p:spTree>
-    <p:extLst>
-      <p:ext uri="{BB962C8B-B14F-4D97-AF65-F5344CB8AC3E}">
-        <p14:creationId xmlns:p14="http://schemas.microsoft.com/office/powerpoint/2010/main" val="4195051651"/>
-      </p:ext>
-    </p:extLst>
-  </p:cSld>
-  <p:clrMapOvr>
-    <a:masterClrMapping/>
-  </p:clrMapOvr>
-  <p:timing>
-    <p:tnLst>
-      <p:par>
-        <p:cTn id="1" dur="indefinite" restart="never" nodeType="tmRoot"/>
-      </p:par>
-    </p:tnLst>
-  </p:timing>
-</p:sld>
-</file>
-
-<file path=ppt/slides/slide11.xml><?xml version="1.0" encoding="utf-8"?>
-<p:sld xmlns:a="http://schemas.openxmlformats.org/drawingml/2006/main" xmlns:r="http://schemas.openxmlformats.org/officeDocument/2006/relationships" xmlns:p="http://schemas.openxmlformats.org/presentationml/2006/main">
-  <p:cSld>
-    <p:spTree>
-      <p:nvGrpSpPr>
-        <p:cNvPr id="1" name=""/>
-        <p:cNvGrpSpPr/>
-        <p:nvPr/>
-      </p:nvGrpSpPr>
-      <p:grpSpPr>
-        <a:xfrm>
-          <a:off x="0" y="0"/>
-          <a:ext cx="0" cy="0"/>
-          <a:chOff x="0" y="0"/>
-          <a:chExt cx="0" cy="0"/>
-        </a:xfrm>
-      </p:grpSpPr>
-      <p:sp>
-        <p:nvSpPr>
-          <p:cNvPr id="4" name="Title 3"/>
-          <p:cNvSpPr>
-            <a:spLocks noGrp="1"/>
-          </p:cNvSpPr>
-          <p:nvPr>
-            <p:ph type="title"/>
-          </p:nvPr>
-        </p:nvSpPr>
-        <p:spPr/>
-        <p:txBody>
-          <a:bodyPr/>
-          <a:lstStyle/>
-          <a:p>
-            <a:r>
-              <a:rPr lang="en-US" dirty="0" smtClean="0"/>
-              <a:t>IAR Progress</a:t>
-            </a:r>
-            <a:endParaRPr lang="en-US" dirty="0"/>
-          </a:p>
-        </p:txBody>
-      </p:sp>
-      <p:sp>
-        <p:nvSpPr>
-          <p:cNvPr id="5" name="Text Placeholder 4"/>
-          <p:cNvSpPr>
-            <a:spLocks noGrp="1"/>
-          </p:cNvSpPr>
-          <p:nvPr>
-            <p:ph type="body" idx="1"/>
-          </p:nvPr>
-        </p:nvSpPr>
-        <p:spPr/>
-        <p:txBody>
-          <a:bodyPr/>
-          <a:lstStyle/>
-          <a:p>
-            <a:r>
-              <a:rPr lang="en-US" dirty="0" smtClean="0"/>
-              <a:t>‘LM ACTIVITIES’ And ‘Work-in-progress’</a:t>
-            </a:r>
-            <a:endParaRPr lang="en-US" dirty="0"/>
-          </a:p>
-        </p:txBody>
-      </p:sp>
-      <p:sp>
-        <p:nvSpPr>
-          <p:cNvPr id="2" name="Espace réservé du pied de page 1"/>
-          <p:cNvSpPr>
-            <a:spLocks noGrp="1"/>
-          </p:cNvSpPr>
-          <p:nvPr>
-            <p:ph type="ftr" sz="quarter" idx="11"/>
-          </p:nvPr>
-        </p:nvSpPr>
-        <p:spPr/>
-        <p:txBody>
-          <a:bodyPr/>
-          <a:lstStyle/>
-          <a:p>
-            <a:r>
-              <a:rPr lang="fr-FR" smtClean="0"/>
-              <a:t>Banmbu - 20/05/2015</a:t>
-            </a:r>
-            <a:endParaRPr lang="fr-FR"/>
-          </a:p>
-        </p:txBody>
-      </p:sp>
-      <p:sp>
-        <p:nvSpPr>
-          <p:cNvPr id="3" name="Espace réservé du numéro de diapositive 2"/>
-          <p:cNvSpPr>
-            <a:spLocks noGrp="1"/>
-          </p:cNvSpPr>
-          <p:nvPr>
-            <p:ph type="sldNum" sz="quarter" idx="12"/>
-          </p:nvPr>
-        </p:nvSpPr>
-        <p:spPr/>
-        <p:txBody>
-          <a:bodyPr/>
-          <a:lstStyle/>
-          <a:p>
-            <a:fld id="{D376626B-8044-4126-A03C-8C0AE257EC41}" type="slidenum">
-              <a:rPr lang="fr-FR" smtClean="0"/>
-              <a:t>11</a:t>
-            </a:fld>
-            <a:endParaRPr lang="fr-FR"/>
-          </a:p>
-        </p:txBody>
-      </p:sp>
-      <p:pic>
-        <p:nvPicPr>
-          <p:cNvPr id="6" name="Image 5"/>
-          <p:cNvPicPr>
-            <a:picLocks noChangeAspect="1"/>
-          </p:cNvPicPr>
-          <p:nvPr/>
-        </p:nvPicPr>
-        <p:blipFill>
-          <a:blip r:embed="rId2">
-            <a:duotone>
-              <a:schemeClr val="accent4">
-                <a:shade val="45000"/>
-                <a:satMod val="135000"/>
-              </a:schemeClr>
-              <a:prstClr val="white"/>
-            </a:duotone>
-            <a:extLst>
-              <a:ext uri="{28A0092B-C50C-407E-A947-70E740481C1C}">
-                <a14:useLocalDpi xmlns:a14="http://schemas.microsoft.com/office/drawing/2010/main" val="0"/>
-              </a:ext>
-            </a:extLst>
-          </a:blip>
-          <a:stretch>
-            <a:fillRect/>
-          </a:stretch>
-        </p:blipFill>
-        <p:spPr>
-          <a:xfrm>
-            <a:off x="8401493" y="505460"/>
-            <a:ext cx="2754187" cy="3947668"/>
-          </a:xfrm>
-          <a:prstGeom prst="rect">
-            <a:avLst/>
-          </a:prstGeom>
-          <a:noFill/>
-        </p:spPr>
-      </p:pic>
-    </p:spTree>
-    <p:extLst>
-      <p:ext uri="{BB962C8B-B14F-4D97-AF65-F5344CB8AC3E}">
-        <p14:creationId xmlns:p14="http://schemas.microsoft.com/office/powerpoint/2010/main" val="3673816368"/>
-      </p:ext>
-    </p:extLst>
-  </p:cSld>
-  <p:clrMapOvr>
-    <a:masterClrMapping/>
-  </p:clrMapOvr>
-</p:sld>
-</file>
-
-<file path=ppt/slides/slide12.xml><?xml version="1.0" encoding="utf-8"?>
-<p:sld xmlns:a="http://schemas.openxmlformats.org/drawingml/2006/main" xmlns:r="http://schemas.openxmlformats.org/officeDocument/2006/relationships" xmlns:p="http://schemas.openxmlformats.org/presentationml/2006/main">
-  <p:cSld>
-    <p:spTree>
-      <p:nvGrpSpPr>
-        <p:cNvPr id="1" name=""/>
-        <p:cNvGrpSpPr/>
-        <p:nvPr/>
-      </p:nvGrpSpPr>
-      <p:grpSpPr>
-        <a:xfrm>
-          <a:off x="0" y="0"/>
-          <a:ext cx="0" cy="0"/>
-          <a:chOff x="0" y="0"/>
-          <a:chExt cx="0" cy="0"/>
-        </a:xfrm>
-      </p:grpSpPr>
-      <p:sp>
-        <p:nvSpPr>
-          <p:cNvPr id="2" name="Title 1"/>
-          <p:cNvSpPr>
-            <a:spLocks noGrp="1"/>
-          </p:cNvSpPr>
-          <p:nvPr>
-            <p:ph type="title"/>
-          </p:nvPr>
-        </p:nvSpPr>
-        <p:spPr/>
-        <p:txBody>
-          <a:bodyPr/>
-          <a:lstStyle/>
-          <a:p>
-            <a:r>
-              <a:rPr lang="en-US" dirty="0" smtClean="0"/>
-              <a:t>IAR Progress : LM Activities</a:t>
-            </a:r>
-            <a:endParaRPr lang="en-US" dirty="0"/>
-          </a:p>
-        </p:txBody>
-      </p:sp>
-      <p:graphicFrame>
-        <p:nvGraphicFramePr>
-          <p:cNvPr id="5" name="Content Placeholder 4"/>
-          <p:cNvGraphicFramePr>
-            <a:graphicFrameLocks noGrp="1"/>
-          </p:cNvGraphicFramePr>
-          <p:nvPr>
-            <p:ph idx="1"/>
-            <p:extLst>
-              <p:ext uri="{D42A27DB-BD31-4B8C-83A1-F6EECF244321}">
-                <p14:modId xmlns:p14="http://schemas.microsoft.com/office/powerpoint/2010/main" val="2467249358"/>
-              </p:ext>
-            </p:extLst>
-          </p:nvPr>
-        </p:nvGraphicFramePr>
-        <p:xfrm>
-          <a:off x="1097280" y="2305907"/>
-          <a:ext cx="9613900" cy="3703320"/>
-        </p:xfrm>
-        <a:graphic>
-          <a:graphicData uri="http://schemas.openxmlformats.org/drawingml/2006/table">
-            <a:tbl>
-              <a:tblPr firstRow="1" bandRow="1">
-                <a:tableStyleId>{5C22544A-7EE6-4342-B048-85BDC9FD1C3A}</a:tableStyleId>
-              </a:tblPr>
-              <a:tblGrid>
-                <a:gridCol w="4806950"/>
-                <a:gridCol w="4806950"/>
-              </a:tblGrid>
-              <a:tr h="207394">
-                <a:tc>
-                  <a:txBody>
-                    <a:bodyPr/>
-                    <a:lstStyle/>
-                    <a:p>
-                      <a:r>
-                        <a:rPr lang="en-US" dirty="0" smtClean="0"/>
-                        <a:t>Task</a:t>
-                      </a:r>
-                      <a:endParaRPr lang="en-US" dirty="0"/>
-                    </a:p>
-                  </a:txBody>
-                  <a:tcPr/>
-                </a:tc>
-                <a:tc>
-                  <a:txBody>
-                    <a:bodyPr/>
-                    <a:lstStyle/>
-                    <a:p>
-                      <a:r>
-                        <a:rPr lang="en-US" dirty="0" smtClean="0"/>
-                        <a:t>Progress</a:t>
-                      </a:r>
-                      <a:endParaRPr lang="en-US" dirty="0"/>
-                    </a:p>
-                  </a:txBody>
-                  <a:tcPr/>
-                </a:tc>
-              </a:tr>
-              <a:tr h="370840">
-                <a:tc>
-                  <a:txBody>
-                    <a:bodyPr/>
-                    <a:lstStyle/>
-                    <a:p>
-                      <a:r>
-                        <a:rPr lang="en-US" sz="1400" dirty="0" smtClean="0"/>
-                        <a:t>Review</a:t>
-                      </a:r>
-                      <a:r>
-                        <a:rPr lang="en-US" sz="1400" baseline="0" dirty="0" smtClean="0"/>
-                        <a:t> Fuel Cell Information</a:t>
-                      </a:r>
-                      <a:endParaRPr lang="en-US" sz="1400" dirty="0"/>
-                    </a:p>
-                  </a:txBody>
-                  <a:tcPr/>
-                </a:tc>
-                <a:tc>
-                  <a:txBody>
-                    <a:bodyPr/>
-                    <a:lstStyle/>
-                    <a:p>
-                      <a:r>
-                        <a:rPr lang="en-US" sz="1400" dirty="0" smtClean="0"/>
-                        <a:t>COMPLETED</a:t>
-                      </a:r>
-                      <a:endParaRPr lang="en-US" sz="1400" dirty="0"/>
-                    </a:p>
-                  </a:txBody>
-                  <a:tcPr/>
-                </a:tc>
-              </a:tr>
-              <a:tr h="370840">
-                <a:tc>
-                  <a:txBody>
-                    <a:bodyPr/>
-                    <a:lstStyle/>
-                    <a:p>
-                      <a:r>
-                        <a:rPr lang="en-US" sz="1400" dirty="0" smtClean="0"/>
-                        <a:t>Extract IAR Structure from</a:t>
-                      </a:r>
-                      <a:r>
-                        <a:rPr lang="en-US" sz="1400" baseline="0" dirty="0" smtClean="0"/>
-                        <a:t> existing literature</a:t>
-                      </a:r>
-                      <a:endParaRPr lang="en-US" sz="1400" dirty="0"/>
-                    </a:p>
-                  </a:txBody>
-                  <a:tcPr/>
-                </a:tc>
-                <a:tc>
-                  <a:txBody>
-                    <a:bodyPr/>
-                    <a:lstStyle/>
-                    <a:p>
-                      <a:r>
-                        <a:rPr lang="en-US" sz="1400" dirty="0" smtClean="0"/>
-                        <a:t>COMPLETED</a:t>
-                      </a:r>
-                      <a:endParaRPr lang="en-US" sz="1400" dirty="0"/>
-                    </a:p>
-                  </a:txBody>
-                  <a:tcPr/>
-                </a:tc>
-              </a:tr>
-              <a:tr h="370840">
-                <a:tc>
-                  <a:txBody>
-                    <a:bodyPr/>
-                    <a:lstStyle/>
-                    <a:p>
-                      <a:r>
-                        <a:rPr lang="en-US" sz="1400" dirty="0" smtClean="0"/>
-                        <a:t>Build a personalized outline for the IAR</a:t>
-                      </a:r>
-                    </a:p>
-                  </a:txBody>
-                  <a:tcPr/>
-                </a:tc>
-                <a:tc>
-                  <a:txBody>
-                    <a:bodyPr/>
-                    <a:lstStyle/>
-                    <a:p>
-                      <a:r>
-                        <a:rPr lang="en-US" sz="1400" dirty="0" smtClean="0"/>
-                        <a:t>COMPLETED</a:t>
-                      </a:r>
-                      <a:endParaRPr lang="en-US" sz="1400" dirty="0"/>
-                    </a:p>
-                  </a:txBody>
-                  <a:tcPr/>
-                </a:tc>
-              </a:tr>
-              <a:tr h="370840">
-                <a:tc>
-                  <a:txBody>
-                    <a:bodyPr/>
-                    <a:lstStyle/>
-                    <a:p>
-                      <a:pPr marL="0" marR="0" indent="0" algn="l" defTabSz="914400" rtl="0" eaLnBrk="1" fontAlgn="auto" latinLnBrk="0" hangingPunct="1">
-                        <a:lnSpc>
-                          <a:spcPct val="100000"/>
-                        </a:lnSpc>
-                        <a:spcBef>
-                          <a:spcPts val="0"/>
-                        </a:spcBef>
-                        <a:spcAft>
-                          <a:spcPts val="0"/>
-                        </a:spcAft>
-                        <a:buClrTx/>
-                        <a:buSzTx/>
-                        <a:buFontTx/>
-                        <a:buNone/>
-                        <a:tabLst/>
-                        <a:defRPr/>
-                      </a:pPr>
-                      <a:r>
-                        <a:rPr lang="en-US" sz="1400" dirty="0" smtClean="0"/>
-                        <a:t>Develop a personalized</a:t>
-                      </a:r>
-                      <a:r>
-                        <a:rPr lang="en-US" sz="1400" baseline="0" dirty="0" smtClean="0"/>
-                        <a:t> template for the IAR</a:t>
-                      </a:r>
-                      <a:endParaRPr lang="en-US" sz="1400" dirty="0" smtClean="0"/>
-                    </a:p>
-                  </a:txBody>
-                  <a:tcPr/>
-                </a:tc>
-                <a:tc>
-                  <a:txBody>
-                    <a:bodyPr/>
-                    <a:lstStyle/>
-                    <a:p>
-                      <a:r>
-                        <a:rPr lang="en-US" sz="1400" dirty="0" smtClean="0"/>
-                        <a:t>COMPLETED</a:t>
-                      </a:r>
-                      <a:endParaRPr lang="en-US" sz="1400" dirty="0"/>
-                    </a:p>
-                  </a:txBody>
-                  <a:tcPr/>
-                </a:tc>
-              </a:tr>
-              <a:tr h="370840">
-                <a:tc>
-                  <a:txBody>
-                    <a:bodyPr/>
-                    <a:lstStyle/>
-                    <a:p>
-                      <a:pPr marL="0" marR="0" indent="0" algn="l" defTabSz="914400" rtl="0" eaLnBrk="1" fontAlgn="auto" latinLnBrk="0" hangingPunct="1">
-                        <a:lnSpc>
-                          <a:spcPct val="100000"/>
-                        </a:lnSpc>
-                        <a:spcBef>
-                          <a:spcPts val="0"/>
-                        </a:spcBef>
-                        <a:spcAft>
-                          <a:spcPts val="0"/>
-                        </a:spcAft>
-                        <a:buClrTx/>
-                        <a:buSzTx/>
-                        <a:buFontTx/>
-                        <a:buNone/>
-                        <a:tabLst/>
-                        <a:defRPr/>
-                      </a:pPr>
-                      <a:r>
-                        <a:rPr lang="en-US" sz="1400" dirty="0" smtClean="0"/>
-                        <a:t>Collect data</a:t>
-                      </a:r>
-                    </a:p>
-                  </a:txBody>
-                  <a:tcPr/>
-                </a:tc>
-                <a:tc>
-                  <a:txBody>
-                    <a:bodyPr/>
-                    <a:lstStyle/>
-                    <a:p>
-                      <a:r>
-                        <a:rPr lang="en-US" sz="1400" dirty="0" smtClean="0"/>
-                        <a:t>IN PROGRESS</a:t>
-                      </a:r>
-                      <a:endParaRPr lang="en-US" sz="1400" dirty="0"/>
-                    </a:p>
-                  </a:txBody>
-                  <a:tcPr/>
-                </a:tc>
-              </a:tr>
-              <a:tr h="370840">
-                <a:tc>
-                  <a:txBody>
-                    <a:bodyPr/>
-                    <a:lstStyle/>
-                    <a:p>
-                      <a:r>
-                        <a:rPr lang="en-US" sz="1400" baseline="0" dirty="0" smtClean="0"/>
-                        <a:t>Write IAR</a:t>
-                      </a:r>
-                    </a:p>
-                  </a:txBody>
-                  <a:tcPr/>
-                </a:tc>
-                <a:tc>
-                  <a:txBody>
-                    <a:bodyPr/>
-                    <a:lstStyle/>
-                    <a:p>
-                      <a:r>
-                        <a:rPr lang="en-US" sz="1400" dirty="0" smtClean="0"/>
-                        <a:t>IN PROGRESS</a:t>
-                      </a:r>
-                      <a:endParaRPr lang="en-US" sz="1400" dirty="0"/>
-                    </a:p>
-                  </a:txBody>
-                  <a:tcPr/>
-                </a:tc>
-              </a:tr>
-              <a:tr h="370840">
-                <a:tc>
-                  <a:txBody>
-                    <a:bodyPr/>
-                    <a:lstStyle/>
-                    <a:p>
-                      <a:r>
-                        <a:rPr lang="en-US" sz="1400" baseline="0" dirty="0" smtClean="0"/>
-                        <a:t>Design IAR</a:t>
-                      </a:r>
-                    </a:p>
-                  </a:txBody>
-                  <a:tcPr/>
-                </a:tc>
-                <a:tc>
-                  <a:txBody>
-                    <a:bodyPr/>
-                    <a:lstStyle/>
-                    <a:p>
-                      <a:r>
-                        <a:rPr lang="en-US" sz="1400" dirty="0" smtClean="0"/>
-                        <a:t>IN PROGRESS</a:t>
-                      </a:r>
-                      <a:endParaRPr lang="en-US" sz="1400" dirty="0"/>
-                    </a:p>
-                  </a:txBody>
-                  <a:tcPr/>
-                </a:tc>
-              </a:tr>
-              <a:tr h="370840">
-                <a:tc>
-                  <a:txBody>
-                    <a:bodyPr/>
-                    <a:lstStyle/>
-                    <a:p>
-                      <a:r>
-                        <a:rPr lang="en-US" sz="1400" baseline="0" dirty="0" smtClean="0"/>
-                        <a:t>Review and Edit IAR</a:t>
-                      </a:r>
-                    </a:p>
-                  </a:txBody>
-                  <a:tcPr/>
-                </a:tc>
-                <a:tc>
-                  <a:txBody>
-                    <a:bodyPr/>
-                    <a:lstStyle/>
-                    <a:p>
-                      <a:r>
-                        <a:rPr lang="en-US" sz="1400" dirty="0" smtClean="0"/>
-                        <a:t>AWAITING</a:t>
-                      </a:r>
-                      <a:endParaRPr lang="en-US" sz="1400" dirty="0"/>
-                    </a:p>
-                  </a:txBody>
-                  <a:tcPr/>
-                </a:tc>
-              </a:tr>
-              <a:tr h="370840">
-                <a:tc>
-                  <a:txBody>
-                    <a:bodyPr/>
-                    <a:lstStyle/>
-                    <a:p>
-                      <a:r>
-                        <a:rPr lang="en-US" sz="1400" baseline="0" dirty="0" smtClean="0"/>
-                        <a:t>Present IAR</a:t>
-                      </a:r>
-                    </a:p>
-                  </a:txBody>
-                  <a:tcPr/>
-                </a:tc>
-                <a:tc>
-                  <a:txBody>
-                    <a:bodyPr/>
-                    <a:lstStyle/>
-                    <a:p>
-                      <a:r>
-                        <a:rPr lang="en-US" sz="1400" dirty="0" smtClean="0"/>
-                        <a:t>AWAITING</a:t>
-                      </a:r>
-                      <a:endParaRPr lang="en-US" sz="1400" dirty="0"/>
-                    </a:p>
-                  </a:txBody>
-                  <a:tcPr/>
-                </a:tc>
-              </a:tr>
-            </a:tbl>
-          </a:graphicData>
-        </a:graphic>
-      </p:graphicFrame>
-      <p:sp>
-        <p:nvSpPr>
-          <p:cNvPr id="3" name="Espace réservé du pied de page 2"/>
-          <p:cNvSpPr>
-            <a:spLocks noGrp="1"/>
-          </p:cNvSpPr>
-          <p:nvPr>
-            <p:ph type="ftr" sz="quarter" idx="11"/>
-          </p:nvPr>
-        </p:nvSpPr>
-        <p:spPr/>
-        <p:txBody>
-          <a:bodyPr/>
-          <a:lstStyle/>
-          <a:p>
-            <a:r>
-              <a:rPr lang="fr-FR" smtClean="0"/>
-              <a:t>Banmbu - 20/05/2015</a:t>
-            </a:r>
-            <a:endParaRPr lang="fr-FR"/>
-          </a:p>
-        </p:txBody>
-      </p:sp>
-      <p:sp>
-        <p:nvSpPr>
-          <p:cNvPr id="4" name="Espace réservé du numéro de diapositive 3"/>
-          <p:cNvSpPr>
-            <a:spLocks noGrp="1"/>
-          </p:cNvSpPr>
-          <p:nvPr>
-            <p:ph type="sldNum" sz="quarter" idx="12"/>
-          </p:nvPr>
-        </p:nvSpPr>
-        <p:spPr/>
-        <p:txBody>
-          <a:bodyPr/>
-          <a:lstStyle/>
-          <a:p>
-            <a:fld id="{D376626B-8044-4126-A03C-8C0AE257EC41}" type="slidenum">
-              <a:rPr lang="fr-FR" smtClean="0"/>
-              <a:t>12</a:t>
-            </a:fld>
-            <a:endParaRPr lang="fr-FR"/>
-          </a:p>
-        </p:txBody>
-      </p:sp>
-    </p:spTree>
-    <p:extLst>
-      <p:ext uri="{BB962C8B-B14F-4D97-AF65-F5344CB8AC3E}">
-        <p14:creationId xmlns:p14="http://schemas.microsoft.com/office/powerpoint/2010/main" val="2512976400"/>
-      </p:ext>
-    </p:extLst>
-  </p:cSld>
-  <p:clrMapOvr>
-    <a:masterClrMapping/>
-  </p:clrMapOvr>
-  <p:timing>
-    <p:tnLst>
-      <p:par>
-        <p:cTn id="1" dur="indefinite" restart="never" nodeType="tmRoot"/>
-      </p:par>
-    </p:tnLst>
-  </p:timing>
-</p:sld>
-</file>
-
-<file path=ppt/slides/slide13.xml><?xml version="1.0" encoding="utf-8"?>
-<p:sld xmlns:a="http://schemas.openxmlformats.org/drawingml/2006/main" xmlns:r="http://schemas.openxmlformats.org/officeDocument/2006/relationships" xmlns:p="http://schemas.openxmlformats.org/presentationml/2006/main">
-  <p:cSld>
-    <p:spTree>
-      <p:nvGrpSpPr>
-        <p:cNvPr id="1" name=""/>
-        <p:cNvGrpSpPr/>
-        <p:nvPr/>
-      </p:nvGrpSpPr>
-      <p:grpSpPr>
-        <a:xfrm>
-          <a:off x="0" y="0"/>
-          <a:ext cx="0" cy="0"/>
-          <a:chOff x="0" y="0"/>
-          <a:chExt cx="0" cy="0"/>
-        </a:xfrm>
-      </p:grpSpPr>
-      <p:sp>
-        <p:nvSpPr>
-          <p:cNvPr id="45" name="Oval 44"/>
-          <p:cNvSpPr/>
-          <p:nvPr/>
-        </p:nvSpPr>
-        <p:spPr>
-          <a:xfrm rot="19513347">
-            <a:off x="1905994" y="4344949"/>
-            <a:ext cx="1155382" cy="1187029"/>
-          </a:xfrm>
-          <a:prstGeom prst="ellipse">
-            <a:avLst/>
-          </a:prstGeom>
-          <a:noFill/>
-          <a:ln w="38100">
-            <a:prstDash val="sysDash"/>
-          </a:ln>
-        </p:spPr>
-        <p:style>
-          <a:lnRef idx="2">
-            <a:schemeClr val="accent1">
-              <a:shade val="50000"/>
-            </a:schemeClr>
-          </a:lnRef>
-          <a:fillRef idx="1">
-            <a:schemeClr val="accent1"/>
-          </a:fillRef>
-          <a:effectRef idx="0">
-            <a:schemeClr val="accent1"/>
-          </a:effectRef>
-          <a:fontRef idx="minor">
-            <a:schemeClr val="lt1"/>
-          </a:fontRef>
-        </p:style>
-        <p:txBody>
-          <a:bodyPr rtlCol="0" anchor="ctr"/>
-          <a:lstStyle/>
-          <a:p>
-            <a:pPr algn="ctr"/>
-            <a:endParaRPr lang="en-US">
-              <a:ln>
-                <a:solidFill>
-                  <a:schemeClr val="tx1"/>
-                </a:solidFill>
-                <a:prstDash val="dash"/>
-              </a:ln>
-            </a:endParaRPr>
-          </a:p>
-        </p:txBody>
-      </p:sp>
-      <p:sp>
-        <p:nvSpPr>
-          <p:cNvPr id="42" name="Oval 41"/>
-          <p:cNvSpPr/>
-          <p:nvPr/>
-        </p:nvSpPr>
-        <p:spPr>
-          <a:xfrm rot="19513347">
-            <a:off x="5183711" y="4363621"/>
-            <a:ext cx="1155382" cy="1187029"/>
-          </a:xfrm>
-          <a:prstGeom prst="ellipse">
-            <a:avLst/>
-          </a:prstGeom>
-          <a:noFill/>
-          <a:ln w="38100">
-            <a:prstDash val="sysDash"/>
-          </a:ln>
-        </p:spPr>
-        <p:style>
-          <a:lnRef idx="2">
-            <a:schemeClr val="accent1">
-              <a:shade val="50000"/>
-            </a:schemeClr>
-          </a:lnRef>
-          <a:fillRef idx="1">
-            <a:schemeClr val="accent1"/>
-          </a:fillRef>
-          <a:effectRef idx="0">
-            <a:schemeClr val="accent1"/>
-          </a:effectRef>
-          <a:fontRef idx="minor">
-            <a:schemeClr val="lt1"/>
-          </a:fontRef>
-        </p:style>
-        <p:txBody>
-          <a:bodyPr rtlCol="0" anchor="ctr"/>
-          <a:lstStyle/>
-          <a:p>
-            <a:pPr algn="ctr"/>
-            <a:endParaRPr lang="en-US">
-              <a:ln>
-                <a:solidFill>
-                  <a:schemeClr val="tx1"/>
-                </a:solidFill>
-                <a:prstDash val="dash"/>
-              </a:ln>
-            </a:endParaRPr>
-          </a:p>
-        </p:txBody>
-      </p:sp>
-      <p:sp>
-        <p:nvSpPr>
-          <p:cNvPr id="44" name="Oval 43"/>
-          <p:cNvSpPr/>
-          <p:nvPr/>
-        </p:nvSpPr>
-        <p:spPr>
-          <a:xfrm rot="19513347">
-            <a:off x="8577739" y="4285079"/>
-            <a:ext cx="1155382" cy="1187029"/>
-          </a:xfrm>
-          <a:prstGeom prst="ellipse">
-            <a:avLst/>
-          </a:prstGeom>
-          <a:noFill/>
-          <a:ln w="38100">
-            <a:prstDash val="sysDash"/>
-          </a:ln>
-        </p:spPr>
-        <p:style>
-          <a:lnRef idx="2">
-            <a:schemeClr val="accent1">
-              <a:shade val="50000"/>
-            </a:schemeClr>
-          </a:lnRef>
-          <a:fillRef idx="1">
-            <a:schemeClr val="accent1"/>
-          </a:fillRef>
-          <a:effectRef idx="0">
-            <a:schemeClr val="accent1"/>
-          </a:effectRef>
-          <a:fontRef idx="minor">
-            <a:schemeClr val="lt1"/>
-          </a:fontRef>
-        </p:style>
-        <p:txBody>
-          <a:bodyPr rtlCol="0" anchor="ctr"/>
-          <a:lstStyle/>
-          <a:p>
-            <a:pPr algn="ctr"/>
-            <a:endParaRPr lang="en-US">
-              <a:ln>
-                <a:solidFill>
-                  <a:schemeClr val="tx1"/>
-                </a:solidFill>
-                <a:prstDash val="dash"/>
-              </a:ln>
-            </a:endParaRPr>
-          </a:p>
-        </p:txBody>
-      </p:sp>
-      <p:sp>
-        <p:nvSpPr>
-          <p:cNvPr id="46" name="Oval 45"/>
-          <p:cNvSpPr/>
-          <p:nvPr/>
-        </p:nvSpPr>
-        <p:spPr>
-          <a:xfrm rot="19513347">
-            <a:off x="8557491" y="2440040"/>
-            <a:ext cx="1155382" cy="1187029"/>
-          </a:xfrm>
-          <a:prstGeom prst="ellipse">
-            <a:avLst/>
-          </a:prstGeom>
-          <a:noFill/>
-          <a:ln w="38100">
-            <a:prstDash val="sysDash"/>
-          </a:ln>
-        </p:spPr>
-        <p:style>
-          <a:lnRef idx="2">
-            <a:schemeClr val="accent1">
-              <a:shade val="50000"/>
-            </a:schemeClr>
-          </a:lnRef>
-          <a:fillRef idx="1">
-            <a:schemeClr val="accent1"/>
-          </a:fillRef>
-          <a:effectRef idx="0">
-            <a:schemeClr val="accent1"/>
-          </a:effectRef>
-          <a:fontRef idx="minor">
-            <a:schemeClr val="lt1"/>
-          </a:fontRef>
-        </p:style>
-        <p:txBody>
-          <a:bodyPr rtlCol="0" anchor="ctr"/>
-          <a:lstStyle/>
-          <a:p>
-            <a:pPr algn="ctr"/>
-            <a:endParaRPr lang="en-US">
-              <a:ln>
-                <a:solidFill>
-                  <a:schemeClr val="tx1"/>
-                </a:solidFill>
-                <a:prstDash val="dash"/>
-              </a:ln>
-            </a:endParaRPr>
-          </a:p>
-        </p:txBody>
-      </p:sp>
-      <p:sp>
-        <p:nvSpPr>
-          <p:cNvPr id="2" name="Title 1"/>
-          <p:cNvSpPr>
-            <a:spLocks noGrp="1"/>
-          </p:cNvSpPr>
-          <p:nvPr>
-            <p:ph type="title"/>
-          </p:nvPr>
-        </p:nvSpPr>
-        <p:spPr/>
-        <p:txBody>
-          <a:bodyPr/>
-          <a:lstStyle/>
-          <a:p>
-            <a:r>
-              <a:rPr lang="en-US" dirty="0"/>
-              <a:t>IAR Progress : </a:t>
-            </a:r>
-            <a:r>
-              <a:rPr lang="en-US" dirty="0" smtClean="0"/>
-              <a:t>Work-in-Progress</a:t>
-            </a:r>
-            <a:endParaRPr lang="en-US" dirty="0"/>
-          </a:p>
-        </p:txBody>
-      </p:sp>
-      <p:grpSp>
-        <p:nvGrpSpPr>
-          <p:cNvPr id="21" name="Group 20"/>
-          <p:cNvGrpSpPr/>
-          <p:nvPr/>
-        </p:nvGrpSpPr>
-        <p:grpSpPr>
-          <a:xfrm>
-            <a:off x="7124700" y="2433038"/>
-            <a:ext cx="3949700" cy="1729720"/>
-            <a:chOff x="6921500" y="2802370"/>
-            <a:chExt cx="3949700" cy="1729720"/>
-          </a:xfrm>
-        </p:grpSpPr>
-        <p:sp>
-          <p:nvSpPr>
-            <p:cNvPr id="22" name="Pie 21"/>
-            <p:cNvSpPr/>
-            <p:nvPr/>
-          </p:nvSpPr>
-          <p:spPr>
-            <a:xfrm>
-              <a:off x="8255000" y="2802370"/>
-              <a:ext cx="1282700" cy="1206500"/>
-            </a:xfrm>
-            <a:prstGeom prst="pie">
-              <a:avLst>
-                <a:gd name="adj1" fmla="val 19395152"/>
-                <a:gd name="adj2" fmla="val 16200000"/>
-              </a:avLst>
-            </a:prstGeom>
-          </p:spPr>
-          <p:style>
-            <a:lnRef idx="2">
-              <a:schemeClr val="accent1">
-                <a:shade val="50000"/>
-              </a:schemeClr>
-            </a:lnRef>
-            <a:fillRef idx="1">
-              <a:schemeClr val="accent1"/>
-            </a:fillRef>
-            <a:effectRef idx="0">
-              <a:schemeClr val="accent1"/>
-            </a:effectRef>
-            <a:fontRef idx="minor">
-              <a:schemeClr val="lt1"/>
-            </a:fontRef>
-          </p:style>
-          <p:txBody>
-            <a:bodyPr rtlCol="0" anchor="ctr"/>
-            <a:lstStyle/>
-            <a:p>
-              <a:pPr algn="ctr"/>
-              <a:endParaRPr lang="en-US">
-                <a:solidFill>
-                  <a:schemeClr val="tx1"/>
-                </a:solidFill>
-              </a:endParaRPr>
-            </a:p>
-          </p:txBody>
-        </p:sp>
-        <p:sp>
-          <p:nvSpPr>
-            <p:cNvPr id="23" name="TextBox 22"/>
-            <p:cNvSpPr txBox="1"/>
-            <p:nvPr/>
-          </p:nvSpPr>
-          <p:spPr>
-            <a:xfrm>
-              <a:off x="6921500" y="4008870"/>
-              <a:ext cx="3949700" cy="523220"/>
-            </a:xfrm>
-            <a:prstGeom prst="rect">
-              <a:avLst/>
-            </a:prstGeom>
-            <a:noFill/>
-          </p:spPr>
-          <p:txBody>
-            <a:bodyPr wrap="square" rtlCol="0">
-              <a:spAutoFit/>
-            </a:bodyPr>
-            <a:lstStyle/>
-            <a:p>
-              <a:r>
-                <a:rPr lang="en-US" sz="1400" b="1" dirty="0">
-                  <a:solidFill>
-                    <a:schemeClr val="accent1"/>
-                  </a:solidFill>
-                </a:rPr>
-                <a:t>IAR: Law and Governmental Regulations</a:t>
-              </a:r>
-            </a:p>
-            <a:p>
-              <a:endParaRPr lang="en-US" sz="1400" b="1" dirty="0"/>
-            </a:p>
-          </p:txBody>
-        </p:sp>
-      </p:grpSp>
-      <p:grpSp>
-        <p:nvGrpSpPr>
-          <p:cNvPr id="24" name="Group 23"/>
-          <p:cNvGrpSpPr/>
-          <p:nvPr/>
-        </p:nvGrpSpPr>
-        <p:grpSpPr>
-          <a:xfrm>
-            <a:off x="533400" y="4320698"/>
-            <a:ext cx="3949700" cy="1528791"/>
-            <a:chOff x="6921500" y="2787856"/>
-            <a:chExt cx="3949700" cy="1528791"/>
-          </a:xfrm>
-        </p:grpSpPr>
-        <p:sp>
-          <p:nvSpPr>
-            <p:cNvPr id="25" name="Pie 24"/>
-            <p:cNvSpPr/>
-            <p:nvPr/>
-          </p:nvSpPr>
-          <p:spPr>
-            <a:xfrm>
-              <a:off x="8240486" y="2787856"/>
-              <a:ext cx="1296000" cy="1224000"/>
-            </a:xfrm>
-            <a:prstGeom prst="pie">
-              <a:avLst>
-                <a:gd name="adj1" fmla="val 5429133"/>
-                <a:gd name="adj2" fmla="val 16200000"/>
-              </a:avLst>
-            </a:prstGeom>
-          </p:spPr>
-          <p:style>
-            <a:lnRef idx="2">
-              <a:schemeClr val="accent1">
-                <a:shade val="50000"/>
-              </a:schemeClr>
-            </a:lnRef>
-            <a:fillRef idx="1">
-              <a:schemeClr val="accent1"/>
-            </a:fillRef>
-            <a:effectRef idx="0">
-              <a:schemeClr val="accent1"/>
-            </a:effectRef>
-            <a:fontRef idx="minor">
-              <a:schemeClr val="lt1"/>
-            </a:fontRef>
-          </p:style>
-          <p:txBody>
-            <a:bodyPr rtlCol="0" anchor="ctr"/>
-            <a:lstStyle/>
-            <a:p>
-              <a:pPr algn="ctr"/>
-              <a:endParaRPr lang="en-US">
-                <a:solidFill>
-                  <a:schemeClr val="tx1"/>
-                </a:solidFill>
-              </a:endParaRPr>
-            </a:p>
-          </p:txBody>
-        </p:sp>
-        <p:sp>
-          <p:nvSpPr>
-            <p:cNvPr id="26" name="TextBox 25"/>
-            <p:cNvSpPr txBox="1"/>
-            <p:nvPr/>
-          </p:nvSpPr>
-          <p:spPr>
-            <a:xfrm>
-              <a:off x="6921500" y="4008870"/>
-              <a:ext cx="3949700" cy="307777"/>
-            </a:xfrm>
-            <a:prstGeom prst="rect">
-              <a:avLst/>
-            </a:prstGeom>
-            <a:noFill/>
-          </p:spPr>
-          <p:txBody>
-            <a:bodyPr wrap="square" rtlCol="0">
-              <a:spAutoFit/>
-            </a:bodyPr>
-            <a:lstStyle/>
-            <a:p>
-              <a:pPr defTabSz="914354"/>
-              <a:r>
-                <a:rPr lang="en-US" sz="1400" b="1" dirty="0">
-                  <a:solidFill>
-                    <a:schemeClr val="accent1"/>
-                  </a:solidFill>
-                </a:rPr>
-                <a:t>IAR : Comparison to other </a:t>
-              </a:r>
-              <a:r>
-                <a:rPr lang="en-US" sz="1400" b="1" dirty="0" smtClean="0">
-                  <a:solidFill>
-                    <a:schemeClr val="accent1"/>
-                  </a:solidFill>
-                </a:rPr>
-                <a:t>Technologies</a:t>
-              </a:r>
-              <a:endParaRPr lang="en-US" sz="1400" b="1" dirty="0">
-                <a:solidFill>
-                  <a:schemeClr val="accent1"/>
-                </a:solidFill>
-              </a:endParaRPr>
-            </a:p>
-          </p:txBody>
-        </p:sp>
-      </p:grpSp>
-      <p:grpSp>
-        <p:nvGrpSpPr>
-          <p:cNvPr id="27" name="Group 26"/>
-          <p:cNvGrpSpPr/>
-          <p:nvPr/>
-        </p:nvGrpSpPr>
-        <p:grpSpPr>
-          <a:xfrm>
-            <a:off x="3816350" y="4346074"/>
-            <a:ext cx="3949700" cy="1514277"/>
-            <a:chOff x="6921500" y="2802370"/>
-            <a:chExt cx="3949700" cy="1514277"/>
-          </a:xfrm>
-        </p:grpSpPr>
-        <p:sp>
-          <p:nvSpPr>
-            <p:cNvPr id="28" name="Pie 27"/>
-            <p:cNvSpPr/>
-            <p:nvPr/>
-          </p:nvSpPr>
-          <p:spPr>
-            <a:xfrm>
-              <a:off x="8255000" y="2802370"/>
-              <a:ext cx="1282700" cy="1206500"/>
-            </a:xfrm>
-            <a:prstGeom prst="pie">
-              <a:avLst>
-                <a:gd name="adj1" fmla="val 13340748"/>
-                <a:gd name="adj2" fmla="val 16200000"/>
-              </a:avLst>
-            </a:prstGeom>
-          </p:spPr>
-          <p:style>
-            <a:lnRef idx="2">
-              <a:schemeClr val="accent1">
-                <a:shade val="50000"/>
-              </a:schemeClr>
-            </a:lnRef>
-            <a:fillRef idx="1">
-              <a:schemeClr val="accent1"/>
-            </a:fillRef>
-            <a:effectRef idx="0">
-              <a:schemeClr val="accent1"/>
-            </a:effectRef>
-            <a:fontRef idx="minor">
-              <a:schemeClr val="lt1"/>
-            </a:fontRef>
-          </p:style>
-          <p:txBody>
-            <a:bodyPr rtlCol="0" anchor="ctr"/>
-            <a:lstStyle/>
-            <a:p>
-              <a:pPr algn="ctr"/>
-              <a:endParaRPr lang="en-US">
-                <a:solidFill>
-                  <a:schemeClr val="tx1"/>
-                </a:solidFill>
-              </a:endParaRPr>
-            </a:p>
-          </p:txBody>
-        </p:sp>
-        <p:sp>
-          <p:nvSpPr>
-            <p:cNvPr id="29" name="TextBox 28"/>
-            <p:cNvSpPr txBox="1"/>
-            <p:nvPr/>
-          </p:nvSpPr>
-          <p:spPr>
-            <a:xfrm>
-              <a:off x="6921500" y="4008870"/>
-              <a:ext cx="3949700" cy="307777"/>
-            </a:xfrm>
-            <a:prstGeom prst="rect">
-              <a:avLst/>
-            </a:prstGeom>
-            <a:noFill/>
-          </p:spPr>
-          <p:txBody>
-            <a:bodyPr wrap="square" rtlCol="0">
-              <a:spAutoFit/>
-            </a:bodyPr>
-            <a:lstStyle/>
-            <a:p>
-              <a:r>
-                <a:rPr lang="en-US" sz="1400" b="1" dirty="0">
-                  <a:solidFill>
-                    <a:schemeClr val="accent1"/>
-                  </a:solidFill>
-                </a:rPr>
-                <a:t>IAR : Future Perspectives</a:t>
-              </a:r>
-            </a:p>
-          </p:txBody>
-        </p:sp>
-      </p:grpSp>
-      <p:grpSp>
-        <p:nvGrpSpPr>
-          <p:cNvPr id="31" name="Group 30"/>
-          <p:cNvGrpSpPr/>
-          <p:nvPr/>
-        </p:nvGrpSpPr>
-        <p:grpSpPr>
-          <a:xfrm>
-            <a:off x="7205980" y="4256826"/>
-            <a:ext cx="3949700" cy="1514277"/>
-            <a:chOff x="6921500" y="2802370"/>
-            <a:chExt cx="3949700" cy="1514277"/>
-          </a:xfrm>
-        </p:grpSpPr>
-        <p:sp>
-          <p:nvSpPr>
-            <p:cNvPr id="32" name="Pie 31"/>
-            <p:cNvSpPr/>
-            <p:nvPr/>
-          </p:nvSpPr>
-          <p:spPr>
-            <a:xfrm>
-              <a:off x="8255000" y="2802370"/>
-              <a:ext cx="1282700" cy="1206500"/>
-            </a:xfrm>
-            <a:prstGeom prst="pie">
-              <a:avLst>
-                <a:gd name="adj1" fmla="val 7612194"/>
-                <a:gd name="adj2" fmla="val 16200000"/>
-              </a:avLst>
-            </a:prstGeom>
-          </p:spPr>
-          <p:style>
-            <a:lnRef idx="2">
-              <a:schemeClr val="accent1">
-                <a:shade val="50000"/>
-              </a:schemeClr>
-            </a:lnRef>
-            <a:fillRef idx="1">
-              <a:schemeClr val="accent1"/>
-            </a:fillRef>
-            <a:effectRef idx="0">
-              <a:schemeClr val="accent1"/>
-            </a:effectRef>
-            <a:fontRef idx="minor">
-              <a:schemeClr val="lt1"/>
-            </a:fontRef>
-          </p:style>
-          <p:txBody>
-            <a:bodyPr rtlCol="0" anchor="ctr"/>
-            <a:lstStyle/>
-            <a:p>
-              <a:pPr algn="ctr"/>
-              <a:endParaRPr lang="en-US">
-                <a:solidFill>
-                  <a:schemeClr val="tx1"/>
-                </a:solidFill>
-              </a:endParaRPr>
-            </a:p>
-          </p:txBody>
-        </p:sp>
-        <p:sp>
-          <p:nvSpPr>
-            <p:cNvPr id="33" name="TextBox 32"/>
-            <p:cNvSpPr txBox="1"/>
-            <p:nvPr/>
-          </p:nvSpPr>
-          <p:spPr>
-            <a:xfrm>
-              <a:off x="6921500" y="4008870"/>
-              <a:ext cx="3949700" cy="307777"/>
-            </a:xfrm>
-            <a:prstGeom prst="rect">
-              <a:avLst/>
-            </a:prstGeom>
-            <a:noFill/>
-          </p:spPr>
-          <p:txBody>
-            <a:bodyPr wrap="square" rtlCol="0">
-              <a:spAutoFit/>
-            </a:bodyPr>
-            <a:lstStyle/>
-            <a:p>
-              <a:r>
-                <a:rPr lang="en-US" sz="1400" b="1" dirty="0">
-                  <a:solidFill>
-                    <a:schemeClr val="accent1"/>
-                  </a:solidFill>
-                </a:rPr>
-                <a:t>IAR : Final Revision</a:t>
-              </a:r>
-            </a:p>
-          </p:txBody>
-        </p:sp>
-      </p:grpSp>
-      <p:sp>
-        <p:nvSpPr>
-          <p:cNvPr id="34" name="TextBox 33"/>
-          <p:cNvSpPr txBox="1"/>
-          <p:nvPr/>
-        </p:nvSpPr>
-        <p:spPr>
-          <a:xfrm>
-            <a:off x="3041015" y="2417802"/>
-            <a:ext cx="990600" cy="369332"/>
-          </a:xfrm>
-          <a:prstGeom prst="rect">
-            <a:avLst/>
-          </a:prstGeom>
-          <a:noFill/>
-        </p:spPr>
-        <p:txBody>
-          <a:bodyPr wrap="square" rtlCol="0">
-            <a:spAutoFit/>
-          </a:bodyPr>
-          <a:lstStyle/>
-          <a:p>
-            <a:r>
-              <a:rPr lang="en-US" b="1" dirty="0" smtClean="0"/>
-              <a:t>90%</a:t>
-            </a:r>
-            <a:endParaRPr lang="en-US" b="1" dirty="0"/>
-          </a:p>
-        </p:txBody>
-      </p:sp>
-      <p:sp>
-        <p:nvSpPr>
-          <p:cNvPr id="35" name="TextBox 34"/>
-          <p:cNvSpPr txBox="1"/>
-          <p:nvPr/>
-        </p:nvSpPr>
-        <p:spPr>
-          <a:xfrm>
-            <a:off x="6375400" y="2408082"/>
-            <a:ext cx="990600" cy="369332"/>
-          </a:xfrm>
-          <a:prstGeom prst="rect">
-            <a:avLst/>
-          </a:prstGeom>
-          <a:noFill/>
-        </p:spPr>
-        <p:txBody>
-          <a:bodyPr wrap="square" rtlCol="0">
-            <a:spAutoFit/>
-          </a:bodyPr>
-          <a:lstStyle/>
-          <a:p>
-            <a:r>
-              <a:rPr lang="en-US" b="1" dirty="0"/>
-              <a:t>8</a:t>
-            </a:r>
-            <a:r>
-              <a:rPr lang="en-US" b="1" dirty="0" smtClean="0"/>
-              <a:t>0%</a:t>
-            </a:r>
-            <a:endParaRPr lang="en-US" b="1" dirty="0"/>
-          </a:p>
-        </p:txBody>
-      </p:sp>
-      <p:sp>
-        <p:nvSpPr>
-          <p:cNvPr id="36" name="TextBox 35"/>
-          <p:cNvSpPr txBox="1"/>
-          <p:nvPr/>
-        </p:nvSpPr>
-        <p:spPr>
-          <a:xfrm>
-            <a:off x="9842500" y="2414822"/>
-            <a:ext cx="990600" cy="369332"/>
-          </a:xfrm>
-          <a:prstGeom prst="rect">
-            <a:avLst/>
-          </a:prstGeom>
-          <a:noFill/>
-        </p:spPr>
-        <p:txBody>
-          <a:bodyPr wrap="square" rtlCol="0">
-            <a:spAutoFit/>
-          </a:bodyPr>
-          <a:lstStyle/>
-          <a:p>
-            <a:r>
-              <a:rPr lang="en-US" b="1" dirty="0" smtClean="0"/>
-              <a:t>85%</a:t>
-            </a:r>
-            <a:endParaRPr lang="en-US" b="1" dirty="0"/>
-          </a:p>
-        </p:txBody>
-      </p:sp>
-      <p:sp>
-        <p:nvSpPr>
-          <p:cNvPr id="37" name="TextBox 36"/>
-          <p:cNvSpPr txBox="1"/>
-          <p:nvPr/>
-        </p:nvSpPr>
-        <p:spPr>
-          <a:xfrm>
-            <a:off x="3041015" y="4258132"/>
-            <a:ext cx="990600" cy="369332"/>
-          </a:xfrm>
-          <a:prstGeom prst="rect">
-            <a:avLst/>
-          </a:prstGeom>
-          <a:noFill/>
-        </p:spPr>
-        <p:txBody>
-          <a:bodyPr wrap="square" rtlCol="0">
-            <a:spAutoFit/>
-          </a:bodyPr>
-          <a:lstStyle/>
-          <a:p>
-            <a:r>
-              <a:rPr lang="en-US" b="1" dirty="0" smtClean="0"/>
-              <a:t>50%</a:t>
-            </a:r>
-            <a:endParaRPr lang="en-US" b="1" dirty="0"/>
-          </a:p>
-        </p:txBody>
-      </p:sp>
-      <p:sp>
-        <p:nvSpPr>
-          <p:cNvPr id="38" name="TextBox 37"/>
-          <p:cNvSpPr txBox="1"/>
-          <p:nvPr/>
-        </p:nvSpPr>
-        <p:spPr>
-          <a:xfrm>
-            <a:off x="6432550" y="4258132"/>
-            <a:ext cx="990600" cy="369332"/>
-          </a:xfrm>
-          <a:prstGeom prst="rect">
-            <a:avLst/>
-          </a:prstGeom>
-          <a:noFill/>
-        </p:spPr>
-        <p:txBody>
-          <a:bodyPr wrap="square" rtlCol="0">
-            <a:spAutoFit/>
-          </a:bodyPr>
-          <a:lstStyle/>
-          <a:p>
-            <a:r>
-              <a:rPr lang="en-US" b="1" dirty="0"/>
-              <a:t>1</a:t>
-            </a:r>
-            <a:r>
-              <a:rPr lang="en-US" b="1" dirty="0" smtClean="0"/>
-              <a:t>0%</a:t>
-            </a:r>
-            <a:endParaRPr lang="en-US" b="1" dirty="0"/>
-          </a:p>
-        </p:txBody>
-      </p:sp>
-      <p:sp>
-        <p:nvSpPr>
-          <p:cNvPr id="39" name="TextBox 38"/>
-          <p:cNvSpPr txBox="1"/>
-          <p:nvPr/>
-        </p:nvSpPr>
-        <p:spPr>
-          <a:xfrm>
-            <a:off x="9842500" y="4256826"/>
-            <a:ext cx="990600" cy="369332"/>
-          </a:xfrm>
-          <a:prstGeom prst="rect">
-            <a:avLst/>
-          </a:prstGeom>
-          <a:noFill/>
-        </p:spPr>
-        <p:txBody>
-          <a:bodyPr wrap="square" rtlCol="0">
-            <a:spAutoFit/>
-          </a:bodyPr>
-          <a:lstStyle/>
-          <a:p>
-            <a:r>
-              <a:rPr lang="en-US" b="1" dirty="0"/>
-              <a:t>4</a:t>
-            </a:r>
-            <a:r>
-              <a:rPr lang="en-US" b="1" dirty="0" smtClean="0"/>
-              <a:t>0%</a:t>
-            </a:r>
-            <a:endParaRPr lang="en-US" b="1" dirty="0"/>
-          </a:p>
-        </p:txBody>
-      </p:sp>
-      <p:sp>
-        <p:nvSpPr>
-          <p:cNvPr id="41" name="Oval 40"/>
-          <p:cNvSpPr/>
-          <p:nvPr/>
-        </p:nvSpPr>
-        <p:spPr>
-          <a:xfrm rot="19513347">
-            <a:off x="1935957" y="2446006"/>
-            <a:ext cx="1155382" cy="1081968"/>
-          </a:xfrm>
-          <a:prstGeom prst="ellipse">
-            <a:avLst/>
-          </a:prstGeom>
-          <a:noFill/>
-          <a:ln w="38100">
-            <a:prstDash val="sysDash"/>
-          </a:ln>
-        </p:spPr>
-        <p:style>
-          <a:lnRef idx="2">
-            <a:schemeClr val="accent1">
-              <a:shade val="50000"/>
-            </a:schemeClr>
-          </a:lnRef>
-          <a:fillRef idx="1">
-            <a:schemeClr val="accent1"/>
-          </a:fillRef>
-          <a:effectRef idx="0">
-            <a:schemeClr val="accent1"/>
-          </a:effectRef>
-          <a:fontRef idx="minor">
-            <a:schemeClr val="lt1"/>
-          </a:fontRef>
-        </p:style>
-        <p:txBody>
-          <a:bodyPr rtlCol="0" anchor="ctr"/>
-          <a:lstStyle/>
-          <a:p>
-            <a:pPr algn="ctr"/>
-            <a:endParaRPr lang="en-US">
-              <a:ln>
-                <a:solidFill>
-                  <a:schemeClr val="tx1"/>
-                </a:solidFill>
-                <a:prstDash val="dash"/>
-              </a:ln>
-            </a:endParaRPr>
-          </a:p>
-        </p:txBody>
-      </p:sp>
-      <p:grpSp>
-        <p:nvGrpSpPr>
-          <p:cNvPr id="13" name="Group 12"/>
-          <p:cNvGrpSpPr/>
-          <p:nvPr/>
-        </p:nvGrpSpPr>
-        <p:grpSpPr>
-          <a:xfrm>
-            <a:off x="533400" y="2409835"/>
-            <a:ext cx="3949700" cy="1514277"/>
-            <a:chOff x="6921500" y="2802370"/>
-            <a:chExt cx="3949700" cy="1514277"/>
-          </a:xfrm>
-        </p:grpSpPr>
-        <p:sp>
-          <p:nvSpPr>
-            <p:cNvPr id="14" name="Pie 13"/>
-            <p:cNvSpPr/>
-            <p:nvPr/>
-          </p:nvSpPr>
-          <p:spPr>
-            <a:xfrm>
-              <a:off x="8255000" y="2802370"/>
-              <a:ext cx="1282700" cy="1206500"/>
-            </a:xfrm>
-            <a:prstGeom prst="pie">
-              <a:avLst>
-                <a:gd name="adj1" fmla="val 18694568"/>
-                <a:gd name="adj2" fmla="val 16200000"/>
-              </a:avLst>
-            </a:prstGeom>
-          </p:spPr>
-          <p:style>
-            <a:lnRef idx="2">
-              <a:schemeClr val="accent1">
-                <a:shade val="50000"/>
-              </a:schemeClr>
-            </a:lnRef>
-            <a:fillRef idx="1">
-              <a:schemeClr val="accent1"/>
-            </a:fillRef>
-            <a:effectRef idx="0">
-              <a:schemeClr val="accent1"/>
-            </a:effectRef>
-            <a:fontRef idx="minor">
-              <a:schemeClr val="lt1"/>
-            </a:fontRef>
-          </p:style>
-          <p:txBody>
-            <a:bodyPr rtlCol="0" anchor="ctr"/>
-            <a:lstStyle/>
-            <a:p>
-              <a:pPr algn="ctr"/>
-              <a:endParaRPr lang="en-US">
-                <a:solidFill>
-                  <a:schemeClr val="tx1"/>
-                </a:solidFill>
-              </a:endParaRPr>
-            </a:p>
-          </p:txBody>
-        </p:sp>
-        <p:sp>
-          <p:nvSpPr>
-            <p:cNvPr id="15" name="TextBox 14"/>
-            <p:cNvSpPr txBox="1"/>
-            <p:nvPr/>
-          </p:nvSpPr>
-          <p:spPr>
-            <a:xfrm>
-              <a:off x="6921500" y="4008870"/>
-              <a:ext cx="3949700" cy="307777"/>
-            </a:xfrm>
-            <a:prstGeom prst="rect">
-              <a:avLst/>
-            </a:prstGeom>
-            <a:noFill/>
-          </p:spPr>
-          <p:txBody>
-            <a:bodyPr wrap="square" rtlCol="0">
-              <a:spAutoFit/>
-            </a:bodyPr>
-            <a:lstStyle/>
-            <a:p>
-              <a:pPr lvl="0" defTabSz="914354"/>
-              <a:r>
-                <a:rPr lang="en-US" sz="1400" b="1" dirty="0">
-                  <a:solidFill>
-                    <a:schemeClr val="accent1"/>
-                  </a:solidFill>
-                </a:rPr>
-                <a:t>IAR: Product Perspectives</a:t>
-              </a:r>
-            </a:p>
-          </p:txBody>
-        </p:sp>
-      </p:grpSp>
-      <p:sp>
-        <p:nvSpPr>
-          <p:cNvPr id="43" name="Oval 42"/>
-          <p:cNvSpPr/>
-          <p:nvPr/>
-        </p:nvSpPr>
-        <p:spPr>
-          <a:xfrm rot="19513347">
-            <a:off x="5241614" y="2444606"/>
-            <a:ext cx="1155382" cy="1187029"/>
-          </a:xfrm>
-          <a:prstGeom prst="ellipse">
-            <a:avLst/>
-          </a:prstGeom>
-          <a:noFill/>
-          <a:ln w="38100">
-            <a:prstDash val="sysDash"/>
-          </a:ln>
-        </p:spPr>
-        <p:style>
-          <a:lnRef idx="2">
-            <a:schemeClr val="accent1">
-              <a:shade val="50000"/>
-            </a:schemeClr>
-          </a:lnRef>
-          <a:fillRef idx="1">
-            <a:schemeClr val="accent1"/>
-          </a:fillRef>
-          <a:effectRef idx="0">
-            <a:schemeClr val="accent1"/>
-          </a:effectRef>
-          <a:fontRef idx="minor">
-            <a:schemeClr val="lt1"/>
-          </a:fontRef>
-        </p:style>
-        <p:txBody>
-          <a:bodyPr rtlCol="0" anchor="ctr"/>
-          <a:lstStyle/>
-          <a:p>
-            <a:pPr algn="ctr"/>
-            <a:endParaRPr lang="en-US">
-              <a:ln>
-                <a:solidFill>
-                  <a:schemeClr val="tx1"/>
-                </a:solidFill>
-                <a:prstDash val="dash"/>
-              </a:ln>
-            </a:endParaRPr>
-          </a:p>
-        </p:txBody>
-      </p:sp>
-      <p:grpSp>
-        <p:nvGrpSpPr>
-          <p:cNvPr id="18" name="Group 17"/>
-          <p:cNvGrpSpPr/>
-          <p:nvPr/>
-        </p:nvGrpSpPr>
-        <p:grpSpPr>
-          <a:xfrm>
-            <a:off x="3816350" y="2433038"/>
-            <a:ext cx="3949700" cy="1514277"/>
-            <a:chOff x="6921500" y="2802370"/>
-            <a:chExt cx="3949700" cy="1514277"/>
-          </a:xfrm>
-        </p:grpSpPr>
-        <p:sp>
-          <p:nvSpPr>
-            <p:cNvPr id="19" name="Pie 18"/>
-            <p:cNvSpPr/>
-            <p:nvPr/>
-          </p:nvSpPr>
-          <p:spPr>
-            <a:xfrm>
-              <a:off x="8255000" y="2802370"/>
-              <a:ext cx="1282700" cy="1206500"/>
-            </a:xfrm>
-            <a:prstGeom prst="pie">
-              <a:avLst>
-                <a:gd name="adj1" fmla="val 20021582"/>
-                <a:gd name="adj2" fmla="val 16200000"/>
-              </a:avLst>
-            </a:prstGeom>
-          </p:spPr>
-          <p:style>
-            <a:lnRef idx="2">
-              <a:schemeClr val="accent1">
-                <a:shade val="50000"/>
-              </a:schemeClr>
-            </a:lnRef>
-            <a:fillRef idx="1">
-              <a:schemeClr val="accent1"/>
-            </a:fillRef>
-            <a:effectRef idx="0">
-              <a:schemeClr val="accent1"/>
-            </a:effectRef>
-            <a:fontRef idx="minor">
-              <a:schemeClr val="lt1"/>
-            </a:fontRef>
-          </p:style>
-          <p:txBody>
-            <a:bodyPr rtlCol="0" anchor="ctr"/>
-            <a:lstStyle/>
-            <a:p>
-              <a:pPr algn="ctr"/>
-              <a:endParaRPr lang="en-US">
-                <a:solidFill>
-                  <a:schemeClr val="tx1"/>
-                </a:solidFill>
-              </a:endParaRPr>
-            </a:p>
-          </p:txBody>
-        </p:sp>
-        <p:sp>
-          <p:nvSpPr>
-            <p:cNvPr id="20" name="TextBox 19"/>
-            <p:cNvSpPr txBox="1"/>
-            <p:nvPr/>
-          </p:nvSpPr>
-          <p:spPr>
-            <a:xfrm>
-              <a:off x="6921500" y="4008870"/>
-              <a:ext cx="3949700" cy="307777"/>
-            </a:xfrm>
-            <a:prstGeom prst="rect">
-              <a:avLst/>
-            </a:prstGeom>
-            <a:noFill/>
-          </p:spPr>
-          <p:txBody>
-            <a:bodyPr wrap="square" rtlCol="0">
-              <a:spAutoFit/>
-            </a:bodyPr>
-            <a:lstStyle/>
-            <a:p>
-              <a:pPr defTabSz="914354"/>
-              <a:r>
-                <a:rPr lang="en-US" sz="1400" b="1" dirty="0">
-                  <a:solidFill>
-                    <a:schemeClr val="accent1"/>
-                  </a:solidFill>
-                </a:rPr>
-                <a:t>IAR : Market Perspectives</a:t>
-              </a:r>
-            </a:p>
-          </p:txBody>
-        </p:sp>
-      </p:grpSp>
-      <p:sp>
-        <p:nvSpPr>
-          <p:cNvPr id="3" name="Espace réservé du pied de page 2"/>
-          <p:cNvSpPr>
-            <a:spLocks noGrp="1"/>
-          </p:cNvSpPr>
-          <p:nvPr>
-            <p:ph type="ftr" sz="quarter" idx="11"/>
-          </p:nvPr>
-        </p:nvSpPr>
-        <p:spPr/>
-        <p:txBody>
-          <a:bodyPr/>
-          <a:lstStyle/>
-          <a:p>
-            <a:r>
-              <a:rPr lang="fr-FR" smtClean="0"/>
-              <a:t>Banmbu - 20/05/2015</a:t>
-            </a:r>
-            <a:endParaRPr lang="fr-FR"/>
-          </a:p>
-        </p:txBody>
-      </p:sp>
-      <p:sp>
-        <p:nvSpPr>
-          <p:cNvPr id="4" name="Espace réservé du numéro de diapositive 3"/>
-          <p:cNvSpPr>
-            <a:spLocks noGrp="1"/>
-          </p:cNvSpPr>
-          <p:nvPr>
-            <p:ph type="sldNum" sz="quarter" idx="12"/>
-          </p:nvPr>
-        </p:nvSpPr>
-        <p:spPr/>
-        <p:txBody>
-          <a:bodyPr/>
-          <a:lstStyle/>
-          <a:p>
-            <a:fld id="{D376626B-8044-4126-A03C-8C0AE257EC41}" type="slidenum">
-              <a:rPr lang="fr-FR" smtClean="0"/>
-              <a:t>13</a:t>
-            </a:fld>
-            <a:endParaRPr lang="fr-FR"/>
-          </a:p>
-        </p:txBody>
-      </p:sp>
-    </p:spTree>
-    <p:extLst>
-      <p:ext uri="{BB962C8B-B14F-4D97-AF65-F5344CB8AC3E}">
-        <p14:creationId xmlns:p14="http://schemas.microsoft.com/office/powerpoint/2010/main" val="4270440517"/>
-      </p:ext>
-    </p:extLst>
-  </p:cSld>
-  <p:clrMapOvr>
-    <a:masterClrMapping/>
-  </p:clrMapOvr>
 </p:sld>
 </file>
 
@@ -13975,7 +11912,7 @@
           <p:nvPr/>
         </p:nvPicPr>
         <p:blipFill rotWithShape="1">
-          <a:blip r:embed="rId3" cstate="print">
+          <a:blip r:embed="rId2" cstate="print">
             <a:extLst>
               <a:ext uri="{28A0092B-C50C-407E-A947-70E740481C1C}">
                 <a14:useLocalDpi xmlns:a14="http://schemas.microsoft.com/office/drawing/2010/main" val="0"/>
@@ -14013,7 +11950,7 @@
           <p:nvPr/>
         </p:nvPicPr>
         <p:blipFill>
-          <a:blip r:embed="rId4" cstate="print">
+          <a:blip r:embed="rId3" cstate="print">
             <a:extLst>
               <a:ext uri="{28A0092B-C50C-407E-A947-70E740481C1C}">
                 <a14:useLocalDpi xmlns:a14="http://schemas.microsoft.com/office/drawing/2010/main" val="0"/>
@@ -14052,7 +11989,7 @@
           <p:nvPr/>
         </p:nvPicPr>
         <p:blipFill>
-          <a:blip r:embed="rId5" cstate="print">
+          <a:blip r:embed="rId4" cstate="print">
             <a:extLst>
               <a:ext uri="{28A0092B-C50C-407E-A947-70E740481C1C}">
                 <a14:useLocalDpi xmlns:a14="http://schemas.microsoft.com/office/drawing/2010/main" val="0"/>
@@ -14078,6 +12015,129 @@
           <a:extLst>
             <a:ext uri="{53640926-AAD7-44D8-BBD7-CCE9431645EC}">
               <a14:shadowObscured xmlns:a14="http://schemas.microsoft.com/office/drawing/2010/main"/>
+            </a:ext>
+          </a:extLst>
+        </p:spPr>
+      </p:pic>
+      <p:pic>
+        <p:nvPicPr>
+          <p:cNvPr id="1027" name="Picture 3"/>
+          <p:cNvPicPr>
+            <a:picLocks noChangeAspect="1" noChangeArrowheads="1"/>
+          </p:cNvPicPr>
+          <p:nvPr/>
+        </p:nvPicPr>
+        <p:blipFill>
+          <a:blip r:embed="rId2">
+            <a:extLst>
+              <a:ext uri="{28A0092B-C50C-407E-A947-70E740481C1C}">
+                <a14:useLocalDpi xmlns:a14="http://schemas.microsoft.com/office/drawing/2010/main" val="0"/>
+              </a:ext>
+            </a:extLst>
+          </a:blip>
+          <a:srcRect/>
+          <a:stretch>
+            <a:fillRect/>
+          </a:stretch>
+        </p:blipFill>
+        <p:spPr bwMode="auto">
+          <a:xfrm>
+            <a:off x="0" y="0"/>
+            <a:ext cx="1190625" cy="1581150"/>
+          </a:xfrm>
+          <a:prstGeom prst="rect">
+            <a:avLst/>
+          </a:prstGeom>
+          <a:noFill/>
+          <a:extLst>
+            <a:ext uri="{909E8E84-426E-40DD-AFC4-6F175D3DCCD1}">
+              <a14:hiddenFill xmlns:a14="http://schemas.microsoft.com/office/drawing/2010/main">
+                <a:solidFill>
+                  <a:srgbClr val="FFFFFF"/>
+                </a:solidFill>
+              </a14:hiddenFill>
+            </a:ext>
+          </a:extLst>
+        </p:spPr>
+      </p:pic>
+      <p:pic>
+        <p:nvPicPr>
+          <p:cNvPr id="1026" name="Picture 2"/>
+          <p:cNvPicPr>
+            <a:picLocks noChangeAspect="1" noChangeArrowheads="1"/>
+          </p:cNvPicPr>
+          <p:nvPr/>
+        </p:nvPicPr>
+        <p:blipFill>
+          <a:blip r:embed="rId3">
+            <a:extLst>
+              <a:ext uri="{28A0092B-C50C-407E-A947-70E740481C1C}">
+                <a14:useLocalDpi xmlns:a14="http://schemas.microsoft.com/office/drawing/2010/main" val="0"/>
+              </a:ext>
+            </a:extLst>
+          </a:blip>
+          <a:srcRect/>
+          <a:stretch>
+            <a:fillRect/>
+          </a:stretch>
+        </p:blipFill>
+        <p:spPr bwMode="auto">
+          <a:xfrm>
+            <a:off x="0" y="0"/>
+            <a:ext cx="1190625" cy="1581150"/>
+          </a:xfrm>
+          <a:prstGeom prst="rect">
+            <a:avLst/>
+          </a:prstGeom>
+          <a:noFill/>
+          <a:extLst>
+            <a:ext uri="{909E8E84-426E-40DD-AFC4-6F175D3DCCD1}">
+              <a14:hiddenFill xmlns:a14="http://schemas.microsoft.com/office/drawing/2010/main">
+                <a:solidFill>
+                  <a:srgbClr val="FFFFFF"/>
+                </a:solidFill>
+              </a14:hiddenFill>
+            </a:ext>
+          </a:extLst>
+        </p:spPr>
+      </p:pic>
+      <p:pic>
+        <p:nvPicPr>
+          <p:cNvPr id="1025" name="Picture 24"/>
+          <p:cNvPicPr>
+            <a:picLocks noChangeAspect="1" noChangeArrowheads="1"/>
+          </p:cNvPicPr>
+          <p:nvPr/>
+        </p:nvPicPr>
+        <p:blipFill>
+          <a:blip r:embed="rId4">
+            <a:extLst>
+              <a:ext uri="{28A0092B-C50C-407E-A947-70E740481C1C}">
+                <a14:useLocalDpi xmlns:a14="http://schemas.microsoft.com/office/drawing/2010/main" val="0"/>
+              </a:ext>
+            </a:extLst>
+          </a:blip>
+          <a:srcRect/>
+          <a:stretch>
+            <a:fillRect/>
+          </a:stretch>
+        </p:blipFill>
+        <p:spPr bwMode="auto">
+          <a:xfrm>
+            <a:off x="0" y="0"/>
+            <a:ext cx="1190625" cy="1581150"/>
+          </a:xfrm>
+          <a:prstGeom prst="rect">
+            <a:avLst/>
+          </a:prstGeom>
+          <a:noFill/>
+          <a:extLst>
+            <a:ext uri="{909E8E84-426E-40DD-AFC4-6F175D3DCCD1}">
+              <a14:hiddenFill xmlns:a14="http://schemas.microsoft.com/office/drawing/2010/main">
+                <a:solidFill>
+                  <a:srgbClr val="FFFFFF"/>
+                </a:solidFill>
+              </a14:hiddenFill>
             </a:ext>
           </a:extLst>
         </p:spPr>
@@ -14328,14 +12388,14 @@
             <p:ph sz="half" idx="1"/>
             <p:extLst>
               <p:ext uri="{D42A27DB-BD31-4B8C-83A1-F6EECF244321}">
-                <p14:modId xmlns:p14="http://schemas.microsoft.com/office/powerpoint/2010/main" val="1627846606"/>
+                <p14:modId xmlns:p14="http://schemas.microsoft.com/office/powerpoint/2010/main" val="772202291"/>
               </p:ext>
             </p:extLst>
           </p:nvPr>
         </p:nvGraphicFramePr>
         <p:xfrm>
-          <a:off x="1096963" y="1846263"/>
-          <a:ext cx="1697037" cy="3309937"/>
+          <a:off x="1096963" y="1846264"/>
+          <a:ext cx="1697037" cy="3105298"/>
         </p:xfrm>
         <a:graphic>
           <a:graphicData uri="http://schemas.openxmlformats.org/drawingml/2006/chart">
@@ -14395,23 +12455,7 @@
                   <a:schemeClr val="accent5"/>
                 </a:solidFill>
               </a:rPr>
-              <a:t> (First ed.). </a:t>
-            </a:r>
-            <a:r>
-              <a:rPr lang="en-US" sz="1200" dirty="0">
-                <a:solidFill>
-                  <a:schemeClr val="accent5"/>
-                </a:solidFill>
-              </a:rPr>
-              <a:t>Princeton, New Jersey: Princeton University Press</a:t>
-            </a:r>
-            <a:r>
-              <a:rPr lang="en-US" sz="1200" dirty="0">
-                <a:solidFill>
-                  <a:schemeClr val="accent5"/>
-                </a:solidFill>
-              </a:rPr>
-              <a:t>.</a:t>
+              <a:t> (First ed.). Princeton, New Jersey: Princeton University Press.</a:t>
             </a:r>
             <a:endParaRPr lang="fr-FR" sz="1200" dirty="0">
               <a:solidFill>
@@ -14475,9 +12519,10 @@
           <a:lstStyle/>
           <a:p>
             <a:r>
-              <a:rPr lang="en-US" dirty="0"/>
-              <a:t>Logic Model</a:t>
+              <a:rPr lang="en-US" dirty="0" smtClean="0"/>
+              <a:t>LOGIC MODEL</a:t>
             </a:r>
+            <a:endParaRPr lang="en-US" dirty="0"/>
           </a:p>
         </p:txBody>
       </p:sp>
@@ -14497,7 +12542,7 @@
         </p:nvGraphicFramePr>
         <p:xfrm>
           <a:off x="1617028" y="1826933"/>
-          <a:ext cx="8902827" cy="630555"/>
+          <a:ext cx="8902827" cy="639191"/>
         </p:xfrm>
         <a:graphic>
           <a:graphicData uri="http://schemas.openxmlformats.org/drawingml/2006/table">
@@ -15554,7 +13599,7 @@
           <a:p>
             <a:r>
               <a:rPr lang="fr-FR" dirty="0" smtClean="0"/>
-              <a:t>RESOURCES</a:t>
+              <a:t>WORK PROCESS</a:t>
             </a:r>
             <a:endParaRPr lang="fr-FR" dirty="0"/>
           </a:p>
@@ -15562,129 +13607,7 @@
       </p:sp>
       <p:sp>
         <p:nvSpPr>
-          <p:cNvPr id="3" name="Espace réservé du texte 2"/>
-          <p:cNvSpPr>
-            <a:spLocks noGrp="1"/>
-          </p:cNvSpPr>
-          <p:nvPr>
-            <p:ph type="body" idx="1"/>
-          </p:nvPr>
-        </p:nvSpPr>
-        <p:spPr/>
-        <p:txBody>
-          <a:bodyPr/>
-          <a:lstStyle/>
-          <a:p>
-            <a:r>
-              <a:rPr lang="fr-FR" dirty="0" smtClean="0"/>
-              <a:t>ONLINE </a:t>
-            </a:r>
-            <a:r>
-              <a:rPr lang="fr-FR" dirty="0" err="1" smtClean="0"/>
-              <a:t>TOols</a:t>
-            </a:r>
-            <a:endParaRPr lang="fr-FR" dirty="0"/>
-          </a:p>
-        </p:txBody>
-      </p:sp>
-      <p:sp>
-        <p:nvSpPr>
-          <p:cNvPr id="4" name="Espace réservé du contenu 3"/>
-          <p:cNvSpPr>
-            <a:spLocks noGrp="1"/>
-          </p:cNvSpPr>
-          <p:nvPr>
-            <p:ph sz="half" idx="2"/>
-          </p:nvPr>
-        </p:nvSpPr>
-        <p:spPr/>
-        <p:txBody>
-          <a:bodyPr/>
-          <a:lstStyle/>
-          <a:p>
-            <a:pPr lvl="1"/>
-            <a:r>
-              <a:rPr lang="en-US" dirty="0"/>
-              <a:t>GitHub</a:t>
-            </a:r>
-            <a:endParaRPr lang="fr-FR" dirty="0"/>
-          </a:p>
-          <a:p>
-            <a:pPr lvl="1"/>
-            <a:r>
-              <a:rPr lang="en-US" dirty="0" err="1" smtClean="0"/>
-              <a:t>Teambition</a:t>
-            </a:r>
-            <a:endParaRPr lang="fr-FR" dirty="0"/>
-          </a:p>
-        </p:txBody>
-      </p:sp>
-      <p:sp>
-        <p:nvSpPr>
-          <p:cNvPr id="5" name="Espace réservé du texte 4"/>
-          <p:cNvSpPr>
-            <a:spLocks noGrp="1"/>
-          </p:cNvSpPr>
-          <p:nvPr>
-            <p:ph type="body" sz="quarter" idx="3"/>
-          </p:nvPr>
-        </p:nvSpPr>
-        <p:spPr/>
-        <p:txBody>
-          <a:bodyPr/>
-          <a:lstStyle/>
-          <a:p>
-            <a:r>
-              <a:rPr lang="fr-FR" dirty="0" smtClean="0"/>
-              <a:t>SOFTWARES</a:t>
-            </a:r>
-            <a:endParaRPr lang="fr-FR" dirty="0"/>
-          </a:p>
-        </p:txBody>
-      </p:sp>
-      <p:sp>
-        <p:nvSpPr>
-          <p:cNvPr id="6" name="Espace réservé du contenu 5"/>
-          <p:cNvSpPr>
-            <a:spLocks noGrp="1"/>
-          </p:cNvSpPr>
-          <p:nvPr>
-            <p:ph sz="quarter" idx="4"/>
-          </p:nvPr>
-        </p:nvSpPr>
-        <p:spPr/>
-        <p:txBody>
-          <a:bodyPr/>
-          <a:lstStyle/>
-          <a:p>
-            <a:pPr lvl="1"/>
-            <a:r>
-              <a:rPr lang="en-US" dirty="0"/>
-              <a:t>MS Office</a:t>
-            </a:r>
-            <a:endParaRPr lang="fr-FR" dirty="0"/>
-          </a:p>
-          <a:p>
-            <a:pPr lvl="1"/>
-            <a:r>
-              <a:rPr lang="en-US" dirty="0"/>
-              <a:t>Atom</a:t>
-            </a:r>
-            <a:endParaRPr lang="fr-FR" dirty="0"/>
-          </a:p>
-          <a:p>
-            <a:pPr lvl="1"/>
-            <a:r>
-              <a:rPr lang="en-US" dirty="0" err="1" smtClean="0"/>
-              <a:t>Citavi</a:t>
-            </a:r>
-            <a:endParaRPr lang="fr-FR" dirty="0"/>
-          </a:p>
-        </p:txBody>
-      </p:sp>
-      <p:sp>
-        <p:nvSpPr>
-          <p:cNvPr id="7" name="Espace réservé du pied de page 6"/>
+          <p:cNvPr id="4" name="Espace réservé du pied de page 3"/>
           <p:cNvSpPr>
             <a:spLocks noGrp="1"/>
           </p:cNvSpPr>
@@ -15707,7 +13630,7 @@
       </p:sp>
       <p:sp>
         <p:nvSpPr>
-          <p:cNvPr id="8" name="Espace réservé du numéro de diapositive 7"/>
+          <p:cNvPr id="5" name="Espace réservé du numéro de diapositive 4"/>
           <p:cNvSpPr>
             <a:spLocks noGrp="1"/>
           </p:cNvSpPr>
@@ -15728,10 +13651,96 @@
           </a:p>
         </p:txBody>
       </p:sp>
+      <p:pic>
+        <p:nvPicPr>
+          <p:cNvPr id="6" name="Picture 462"/>
+          <p:cNvPicPr>
+            <a:picLocks noGrp="1"/>
+          </p:cNvPicPr>
+          <p:nvPr>
+            <p:ph idx="1"/>
+          </p:nvPr>
+        </p:nvPicPr>
+        <p:blipFill>
+          <a:blip r:embed="rId2"/>
+          <a:stretch>
+            <a:fillRect/>
+          </a:stretch>
+        </p:blipFill>
+        <p:spPr>
+          <a:xfrm>
+            <a:off x="1096963" y="2881122"/>
+            <a:ext cx="10058400" cy="1953006"/>
+          </a:xfrm>
+          <a:prstGeom prst="rect">
+            <a:avLst/>
+          </a:prstGeom>
+          <a:ln>
+            <a:solidFill>
+              <a:schemeClr val="accent4"/>
+            </a:solidFill>
+          </a:ln>
+        </p:spPr>
+      </p:pic>
+      <p:sp>
+        <p:nvSpPr>
+          <p:cNvPr id="3" name="ZoneTexte 2"/>
+          <p:cNvSpPr txBox="1"/>
+          <p:nvPr/>
+        </p:nvSpPr>
+        <p:spPr>
+          <a:xfrm>
+            <a:off x="1096963" y="4834128"/>
+            <a:ext cx="10058400" cy="369332"/>
+          </a:xfrm>
+          <a:prstGeom prst="rect">
+            <a:avLst/>
+          </a:prstGeom>
+          <a:noFill/>
+        </p:spPr>
+        <p:txBody>
+          <a:bodyPr wrap="square" rtlCol="0">
+            <a:spAutoFit/>
+          </a:bodyPr>
+          <a:lstStyle/>
+          <a:p>
+            <a:pPr algn="ctr"/>
+            <a:r>
+              <a:rPr lang="en-GB" i="1" dirty="0">
+                <a:solidFill>
+                  <a:schemeClr val="accent5"/>
+                </a:solidFill>
+              </a:rPr>
+              <a:t>Contributions to GitHub Repository </a:t>
+            </a:r>
+            <a:r>
+              <a:rPr lang="en-GB" i="1" dirty="0" err="1">
+                <a:solidFill>
+                  <a:schemeClr val="accent5"/>
+                </a:solidFill>
+              </a:rPr>
+              <a:t>BambuGMS</a:t>
+            </a:r>
+            <a:r>
+              <a:rPr lang="en-GB" i="1" dirty="0">
+                <a:solidFill>
+                  <a:schemeClr val="accent5"/>
+                </a:solidFill>
+              </a:rPr>
+              <a:t>/Industry-Analysis-Report from 15.03.2015-14.06.2015</a:t>
+            </a:r>
+            <a:endParaRPr lang="fr-FR" i="1" dirty="0">
+              <a:solidFill>
+                <a:schemeClr val="accent5"/>
+              </a:solidFill>
+            </a:endParaRPr>
+          </a:p>
+        </p:txBody>
+      </p:sp>
     </p:spTree>
     <p:extLst>
       <p:ext uri="{BB962C8B-B14F-4D97-AF65-F5344CB8AC3E}">
-        <p14:creationId xmlns:p14="http://schemas.microsoft.com/office/powerpoint/2010/main" val="80300042"/>
+        <p14:creationId xmlns:p14="http://schemas.microsoft.com/office/powerpoint/2010/main" val="2466803531"/>
       </p:ext>
     </p:extLst>
   </p:cSld>
@@ -15760,12 +13769,38 @@
       </p:grpSpPr>
       <p:sp>
         <p:nvSpPr>
-          <p:cNvPr id="4" name="Title 3"/>
+          <p:cNvPr id="2" name="Title 1"/>
           <p:cNvSpPr>
             <a:spLocks noGrp="1"/>
           </p:cNvSpPr>
           <p:nvPr>
-            <p:ph type="title"/>
+            <p:ph type="ctrTitle"/>
+          </p:nvPr>
+        </p:nvSpPr>
+        <p:spPr/>
+        <p:txBody>
+          <a:bodyPr>
+            <a:normAutofit/>
+          </a:bodyPr>
+          <a:lstStyle/>
+          <a:p>
+            <a:pPr algn="ctr"/>
+            <a:r>
+              <a:rPr lang="en-US" sz="6000" i="1" dirty="0" smtClean="0"/>
+              <a:t>THANK YOU FOR YOUR ATTENTION!</a:t>
+            </a:r>
+            <a:endParaRPr lang="en-US" sz="6000" i="1" dirty="0"/>
+          </a:p>
+        </p:txBody>
+      </p:sp>
+      <p:sp>
+        <p:nvSpPr>
+          <p:cNvPr id="3" name="Subtitle 2"/>
+          <p:cNvSpPr>
+            <a:spLocks noGrp="1"/>
+          </p:cNvSpPr>
+          <p:nvPr>
+            <p:ph type="subTitle" idx="1"/>
           </p:nvPr>
         </p:nvSpPr>
         <p:spPr/>
@@ -15773,9 +13808,10 @@
           <a:bodyPr/>
           <a:lstStyle/>
           <a:p>
+            <a:pPr algn="ctr"/>
             <a:r>
               <a:rPr lang="en-US" dirty="0" smtClean="0"/>
-              <a:t>List of Variables </a:t>
+              <a:t>Feel free to ask questions if you have some.</a:t>
             </a:r>
             <a:endParaRPr lang="en-US" dirty="0"/>
           </a:p>
@@ -15783,30 +13819,61 @@
       </p:sp>
       <p:sp>
         <p:nvSpPr>
-          <p:cNvPr id="5" name="Text Placeholder 4"/>
+          <p:cNvPr id="4" name="Rectangle 3"/>
           <p:cNvSpPr>
-            <a:spLocks noGrp="1"/>
+            <a:spLocks noChangeAspect="1"/>
           </p:cNvSpPr>
-          <p:nvPr>
-            <p:ph type="body" idx="1"/>
-          </p:nvPr>
+          <p:nvPr/>
         </p:nvSpPr>
-        <p:spPr/>
+        <p:spPr>
+          <a:xfrm>
+            <a:off x="1407474" y="-288109"/>
+            <a:ext cx="9601301" cy="4778518"/>
+          </a:xfrm>
+          <a:prstGeom prst="rect">
+            <a:avLst/>
+          </a:prstGeom>
+          <a:blipFill dpi="0" rotWithShape="1">
+            <a:blip r:embed="rId2">
+              <a:alphaModFix amt="5000"/>
+            </a:blip>
+            <a:srcRect/>
+            <a:stretch>
+              <a:fillRect/>
+            </a:stretch>
+          </a:blipFill>
+          <a:ln>
+            <a:noFill/>
+          </a:ln>
+        </p:spPr>
+        <p:style>
+          <a:lnRef idx="2">
+            <a:schemeClr val="accent1">
+              <a:shade val="50000"/>
+            </a:schemeClr>
+          </a:lnRef>
+          <a:fillRef idx="1">
+            <a:schemeClr val="accent1"/>
+          </a:fillRef>
+          <a:effectRef idx="0">
+            <a:schemeClr val="accent1"/>
+          </a:effectRef>
+          <a:fontRef idx="minor">
+            <a:schemeClr val="lt1"/>
+          </a:fontRef>
+        </p:style>
         <p:txBody>
-          <a:bodyPr/>
+          <a:bodyPr rtlCol="0" anchor="ctr"/>
           <a:lstStyle/>
           <a:p>
-            <a:r>
-              <a:rPr lang="en-US" dirty="0" smtClean="0"/>
-              <a:t>In accordance with 3T- MODEL</a:t>
-            </a:r>
-            <a:endParaRPr lang="en-US" dirty="0"/>
+            <a:pPr algn="ctr"/>
+            <a:endParaRPr lang="de-DE"/>
           </a:p>
         </p:txBody>
       </p:sp>
       <p:sp>
         <p:nvSpPr>
-          <p:cNvPr id="2" name="Espace réservé du pied de page 1"/>
+          <p:cNvPr id="5" name="Espace réservé du pied de page 4"/>
           <p:cNvSpPr>
             <a:spLocks noGrp="1"/>
           </p:cNvSpPr>
@@ -15820,16 +13887,20 @@
           <a:lstStyle/>
           <a:p>
             <a:r>
-              <a:rPr lang="fr-FR" smtClean="0"/>
-              <a:t>Banmbu - 20/05/2015</a:t>
+              <a:rPr lang="fr-FR" dirty="0" err="1" smtClean="0"/>
+              <a:t>Bambu</a:t>
             </a:r>
-            <a:endParaRPr lang="fr-FR"/>
+            <a:r>
+              <a:rPr lang="fr-FR" dirty="0" smtClean="0"/>
+              <a:t> - 17/06/2015</a:t>
+            </a:r>
+            <a:endParaRPr lang="fr-FR" dirty="0"/>
           </a:p>
         </p:txBody>
       </p:sp>
       <p:sp>
         <p:nvSpPr>
-          <p:cNvPr id="3" name="Espace réservé du numéro de diapositive 2"/>
+          <p:cNvPr id="6" name="Espace réservé du numéro de diapositive 5"/>
           <p:cNvSpPr>
             <a:spLocks noGrp="1"/>
           </p:cNvSpPr>
@@ -15844,1278 +13915,17 @@
           <a:p>
             <a:fld id="{D376626B-8044-4126-A03C-8C0AE257EC41}" type="slidenum">
               <a:rPr lang="fr-FR" smtClean="0"/>
+              <a:pPr/>
               <a:t>7</a:t>
             </a:fld>
-            <a:endParaRPr lang="fr-FR"/>
-          </a:p>
-        </p:txBody>
-      </p:sp>
-      <p:pic>
-        <p:nvPicPr>
-          <p:cNvPr id="6" name="Image 5"/>
-          <p:cNvPicPr>
-            <a:picLocks noChangeAspect="1"/>
-          </p:cNvPicPr>
-          <p:nvPr/>
-        </p:nvPicPr>
-        <p:blipFill>
-          <a:blip r:embed="rId2">
-            <a:duotone>
-              <a:schemeClr val="accent4">
-                <a:shade val="45000"/>
-                <a:satMod val="135000"/>
-              </a:schemeClr>
-              <a:prstClr val="white"/>
-            </a:duotone>
-            <a:extLst>
-              <a:ext uri="{28A0092B-C50C-407E-A947-70E740481C1C}">
-                <a14:useLocalDpi xmlns:a14="http://schemas.microsoft.com/office/drawing/2010/main" val="0"/>
-              </a:ext>
-            </a:extLst>
-          </a:blip>
-          <a:stretch>
-            <a:fillRect/>
-          </a:stretch>
-        </p:blipFill>
-        <p:spPr>
-          <a:xfrm>
-            <a:off x="8401493" y="505460"/>
-            <a:ext cx="2754187" cy="3947668"/>
-          </a:xfrm>
-          <a:prstGeom prst="rect">
-            <a:avLst/>
-          </a:prstGeom>
-          <a:noFill/>
-        </p:spPr>
-      </p:pic>
-    </p:spTree>
-    <p:extLst>
-      <p:ext uri="{BB962C8B-B14F-4D97-AF65-F5344CB8AC3E}">
-        <p14:creationId xmlns:p14="http://schemas.microsoft.com/office/powerpoint/2010/main" val="2079680690"/>
-      </p:ext>
-    </p:extLst>
-  </p:cSld>
-  <p:clrMapOvr>
-    <a:masterClrMapping/>
-  </p:clrMapOvr>
-  <p:timing>
-    <p:tnLst>
-      <p:par>
-        <p:cTn id="1" dur="indefinite" restart="never" nodeType="tmRoot"/>
-      </p:par>
-    </p:tnLst>
-  </p:timing>
-</p:sld>
-</file>
-
-<file path=ppt/slides/slide8.xml><?xml version="1.0" encoding="utf-8"?>
-<p:sld xmlns:a="http://schemas.openxmlformats.org/drawingml/2006/main" xmlns:r="http://schemas.openxmlformats.org/officeDocument/2006/relationships" xmlns:p="http://schemas.openxmlformats.org/presentationml/2006/main">
-  <p:cSld>
-    <p:spTree>
-      <p:nvGrpSpPr>
-        <p:cNvPr id="1" name=""/>
-        <p:cNvGrpSpPr/>
-        <p:nvPr/>
-      </p:nvGrpSpPr>
-      <p:grpSpPr>
-        <a:xfrm>
-          <a:off x="0" y="0"/>
-          <a:ext cx="0" cy="0"/>
-          <a:chOff x="0" y="0"/>
-          <a:chExt cx="0" cy="0"/>
-        </a:xfrm>
-      </p:grpSpPr>
-      <p:sp>
-        <p:nvSpPr>
-          <p:cNvPr id="2" name="Title 1"/>
-          <p:cNvSpPr>
-            <a:spLocks noGrp="1"/>
-          </p:cNvSpPr>
-          <p:nvPr>
-            <p:ph type="title"/>
-          </p:nvPr>
-        </p:nvSpPr>
-        <p:spPr/>
-        <p:txBody>
-          <a:bodyPr/>
-          <a:lstStyle/>
-          <a:p>
-            <a:r>
-              <a:rPr lang="en-US" dirty="0" smtClean="0"/>
-              <a:t>List of Variables</a:t>
-            </a:r>
-            <a:endParaRPr lang="en-US" dirty="0"/>
-          </a:p>
-        </p:txBody>
-      </p:sp>
-      <p:graphicFrame>
-        <p:nvGraphicFramePr>
-          <p:cNvPr id="4" name="Table 3"/>
-          <p:cNvGraphicFramePr>
-            <a:graphicFrameLocks noGrp="1"/>
-          </p:cNvGraphicFramePr>
-          <p:nvPr>
-            <p:extLst>
-              <p:ext uri="{D42A27DB-BD31-4B8C-83A1-F6EECF244321}">
-                <p14:modId xmlns:p14="http://schemas.microsoft.com/office/powerpoint/2010/main" val="1036280830"/>
-              </p:ext>
-            </p:extLst>
-          </p:nvPr>
-        </p:nvGraphicFramePr>
-        <p:xfrm>
-          <a:off x="1346200" y="1964266"/>
-          <a:ext cx="9809480" cy="4129024"/>
-        </p:xfrm>
-        <a:graphic>
-          <a:graphicData uri="http://schemas.openxmlformats.org/drawingml/2006/table">
-            <a:tbl>
-              <a:tblPr firstRow="1" bandRow="1">
-                <a:tableStyleId>{5C22544A-7EE6-4342-B048-85BDC9FD1C3A}</a:tableStyleId>
-              </a:tblPr>
-              <a:tblGrid>
-                <a:gridCol w="3577246"/>
-                <a:gridCol w="3465457"/>
-                <a:gridCol w="2766777"/>
-              </a:tblGrid>
-              <a:tr h="370840">
-                <a:tc>
-                  <a:txBody>
-                    <a:bodyPr/>
-                    <a:lstStyle/>
-                    <a:p>
-                      <a:pPr marL="0" indent="0" algn="ctr" defTabSz="914400" rtl="0" eaLnBrk="1" latinLnBrk="0" hangingPunct="1">
-                        <a:lnSpc>
-                          <a:spcPct val="90000"/>
-                        </a:lnSpc>
-                        <a:spcBef>
-                          <a:spcPts val="1200"/>
-                        </a:spcBef>
-                        <a:spcAft>
-                          <a:spcPts val="200"/>
-                        </a:spcAft>
-                        <a:buClr>
-                          <a:schemeClr val="accent1"/>
-                        </a:buClr>
-                        <a:buSzPct val="100000"/>
-                        <a:buFont typeface="Calibri" panose="020F0502020204030204" pitchFamily="34" charset="0"/>
-                        <a:buNone/>
-                      </a:pPr>
-                      <a:r>
-                        <a:rPr lang="en-US" sz="2400" b="1" kern="1200" cap="all" spc="200" baseline="0" dirty="0" smtClean="0">
-                          <a:solidFill>
-                            <a:schemeClr val="tx2"/>
-                          </a:solidFill>
-                          <a:latin typeface="+mj-lt"/>
-                          <a:ea typeface="+mn-ea"/>
-                          <a:cs typeface="+mn-cs"/>
-                        </a:rPr>
-                        <a:t>Technology</a:t>
-                      </a:r>
-                      <a:endParaRPr lang="en-US" sz="2400" b="1" kern="1200" cap="all" spc="200" baseline="0" dirty="0">
-                        <a:solidFill>
-                          <a:schemeClr val="tx2"/>
-                        </a:solidFill>
-                        <a:latin typeface="+mj-lt"/>
-                        <a:ea typeface="+mn-ea"/>
-                        <a:cs typeface="+mn-cs"/>
-                      </a:endParaRPr>
-                    </a:p>
-                  </a:txBody>
-                  <a:tcPr>
-                    <a:lnT w="12700" cap="flat" cmpd="sng" algn="ctr">
-                      <a:solidFill>
-                        <a:schemeClr val="tx1"/>
-                      </a:solidFill>
-                      <a:prstDash val="solid"/>
-                      <a:round/>
-                      <a:headEnd type="none" w="med" len="med"/>
-                      <a:tailEnd type="none" w="med" len="med"/>
-                    </a:lnT>
-                    <a:lnB w="12700" cap="flat" cmpd="sng" algn="ctr">
-                      <a:solidFill>
-                        <a:schemeClr val="tx1"/>
-                      </a:solidFill>
-                      <a:prstDash val="solid"/>
-                      <a:round/>
-                      <a:headEnd type="none" w="med" len="med"/>
-                      <a:tailEnd type="none" w="med" len="med"/>
-                    </a:lnB>
-                    <a:solidFill>
-                      <a:schemeClr val="bg1"/>
-                    </a:solidFill>
-                  </a:tcPr>
-                </a:tc>
-                <a:tc>
-                  <a:txBody>
-                    <a:bodyPr/>
-                    <a:lstStyle/>
-                    <a:p>
-                      <a:pPr marL="0" indent="0" algn="ctr" defTabSz="914400" rtl="0" eaLnBrk="1" latinLnBrk="0" hangingPunct="1">
-                        <a:lnSpc>
-                          <a:spcPct val="90000"/>
-                        </a:lnSpc>
-                        <a:spcBef>
-                          <a:spcPts val="1200"/>
-                        </a:spcBef>
-                        <a:spcAft>
-                          <a:spcPts val="200"/>
-                        </a:spcAft>
-                        <a:buClr>
-                          <a:schemeClr val="accent1"/>
-                        </a:buClr>
-                        <a:buSzPct val="100000"/>
-                        <a:buFont typeface="Calibri" panose="020F0502020204030204" pitchFamily="34" charset="0"/>
-                        <a:buNone/>
-                      </a:pPr>
-                      <a:r>
-                        <a:rPr lang="en-US" sz="2400" b="1" kern="1200" cap="all" spc="200" baseline="0" dirty="0" smtClean="0">
-                          <a:solidFill>
-                            <a:schemeClr val="tx2"/>
-                          </a:solidFill>
-                          <a:latin typeface="+mj-lt"/>
-                          <a:ea typeface="+mn-ea"/>
-                          <a:cs typeface="+mn-cs"/>
-                        </a:rPr>
-                        <a:t>Tolerance</a:t>
-                      </a:r>
-                      <a:endParaRPr lang="en-US" sz="2400" b="1" kern="1200" cap="all" spc="200" baseline="0" dirty="0">
-                        <a:solidFill>
-                          <a:schemeClr val="tx2"/>
-                        </a:solidFill>
-                        <a:latin typeface="+mj-lt"/>
-                        <a:ea typeface="+mn-ea"/>
-                        <a:cs typeface="+mn-cs"/>
-                      </a:endParaRPr>
-                    </a:p>
-                  </a:txBody>
-                  <a:tcPr>
-                    <a:lnT w="12700" cap="flat" cmpd="sng" algn="ctr">
-                      <a:solidFill>
-                        <a:schemeClr val="tx1"/>
-                      </a:solidFill>
-                      <a:prstDash val="solid"/>
-                      <a:round/>
-                      <a:headEnd type="none" w="med" len="med"/>
-                      <a:tailEnd type="none" w="med" len="med"/>
-                    </a:lnT>
-                    <a:lnB w="12700" cap="flat" cmpd="sng" algn="ctr">
-                      <a:solidFill>
-                        <a:schemeClr val="tx1"/>
-                      </a:solidFill>
-                      <a:prstDash val="solid"/>
-                      <a:round/>
-                      <a:headEnd type="none" w="med" len="med"/>
-                      <a:tailEnd type="none" w="med" len="med"/>
-                    </a:lnB>
-                    <a:solidFill>
-                      <a:schemeClr val="bg1"/>
-                    </a:solidFill>
-                  </a:tcPr>
-                </a:tc>
-                <a:tc>
-                  <a:txBody>
-                    <a:bodyPr/>
-                    <a:lstStyle/>
-                    <a:p>
-                      <a:pPr marL="0" indent="0" algn="ctr" defTabSz="914400" rtl="0" eaLnBrk="1" latinLnBrk="0" hangingPunct="1">
-                        <a:lnSpc>
-                          <a:spcPct val="90000"/>
-                        </a:lnSpc>
-                        <a:spcBef>
-                          <a:spcPts val="1200"/>
-                        </a:spcBef>
-                        <a:spcAft>
-                          <a:spcPts val="200"/>
-                        </a:spcAft>
-                        <a:buClr>
-                          <a:schemeClr val="accent1"/>
-                        </a:buClr>
-                        <a:buSzPct val="100000"/>
-                        <a:buFont typeface="Calibri" panose="020F0502020204030204" pitchFamily="34" charset="0"/>
-                        <a:buNone/>
-                      </a:pPr>
-                      <a:r>
-                        <a:rPr lang="en-US" sz="2400" b="1" kern="1200" cap="all" spc="200" baseline="0" dirty="0" smtClean="0">
-                          <a:solidFill>
-                            <a:schemeClr val="tx2"/>
-                          </a:solidFill>
-                          <a:latin typeface="+mj-lt"/>
-                          <a:ea typeface="+mn-ea"/>
-                          <a:cs typeface="+mn-cs"/>
-                        </a:rPr>
-                        <a:t>Talent</a:t>
-                      </a:r>
-                      <a:endParaRPr lang="en-US" sz="2400" b="1" kern="1200" cap="all" spc="200" baseline="0" dirty="0">
-                        <a:solidFill>
-                          <a:schemeClr val="tx2"/>
-                        </a:solidFill>
-                        <a:latin typeface="+mj-lt"/>
-                        <a:ea typeface="+mn-ea"/>
-                        <a:cs typeface="+mn-cs"/>
-                      </a:endParaRPr>
-                    </a:p>
-                  </a:txBody>
-                  <a:tcPr>
-                    <a:lnT w="12700" cap="flat" cmpd="sng" algn="ctr">
-                      <a:solidFill>
-                        <a:schemeClr val="tx1"/>
-                      </a:solidFill>
-                      <a:prstDash val="solid"/>
-                      <a:round/>
-                      <a:headEnd type="none" w="med" len="med"/>
-                      <a:tailEnd type="none" w="med" len="med"/>
-                    </a:lnT>
-                    <a:lnB w="12700" cap="flat" cmpd="sng" algn="ctr">
-                      <a:solidFill>
-                        <a:schemeClr val="tx1"/>
-                      </a:solidFill>
-                      <a:prstDash val="solid"/>
-                      <a:round/>
-                      <a:headEnd type="none" w="med" len="med"/>
-                      <a:tailEnd type="none" w="med" len="med"/>
-                    </a:lnB>
-                    <a:solidFill>
-                      <a:schemeClr val="bg1"/>
-                    </a:solidFill>
-                  </a:tcPr>
-                </a:tc>
-              </a:tr>
-              <a:tr h="370840">
-                <a:tc>
-                  <a:txBody>
-                    <a:bodyPr/>
-                    <a:lstStyle/>
-                    <a:p>
-                      <a:pPr marL="0" indent="0">
-                        <a:buFont typeface="Arial" panose="020B0604020202020204" pitchFamily="34" charset="0"/>
-                        <a:buNone/>
-                      </a:pPr>
-                      <a:r>
-                        <a:rPr lang="en-US" dirty="0" smtClean="0"/>
-                        <a:t>Fuel</a:t>
-                      </a:r>
-                      <a:r>
-                        <a:rPr lang="en-US" baseline="0" dirty="0" smtClean="0"/>
-                        <a:t> Types</a:t>
-                      </a:r>
-                      <a:endParaRPr lang="en-US" dirty="0"/>
-                    </a:p>
-                  </a:txBody>
-                  <a:tcPr>
-                    <a:lnT w="12700" cap="flat" cmpd="sng" algn="ctr">
-                      <a:solidFill>
-                        <a:schemeClr val="tx1"/>
-                      </a:solidFill>
-                      <a:prstDash val="solid"/>
-                      <a:round/>
-                      <a:headEnd type="none" w="med" len="med"/>
-                      <a:tailEnd type="none" w="med" len="med"/>
-                    </a:lnT>
-                    <a:solidFill>
-                      <a:schemeClr val="bg1"/>
-                    </a:solidFill>
-                  </a:tcPr>
-                </a:tc>
-                <a:tc>
-                  <a:txBody>
-                    <a:bodyPr/>
-                    <a:lstStyle/>
-                    <a:p>
-                      <a:pPr marL="0" indent="0">
-                        <a:buFont typeface="Arial" panose="020B0604020202020204" pitchFamily="34" charset="0"/>
-                        <a:buNone/>
-                      </a:pPr>
-                      <a:r>
-                        <a:rPr lang="en-US" dirty="0" smtClean="0"/>
-                        <a:t>Implementation</a:t>
-                      </a:r>
-                      <a:endParaRPr lang="en-US" dirty="0"/>
-                    </a:p>
-                  </a:txBody>
-                  <a:tcPr>
-                    <a:lnT w="12700" cap="flat" cmpd="sng" algn="ctr">
-                      <a:solidFill>
-                        <a:schemeClr val="tx1"/>
-                      </a:solidFill>
-                      <a:prstDash val="solid"/>
-                      <a:round/>
-                      <a:headEnd type="none" w="med" len="med"/>
-                      <a:tailEnd type="none" w="med" len="med"/>
-                    </a:lnT>
-                    <a:solidFill>
-                      <a:schemeClr val="bg1"/>
-                    </a:solidFill>
-                  </a:tcPr>
-                </a:tc>
-                <a:tc>
-                  <a:txBody>
-                    <a:bodyPr/>
-                    <a:lstStyle/>
-                    <a:p>
-                      <a:pPr marL="0" indent="0">
-                        <a:buFont typeface="Arial" panose="020B0604020202020204" pitchFamily="34" charset="0"/>
-                        <a:buNone/>
-                      </a:pPr>
-                      <a:r>
-                        <a:rPr lang="en-US" b="1" dirty="0" smtClean="0"/>
-                        <a:t>Governmental</a:t>
-                      </a:r>
-                      <a:r>
-                        <a:rPr lang="en-US" b="1" baseline="0" dirty="0" smtClean="0"/>
-                        <a:t> Incentives</a:t>
-                      </a:r>
-                      <a:endParaRPr lang="en-US" b="1" dirty="0"/>
-                    </a:p>
-                  </a:txBody>
-                  <a:tcPr>
-                    <a:lnT w="12700" cap="flat" cmpd="sng" algn="ctr">
-                      <a:solidFill>
-                        <a:schemeClr val="tx1"/>
-                      </a:solidFill>
-                      <a:prstDash val="solid"/>
-                      <a:round/>
-                      <a:headEnd type="none" w="med" len="med"/>
-                      <a:tailEnd type="none" w="med" len="med"/>
-                    </a:lnT>
-                    <a:solidFill>
-                      <a:schemeClr val="bg1"/>
-                    </a:solidFill>
-                  </a:tcPr>
-                </a:tc>
-              </a:tr>
-              <a:tr h="370840">
-                <a:tc>
-                  <a:txBody>
-                    <a:bodyPr/>
-                    <a:lstStyle/>
-                    <a:p>
-                      <a:pPr marL="0" indent="0">
-                        <a:buFont typeface="Arial" panose="020B0604020202020204" pitchFamily="34" charset="0"/>
-                        <a:buNone/>
-                      </a:pPr>
-                      <a:r>
-                        <a:rPr lang="en-US" b="1" dirty="0" smtClean="0"/>
-                        <a:t>Power Output</a:t>
-                      </a:r>
-                      <a:endParaRPr lang="en-US" b="1" dirty="0"/>
-                    </a:p>
-                  </a:txBody>
-                  <a:tcPr>
-                    <a:solidFill>
-                      <a:schemeClr val="bg1"/>
-                    </a:solidFill>
-                  </a:tcPr>
-                </a:tc>
-                <a:tc>
-                  <a:txBody>
-                    <a:bodyPr/>
-                    <a:lstStyle/>
-                    <a:p>
-                      <a:pPr marL="0" indent="0">
-                        <a:buFont typeface="Arial" panose="020B0604020202020204" pitchFamily="34" charset="0"/>
-                        <a:buNone/>
-                      </a:pPr>
-                      <a:r>
-                        <a:rPr lang="en-US" b="1" dirty="0" smtClean="0"/>
-                        <a:t>Region</a:t>
-                      </a:r>
-                      <a:endParaRPr lang="en-US" b="1" dirty="0"/>
-                    </a:p>
-                  </a:txBody>
-                  <a:tcPr>
-                    <a:solidFill>
-                      <a:schemeClr val="bg1"/>
-                    </a:solidFill>
-                  </a:tcPr>
-                </a:tc>
-                <a:tc>
-                  <a:txBody>
-                    <a:bodyPr/>
-                    <a:lstStyle/>
-                    <a:p>
-                      <a:pPr marL="0" indent="0">
-                        <a:buFont typeface="Arial" panose="020B0604020202020204" pitchFamily="34" charset="0"/>
-                        <a:buNone/>
-                      </a:pPr>
-                      <a:r>
-                        <a:rPr lang="en-US" b="1" dirty="0" smtClean="0"/>
-                        <a:t>Access to Institutions</a:t>
-                      </a:r>
-                      <a:endParaRPr lang="en-US" b="1" dirty="0"/>
-                    </a:p>
-                  </a:txBody>
-                  <a:tcPr>
-                    <a:solidFill>
-                      <a:schemeClr val="bg1"/>
-                    </a:solidFill>
-                  </a:tcPr>
-                </a:tc>
-              </a:tr>
-              <a:tr h="370840">
-                <a:tc>
-                  <a:txBody>
-                    <a:bodyPr/>
-                    <a:lstStyle/>
-                    <a:p>
-                      <a:pPr marL="0" indent="0">
-                        <a:buFont typeface="Arial" panose="020B0604020202020204" pitchFamily="34" charset="0"/>
-                        <a:buNone/>
-                      </a:pPr>
-                      <a:r>
-                        <a:rPr lang="en-US" dirty="0" smtClean="0"/>
-                        <a:t>Efficiency</a:t>
-                      </a:r>
-                      <a:endParaRPr lang="en-US" dirty="0"/>
-                    </a:p>
-                  </a:txBody>
-                  <a:tcPr>
-                    <a:solidFill>
-                      <a:schemeClr val="bg1"/>
-                    </a:solidFill>
-                  </a:tcPr>
-                </a:tc>
-                <a:tc>
-                  <a:txBody>
-                    <a:bodyPr/>
-                    <a:lstStyle/>
-                    <a:p>
-                      <a:pPr marL="0" indent="0">
-                        <a:buFont typeface="Arial" panose="020B0604020202020204" pitchFamily="34" charset="0"/>
-                        <a:buNone/>
-                      </a:pPr>
-                      <a:r>
-                        <a:rPr lang="en-US" dirty="0" smtClean="0"/>
-                        <a:t>Safety</a:t>
-                      </a:r>
-                      <a:endParaRPr lang="en-US" dirty="0"/>
-                    </a:p>
-                  </a:txBody>
-                  <a:tcPr>
-                    <a:solidFill>
-                      <a:schemeClr val="bg1"/>
-                    </a:solidFill>
-                  </a:tcPr>
-                </a:tc>
-                <a:tc>
-                  <a:txBody>
-                    <a:bodyPr/>
-                    <a:lstStyle/>
-                    <a:p>
-                      <a:pPr marL="0" indent="0">
-                        <a:buFont typeface="Arial" panose="020B0604020202020204" pitchFamily="34" charset="0"/>
-                        <a:buNone/>
-                      </a:pPr>
-                      <a:r>
-                        <a:rPr lang="en-US" dirty="0" smtClean="0"/>
-                        <a:t>Military Interests</a:t>
-                      </a:r>
-                      <a:endParaRPr lang="en-US" dirty="0"/>
-                    </a:p>
-                  </a:txBody>
-                  <a:tcPr>
-                    <a:solidFill>
-                      <a:schemeClr val="bg1"/>
-                    </a:solidFill>
-                  </a:tcPr>
-                </a:tc>
-              </a:tr>
-              <a:tr h="370840">
-                <a:tc>
-                  <a:txBody>
-                    <a:bodyPr/>
-                    <a:lstStyle/>
-                    <a:p>
-                      <a:pPr marL="0" indent="0">
-                        <a:buFont typeface="Arial" panose="020B0604020202020204" pitchFamily="34" charset="0"/>
-                        <a:buNone/>
-                      </a:pPr>
-                      <a:r>
-                        <a:rPr lang="en-US" b="1" dirty="0" smtClean="0"/>
-                        <a:t>Applications</a:t>
-                      </a:r>
-                      <a:endParaRPr lang="en-US" b="1" dirty="0"/>
-                    </a:p>
-                  </a:txBody>
-                  <a:tcPr>
-                    <a:solidFill>
-                      <a:schemeClr val="bg1"/>
-                    </a:solidFill>
-                  </a:tcPr>
-                </a:tc>
-                <a:tc>
-                  <a:txBody>
-                    <a:bodyPr/>
-                    <a:lstStyle/>
-                    <a:p>
-                      <a:pPr marL="0" indent="0">
-                        <a:buFont typeface="Arial" panose="020B0604020202020204" pitchFamily="34" charset="0"/>
-                        <a:buNone/>
-                      </a:pPr>
-                      <a:r>
-                        <a:rPr lang="en-US" dirty="0" smtClean="0"/>
-                        <a:t>Distance per Fuel Load</a:t>
-                      </a:r>
-                      <a:endParaRPr lang="en-US" dirty="0"/>
-                    </a:p>
-                  </a:txBody>
-                  <a:tcPr>
-                    <a:solidFill>
-                      <a:schemeClr val="bg1"/>
-                    </a:solidFill>
-                  </a:tcPr>
-                </a:tc>
-                <a:tc>
-                  <a:txBody>
-                    <a:bodyPr/>
-                    <a:lstStyle/>
-                    <a:p>
-                      <a:pPr marL="0" indent="0">
-                        <a:buFont typeface="Arial" panose="020B0604020202020204" pitchFamily="34" charset="0"/>
-                        <a:buNone/>
-                      </a:pPr>
-                      <a:r>
-                        <a:rPr lang="en-US" dirty="0" smtClean="0"/>
-                        <a:t>R&amp;D Focus</a:t>
-                      </a:r>
-                      <a:endParaRPr lang="en-US" dirty="0"/>
-                    </a:p>
-                  </a:txBody>
-                  <a:tcPr>
-                    <a:solidFill>
-                      <a:schemeClr val="bg1"/>
-                    </a:solidFill>
-                  </a:tcPr>
-                </a:tc>
-              </a:tr>
-              <a:tr h="370840">
-                <a:tc>
-                  <a:txBody>
-                    <a:bodyPr/>
-                    <a:lstStyle/>
-                    <a:p>
-                      <a:pPr marL="0" indent="0">
-                        <a:buFont typeface="Arial" panose="020B0604020202020204" pitchFamily="34" charset="0"/>
-                        <a:buNone/>
-                      </a:pPr>
-                      <a:r>
-                        <a:rPr lang="en-US" dirty="0" smtClean="0"/>
-                        <a:t>Production Capacity</a:t>
-                      </a:r>
-                      <a:endParaRPr lang="en-US" dirty="0"/>
-                    </a:p>
-                  </a:txBody>
-                  <a:tcPr>
-                    <a:solidFill>
-                      <a:schemeClr val="bg1"/>
-                    </a:solidFill>
-                  </a:tcPr>
-                </a:tc>
-                <a:tc>
-                  <a:txBody>
-                    <a:bodyPr/>
-                    <a:lstStyle/>
-                    <a:p>
-                      <a:pPr marL="0" indent="0">
-                        <a:buFont typeface="Arial" panose="020B0604020202020204" pitchFamily="34" charset="0"/>
-                        <a:buNone/>
-                      </a:pPr>
-                      <a:r>
-                        <a:rPr lang="en-US" dirty="0" smtClean="0"/>
-                        <a:t>Price of Fuel</a:t>
-                      </a:r>
-                      <a:endParaRPr lang="en-US" dirty="0"/>
-                    </a:p>
-                  </a:txBody>
-                  <a:tcPr>
-                    <a:solidFill>
-                      <a:schemeClr val="bg1"/>
-                    </a:solidFill>
-                  </a:tcPr>
-                </a:tc>
-                <a:tc>
-                  <a:txBody>
-                    <a:bodyPr/>
-                    <a:lstStyle/>
-                    <a:p>
-                      <a:pPr marL="0" indent="0">
-                        <a:buFont typeface="Arial" panose="020B0604020202020204" pitchFamily="34" charset="0"/>
-                        <a:buNone/>
-                      </a:pPr>
-                      <a:r>
-                        <a:rPr lang="en-US" dirty="0" smtClean="0"/>
-                        <a:t>Salary</a:t>
-                      </a:r>
-                      <a:endParaRPr lang="en-US" dirty="0"/>
-                    </a:p>
-                  </a:txBody>
-                  <a:tcPr>
-                    <a:solidFill>
-                      <a:schemeClr val="bg1"/>
-                    </a:solidFill>
-                  </a:tcPr>
-                </a:tc>
-              </a:tr>
-              <a:tr h="370840">
-                <a:tc>
-                  <a:txBody>
-                    <a:bodyPr/>
-                    <a:lstStyle/>
-                    <a:p>
-                      <a:pPr marL="0" indent="0">
-                        <a:buFont typeface="Arial" panose="020B0604020202020204" pitchFamily="34" charset="0"/>
-                        <a:buNone/>
-                      </a:pPr>
-                      <a:r>
-                        <a:rPr lang="en-US" dirty="0" smtClean="0"/>
-                        <a:t>System Stability</a:t>
-                      </a:r>
-                      <a:endParaRPr lang="en-US" dirty="0"/>
-                    </a:p>
-                  </a:txBody>
-                  <a:tcPr>
-                    <a:solidFill>
-                      <a:schemeClr val="bg1"/>
-                    </a:solidFill>
-                  </a:tcPr>
-                </a:tc>
-                <a:tc>
-                  <a:txBody>
-                    <a:bodyPr/>
-                    <a:lstStyle/>
-                    <a:p>
-                      <a:pPr marL="0" indent="0">
-                        <a:buFont typeface="Arial" panose="020B0604020202020204" pitchFamily="34" charset="0"/>
-                        <a:buNone/>
-                      </a:pPr>
-                      <a:r>
-                        <a:rPr lang="en-US" dirty="0" smtClean="0"/>
-                        <a:t>Device Portability</a:t>
-                      </a:r>
-                      <a:endParaRPr lang="en-US" dirty="0"/>
-                    </a:p>
-                  </a:txBody>
-                  <a:tcPr>
-                    <a:solidFill>
-                      <a:schemeClr val="bg1"/>
-                    </a:solidFill>
-                  </a:tcPr>
-                </a:tc>
-                <a:tc>
-                  <a:txBody>
-                    <a:bodyPr/>
-                    <a:lstStyle/>
-                    <a:p>
-                      <a:pPr marL="0" indent="0">
-                        <a:buFont typeface="Arial" panose="020B0604020202020204" pitchFamily="34" charset="0"/>
-                        <a:buNone/>
-                      </a:pPr>
-                      <a:r>
-                        <a:rPr lang="en-US" b="1" dirty="0" smtClean="0"/>
-                        <a:t>Global Awareness</a:t>
-                      </a:r>
-                      <a:endParaRPr lang="en-US" b="1" dirty="0"/>
-                    </a:p>
-                  </a:txBody>
-                  <a:tcPr>
-                    <a:solidFill>
-                      <a:schemeClr val="bg1"/>
-                    </a:solidFill>
-                  </a:tcPr>
-                </a:tc>
-              </a:tr>
-              <a:tr h="370840">
-                <a:tc>
-                  <a:txBody>
-                    <a:bodyPr/>
-                    <a:lstStyle/>
-                    <a:p>
-                      <a:pPr marL="0" indent="0">
-                        <a:buFont typeface="Arial" panose="020B0604020202020204" pitchFamily="34" charset="0"/>
-                        <a:buNone/>
-                      </a:pPr>
-                      <a:r>
-                        <a:rPr lang="en-US" dirty="0" smtClean="0"/>
-                        <a:t>Operation and Maintenance</a:t>
-                      </a:r>
-                      <a:endParaRPr lang="en-US" dirty="0"/>
-                    </a:p>
-                  </a:txBody>
-                  <a:tcPr>
-                    <a:solidFill>
-                      <a:schemeClr val="bg1"/>
-                    </a:solidFill>
-                  </a:tcPr>
-                </a:tc>
-                <a:tc>
-                  <a:txBody>
-                    <a:bodyPr/>
-                    <a:lstStyle/>
-                    <a:p>
-                      <a:pPr marL="0" indent="0">
-                        <a:buFont typeface="Arial" panose="020B0604020202020204" pitchFamily="34" charset="0"/>
-                        <a:buNone/>
-                      </a:pPr>
-                      <a:r>
-                        <a:rPr lang="en-US" dirty="0" smtClean="0"/>
-                        <a:t>Supply</a:t>
-                      </a:r>
-                      <a:r>
-                        <a:rPr lang="en-US" baseline="0" dirty="0" smtClean="0"/>
-                        <a:t> Limit</a:t>
-                      </a:r>
-                      <a:endParaRPr lang="en-US" dirty="0"/>
-                    </a:p>
-                  </a:txBody>
-                  <a:tcPr>
-                    <a:solidFill>
-                      <a:schemeClr val="bg1"/>
-                    </a:solidFill>
-                  </a:tcPr>
-                </a:tc>
-                <a:tc>
-                  <a:txBody>
-                    <a:bodyPr/>
-                    <a:lstStyle/>
-                    <a:p>
-                      <a:pPr marL="0" indent="0">
-                        <a:buFont typeface="Arial" panose="020B0604020202020204" pitchFamily="34" charset="0"/>
-                        <a:buNone/>
-                      </a:pPr>
-                      <a:r>
-                        <a:rPr lang="en-US" dirty="0" smtClean="0"/>
-                        <a:t>Expertise</a:t>
-                      </a:r>
-                      <a:endParaRPr lang="en-US" dirty="0"/>
-                    </a:p>
-                  </a:txBody>
-                  <a:tcPr>
-                    <a:solidFill>
-                      <a:schemeClr val="bg1"/>
-                    </a:solidFill>
-                  </a:tcPr>
-                </a:tc>
-              </a:tr>
-              <a:tr h="370840">
-                <a:tc>
-                  <a:txBody>
-                    <a:bodyPr/>
-                    <a:lstStyle/>
-                    <a:p>
-                      <a:pPr marL="0" indent="0">
-                        <a:buFont typeface="Arial" panose="020B0604020202020204" pitchFamily="34" charset="0"/>
-                        <a:buNone/>
-                      </a:pPr>
-                      <a:r>
-                        <a:rPr lang="en-US" dirty="0" smtClean="0"/>
-                        <a:t>Distribution</a:t>
-                      </a:r>
-                      <a:r>
-                        <a:rPr lang="en-US" baseline="0" dirty="0" smtClean="0"/>
-                        <a:t> Energy Resources</a:t>
-                      </a:r>
-                      <a:endParaRPr lang="en-US" dirty="0"/>
-                    </a:p>
-                  </a:txBody>
-                  <a:tcPr>
-                    <a:solidFill>
-                      <a:schemeClr val="bg1"/>
-                    </a:solidFill>
-                  </a:tcPr>
-                </a:tc>
-                <a:tc>
-                  <a:txBody>
-                    <a:bodyPr/>
-                    <a:lstStyle/>
-                    <a:p>
-                      <a:pPr marL="0" indent="0">
-                        <a:buFont typeface="Arial" panose="020B0604020202020204" pitchFamily="34" charset="0"/>
-                        <a:buNone/>
-                      </a:pPr>
-                      <a:r>
-                        <a:rPr lang="en-US" b="1" dirty="0" smtClean="0"/>
-                        <a:t>Market</a:t>
-                      </a:r>
-                      <a:r>
-                        <a:rPr lang="en-US" b="1" baseline="0" dirty="0" smtClean="0"/>
-                        <a:t> Size</a:t>
-                      </a:r>
-                      <a:endParaRPr lang="en-US" b="1" dirty="0"/>
-                    </a:p>
-                  </a:txBody>
-                  <a:tcPr>
-                    <a:solidFill>
-                      <a:schemeClr val="bg1"/>
-                    </a:solidFill>
-                  </a:tcPr>
-                </a:tc>
-                <a:tc>
-                  <a:txBody>
-                    <a:bodyPr/>
-                    <a:lstStyle/>
-                    <a:p>
-                      <a:pPr marL="0" indent="0">
-                        <a:buFont typeface="Arial" panose="020B0604020202020204" pitchFamily="34" charset="0"/>
-                        <a:buNone/>
-                      </a:pPr>
-                      <a:r>
-                        <a:rPr lang="en-US" dirty="0" smtClean="0"/>
-                        <a:t>Environmental Exposure</a:t>
-                      </a:r>
-                      <a:endParaRPr lang="en-US" dirty="0"/>
-                    </a:p>
-                  </a:txBody>
-                  <a:tcPr>
-                    <a:solidFill>
-                      <a:schemeClr val="bg1"/>
-                    </a:solidFill>
-                  </a:tcPr>
-                </a:tc>
-              </a:tr>
-              <a:tr h="370840">
-                <a:tc>
-                  <a:txBody>
-                    <a:bodyPr/>
-                    <a:lstStyle/>
-                    <a:p>
-                      <a:pPr marL="0" indent="0">
-                        <a:buFont typeface="Arial" panose="020B0604020202020204" pitchFamily="34" charset="0"/>
-                        <a:buNone/>
-                      </a:pPr>
-                      <a:r>
-                        <a:rPr lang="en-US" dirty="0" smtClean="0"/>
-                        <a:t>Fuel Delivery Module</a:t>
-                      </a:r>
-                      <a:endParaRPr lang="en-US" dirty="0"/>
-                    </a:p>
-                  </a:txBody>
-                  <a:tcPr>
-                    <a:solidFill>
-                      <a:schemeClr val="bg1"/>
-                    </a:solidFill>
-                  </a:tcPr>
-                </a:tc>
-                <a:tc>
-                  <a:txBody>
-                    <a:bodyPr/>
-                    <a:lstStyle/>
-                    <a:p>
-                      <a:pPr marL="0" indent="0">
-                        <a:buFont typeface="Arial" panose="020B0604020202020204" pitchFamily="34" charset="0"/>
-                        <a:buNone/>
-                      </a:pPr>
-                      <a:r>
-                        <a:rPr lang="en-US" dirty="0" smtClean="0"/>
-                        <a:t>Social Policy</a:t>
-                      </a:r>
-                      <a:endParaRPr lang="en-US" dirty="0"/>
-                    </a:p>
-                  </a:txBody>
-                  <a:tcPr>
-                    <a:solidFill>
-                      <a:schemeClr val="bg1"/>
-                    </a:solidFill>
-                  </a:tcPr>
-                </a:tc>
-                <a:tc>
-                  <a:txBody>
-                    <a:bodyPr/>
-                    <a:lstStyle/>
-                    <a:p>
-                      <a:pPr marL="0" indent="0">
-                        <a:buFont typeface="Arial" panose="020B0604020202020204" pitchFamily="34" charset="0"/>
-                        <a:buNone/>
-                      </a:pPr>
-                      <a:endParaRPr lang="en-US" dirty="0"/>
-                    </a:p>
-                  </a:txBody>
-                  <a:tcPr>
-                    <a:solidFill>
-                      <a:schemeClr val="bg1"/>
-                    </a:solidFill>
-                  </a:tcPr>
-                </a:tc>
-              </a:tr>
-              <a:tr h="370840">
-                <a:tc>
-                  <a:txBody>
-                    <a:bodyPr/>
-                    <a:lstStyle/>
-                    <a:p>
-                      <a:pPr marL="0" indent="0">
-                        <a:buFont typeface="Arial" panose="020B0604020202020204" pitchFamily="34" charset="0"/>
-                        <a:buNone/>
-                      </a:pPr>
-                      <a:endParaRPr lang="en-US"/>
-                    </a:p>
-                  </a:txBody>
-                  <a:tcPr>
-                    <a:solidFill>
-                      <a:schemeClr val="bg1"/>
-                    </a:solidFill>
-                  </a:tcPr>
-                </a:tc>
-                <a:tc>
-                  <a:txBody>
-                    <a:bodyPr/>
-                    <a:lstStyle/>
-                    <a:p>
-                      <a:pPr marL="0" indent="0">
-                        <a:buFont typeface="Arial" panose="020B0604020202020204" pitchFamily="34" charset="0"/>
-                        <a:buNone/>
-                      </a:pPr>
-                      <a:r>
-                        <a:rPr lang="en-US" b="1" dirty="0" smtClean="0"/>
-                        <a:t>Law and Regulations</a:t>
-                      </a:r>
-                      <a:endParaRPr lang="en-US" b="1" dirty="0"/>
-                    </a:p>
-                  </a:txBody>
-                  <a:tcPr>
-                    <a:solidFill>
-                      <a:schemeClr val="bg1"/>
-                    </a:solidFill>
-                  </a:tcPr>
-                </a:tc>
-                <a:tc>
-                  <a:txBody>
-                    <a:bodyPr/>
-                    <a:lstStyle/>
-                    <a:p>
-                      <a:pPr marL="0" indent="0">
-                        <a:buFont typeface="Arial" panose="020B0604020202020204" pitchFamily="34" charset="0"/>
-                        <a:buNone/>
-                      </a:pPr>
-                      <a:endParaRPr lang="en-US" dirty="0"/>
-                    </a:p>
-                  </a:txBody>
-                  <a:tcPr>
-                    <a:solidFill>
-                      <a:schemeClr val="bg1"/>
-                    </a:solidFill>
-                  </a:tcPr>
-                </a:tc>
-              </a:tr>
-            </a:tbl>
-          </a:graphicData>
-        </a:graphic>
-      </p:graphicFrame>
-      <p:sp>
-        <p:nvSpPr>
-          <p:cNvPr id="3" name="Espace réservé du pied de page 2"/>
-          <p:cNvSpPr>
-            <a:spLocks noGrp="1"/>
-          </p:cNvSpPr>
-          <p:nvPr>
-            <p:ph type="ftr" sz="quarter" idx="11"/>
-          </p:nvPr>
-        </p:nvSpPr>
-        <p:spPr/>
-        <p:txBody>
-          <a:bodyPr/>
-          <a:lstStyle/>
-          <a:p>
-            <a:r>
-              <a:rPr lang="fr-FR" smtClean="0"/>
-              <a:t>Banmbu - 20/05/2015</a:t>
-            </a:r>
-            <a:endParaRPr lang="fr-FR"/>
-          </a:p>
-        </p:txBody>
-      </p:sp>
-      <p:sp>
-        <p:nvSpPr>
-          <p:cNvPr id="5" name="Espace réservé du numéro de diapositive 4"/>
-          <p:cNvSpPr>
-            <a:spLocks noGrp="1"/>
-          </p:cNvSpPr>
-          <p:nvPr>
-            <p:ph type="sldNum" sz="quarter" idx="12"/>
-          </p:nvPr>
-        </p:nvSpPr>
-        <p:spPr/>
-        <p:txBody>
-          <a:bodyPr/>
-          <a:lstStyle/>
-          <a:p>
-            <a:fld id="{D376626B-8044-4126-A03C-8C0AE257EC41}" type="slidenum">
-              <a:rPr lang="fr-FR" smtClean="0"/>
-              <a:t>8</a:t>
-            </a:fld>
-            <a:endParaRPr lang="fr-FR"/>
+            <a:endParaRPr lang="fr-FR" dirty="0"/>
           </a:p>
         </p:txBody>
       </p:sp>
     </p:spTree>
     <p:extLst>
       <p:ext uri="{BB962C8B-B14F-4D97-AF65-F5344CB8AC3E}">
-        <p14:creationId xmlns:p14="http://schemas.microsoft.com/office/powerpoint/2010/main" val="3304161007"/>
-      </p:ext>
-    </p:extLst>
-  </p:cSld>
-  <p:clrMapOvr>
-    <a:masterClrMapping/>
-  </p:clrMapOvr>
-  <p:timing>
-    <p:tnLst>
-      <p:par>
-        <p:cTn id="1" dur="indefinite" restart="never" nodeType="tmRoot"/>
-      </p:par>
-    </p:tnLst>
-  </p:timing>
-</p:sld>
-</file>
-
-<file path=ppt/slides/slide9.xml><?xml version="1.0" encoding="utf-8"?>
-<p:sld xmlns:a="http://schemas.openxmlformats.org/drawingml/2006/main" xmlns:r="http://schemas.openxmlformats.org/officeDocument/2006/relationships" xmlns:p="http://schemas.openxmlformats.org/presentationml/2006/main">
-  <p:cSld>
-    <p:spTree>
-      <p:nvGrpSpPr>
-        <p:cNvPr id="1" name=""/>
-        <p:cNvGrpSpPr/>
-        <p:nvPr/>
-      </p:nvGrpSpPr>
-      <p:grpSpPr>
-        <a:xfrm>
-          <a:off x="0" y="0"/>
-          <a:ext cx="0" cy="0"/>
-          <a:chOff x="0" y="0"/>
-          <a:chExt cx="0" cy="0"/>
-        </a:xfrm>
-      </p:grpSpPr>
-      <p:sp>
-        <p:nvSpPr>
-          <p:cNvPr id="4" name="Title 3"/>
-          <p:cNvSpPr>
-            <a:spLocks noGrp="1"/>
-          </p:cNvSpPr>
-          <p:nvPr>
-            <p:ph type="title"/>
-          </p:nvPr>
-        </p:nvSpPr>
-        <p:spPr/>
-        <p:txBody>
-          <a:bodyPr/>
-          <a:lstStyle/>
-          <a:p>
-            <a:r>
-              <a:rPr lang="en-US" dirty="0" smtClean="0"/>
-              <a:t>Process Data</a:t>
-            </a:r>
-            <a:endParaRPr lang="en-US" dirty="0"/>
-          </a:p>
-        </p:txBody>
-      </p:sp>
-      <p:sp>
-        <p:nvSpPr>
-          <p:cNvPr id="5" name="Text Placeholder 4"/>
-          <p:cNvSpPr>
-            <a:spLocks noGrp="1"/>
-          </p:cNvSpPr>
-          <p:nvPr>
-            <p:ph type="body" idx="1"/>
-          </p:nvPr>
-        </p:nvSpPr>
-        <p:spPr/>
-        <p:txBody>
-          <a:bodyPr/>
-          <a:lstStyle/>
-          <a:p>
-            <a:r>
-              <a:rPr lang="en-US" dirty="0" smtClean="0"/>
-              <a:t>Activity traces on github.com</a:t>
-            </a:r>
-            <a:endParaRPr lang="en-US" dirty="0"/>
-          </a:p>
-        </p:txBody>
-      </p:sp>
-      <p:sp>
-        <p:nvSpPr>
-          <p:cNvPr id="2" name="Espace réservé du pied de page 1"/>
-          <p:cNvSpPr>
-            <a:spLocks noGrp="1"/>
-          </p:cNvSpPr>
-          <p:nvPr>
-            <p:ph type="ftr" sz="quarter" idx="11"/>
-          </p:nvPr>
-        </p:nvSpPr>
-        <p:spPr/>
-        <p:txBody>
-          <a:bodyPr/>
-          <a:lstStyle/>
-          <a:p>
-            <a:r>
-              <a:rPr lang="fr-FR" smtClean="0"/>
-              <a:t>Banmbu - 20/05/2015</a:t>
-            </a:r>
-            <a:endParaRPr lang="fr-FR"/>
-          </a:p>
-        </p:txBody>
-      </p:sp>
-      <p:sp>
-        <p:nvSpPr>
-          <p:cNvPr id="3" name="Espace réservé du numéro de diapositive 2"/>
-          <p:cNvSpPr>
-            <a:spLocks noGrp="1"/>
-          </p:cNvSpPr>
-          <p:nvPr>
-            <p:ph type="sldNum" sz="quarter" idx="12"/>
-          </p:nvPr>
-        </p:nvSpPr>
-        <p:spPr/>
-        <p:txBody>
-          <a:bodyPr/>
-          <a:lstStyle/>
-          <a:p>
-            <a:fld id="{D376626B-8044-4126-A03C-8C0AE257EC41}" type="slidenum">
-              <a:rPr lang="fr-FR" smtClean="0"/>
-              <a:t>9</a:t>
-            </a:fld>
-            <a:endParaRPr lang="fr-FR"/>
-          </a:p>
-        </p:txBody>
-      </p:sp>
-      <p:pic>
-        <p:nvPicPr>
-          <p:cNvPr id="6" name="Image 5"/>
-          <p:cNvPicPr>
-            <a:picLocks noChangeAspect="1"/>
-          </p:cNvPicPr>
-          <p:nvPr/>
-        </p:nvPicPr>
-        <p:blipFill>
-          <a:blip r:embed="rId2">
-            <a:duotone>
-              <a:schemeClr val="accent4">
-                <a:shade val="45000"/>
-                <a:satMod val="135000"/>
-              </a:schemeClr>
-              <a:prstClr val="white"/>
-            </a:duotone>
-            <a:extLst>
-              <a:ext uri="{28A0092B-C50C-407E-A947-70E740481C1C}">
-                <a14:useLocalDpi xmlns:a14="http://schemas.microsoft.com/office/drawing/2010/main" val="0"/>
-              </a:ext>
-            </a:extLst>
-          </a:blip>
-          <a:stretch>
-            <a:fillRect/>
-          </a:stretch>
-        </p:blipFill>
-        <p:spPr>
-          <a:xfrm>
-            <a:off x="8401493" y="505460"/>
-            <a:ext cx="2754187" cy="3947668"/>
-          </a:xfrm>
-          <a:prstGeom prst="rect">
-            <a:avLst/>
-          </a:prstGeom>
-          <a:noFill/>
-        </p:spPr>
-      </p:pic>
-    </p:spTree>
-    <p:extLst>
-      <p:ext uri="{BB962C8B-B14F-4D97-AF65-F5344CB8AC3E}">
-        <p14:creationId xmlns:p14="http://schemas.microsoft.com/office/powerpoint/2010/main" val="1599634506"/>
+        <p14:creationId xmlns:p14="http://schemas.microsoft.com/office/powerpoint/2010/main" val="642926419"/>
       </p:ext>
     </p:extLst>
   </p:cSld>

</xml_diff>

<commit_message>
add content to ppt
</commit_message>
<xml_diff>
--- a/Assignments/Presentations/2015.06.14_Presentation.pptx
+++ b/Assignments/Presentations/2015.06.14_Presentation.pptx
@@ -5,16 +5,18 @@
     <p:sldMasterId id="2147483696" r:id="rId1"/>
   </p:sldMasterIdLst>
   <p:notesMasterIdLst>
-    <p:notesMasterId r:id="rId9"/>
+    <p:notesMasterId r:id="rId11"/>
   </p:notesMasterIdLst>
   <p:sldIdLst>
-    <p:sldId id="285" r:id="rId2"/>
-    <p:sldId id="298" r:id="rId3"/>
-    <p:sldId id="301" r:id="rId4"/>
-    <p:sldId id="286" r:id="rId5"/>
-    <p:sldId id="303" r:id="rId6"/>
-    <p:sldId id="305" r:id="rId7"/>
-    <p:sldId id="306" r:id="rId8"/>
+    <p:sldId id="307" r:id="rId2"/>
+    <p:sldId id="285" r:id="rId3"/>
+    <p:sldId id="298" r:id="rId4"/>
+    <p:sldId id="301" r:id="rId5"/>
+    <p:sldId id="286" r:id="rId6"/>
+    <p:sldId id="303" r:id="rId7"/>
+    <p:sldId id="308" r:id="rId8"/>
+    <p:sldId id="305" r:id="rId9"/>
+    <p:sldId id="306" r:id="rId10"/>
   </p:sldIdLst>
   <p:sldSz cx="12192000" cy="6858000"/>
   <p:notesSz cx="6858000" cy="9144000"/>
@@ -135,7 +137,7 @@
 <file path=ppt/charts/chart1.xml><?xml version="1.0" encoding="utf-8"?>
 <c:chartSpace xmlns:c="http://schemas.openxmlformats.org/drawingml/2006/chart" xmlns:a="http://schemas.openxmlformats.org/drawingml/2006/main" xmlns:r="http://schemas.openxmlformats.org/officeDocument/2006/relationships">
   <c:date1904 val="0"/>
-  <c:lang val="fr-FR"/>
+  <c:lang val="en-US"/>
   <c:roundedCorners val="0"/>
   <mc:AlternateContent xmlns:mc="http://schemas.openxmlformats.org/markup-compatibility/2006">
     <mc:Choice xmlns:c14="http://schemas.microsoft.com/office/drawing/2007/8/2/chart" Requires="c14">
@@ -203,7 +205,7 @@
               <a:cs typeface="+mn-cs"/>
             </a:defRPr>
           </a:pPr>
-          <a:endParaRPr lang="fr-FR"/>
+          <a:endParaRPr lang="en-US"/>
         </a:p>
       </c:txPr>
     </c:title>
@@ -365,7 +367,7 @@
               <a:cs typeface="+mn-cs"/>
             </a:defRPr>
           </a:pPr>
-          <a:endParaRPr lang="fr-FR"/>
+          <a:endParaRPr lang="en-US"/>
         </a:p>
       </c:txPr>
     </c:legend>
@@ -389,7 +391,7 @@
       <a:pPr>
         <a:defRPr/>
       </a:pPr>
-      <a:endParaRPr lang="fr-FR"/>
+      <a:endParaRPr lang="en-US"/>
     </a:p>
   </c:txPr>
   <c:externalData r:id="rId3">
@@ -1786,7 +1788,7 @@
         <a:lstStyle/>
         <a:p>
           <a:r>
-            <a:rPr lang="fr-FR" sz="1400" smtClean="0">
+            <a:rPr lang="en-US" sz="1400" noProof="0" dirty="0" smtClean="0">
               <a:solidFill>
                 <a:schemeClr val="accent3">
                   <a:lumMod val="75000"/>
@@ -1795,7 +1797,7 @@
             </a:rPr>
             <a:t>RESOURCES</a:t>
           </a:r>
-          <a:endParaRPr lang="fr-FR" sz="1400" dirty="0">
+          <a:endParaRPr lang="en-US" sz="1400" noProof="0" dirty="0">
             <a:solidFill>
               <a:schemeClr val="accent3">
                 <a:lumMod val="75000"/>
@@ -1908,7 +1910,7 @@
         <a:lstStyle/>
         <a:p>
           <a:r>
-            <a:rPr lang="fr-FR" sz="1400" dirty="0" smtClean="0">
+            <a:rPr lang="en-US" sz="1400" noProof="0" dirty="0" smtClean="0">
               <a:solidFill>
                 <a:schemeClr val="accent3">
                   <a:lumMod val="75000"/>
@@ -1917,7 +1919,7 @@
             </a:rPr>
             <a:t>OUTPUTS</a:t>
           </a:r>
-          <a:endParaRPr lang="fr-FR" sz="1400" dirty="0">
+          <a:endParaRPr lang="en-US" sz="1400" noProof="0" dirty="0">
             <a:solidFill>
               <a:schemeClr val="accent3">
                 <a:lumMod val="75000"/>
@@ -1969,7 +1971,7 @@
         <a:lstStyle/>
         <a:p>
           <a:r>
-            <a:rPr lang="fr-FR" sz="1050" dirty="0" smtClean="0">
+            <a:rPr lang="en-US" sz="1050" noProof="0" dirty="0" smtClean="0">
               <a:solidFill>
                 <a:schemeClr val="accent3">
                   <a:lumMod val="75000"/>
@@ -1978,7 +1980,7 @@
             </a:rPr>
             <a:t> IAR </a:t>
           </a:r>
-          <a:endParaRPr lang="fr-FR" sz="1050" dirty="0">
+          <a:endParaRPr lang="en-US" sz="1050" noProof="0" dirty="0">
             <a:solidFill>
               <a:schemeClr val="accent3">
                 <a:lumMod val="75000"/>
@@ -2030,46 +2032,16 @@
         <a:lstStyle/>
         <a:p>
           <a:r>
-            <a:rPr lang="fr-FR" sz="1050" dirty="0" smtClean="0">
+            <a:rPr lang="en-US" sz="1050" noProof="0" dirty="0" smtClean="0">
               <a:solidFill>
                 <a:schemeClr val="accent3">
                   <a:lumMod val="75000"/>
                 </a:schemeClr>
               </a:solidFill>
             </a:rPr>
-            <a:t> Fuel </a:t>
+            <a:t> Fuel cell authorities</a:t>
           </a:r>
-          <a:r>
-            <a:rPr lang="fr-FR" sz="1050" dirty="0" err="1" smtClean="0">
-              <a:solidFill>
-                <a:schemeClr val="accent3">
-                  <a:lumMod val="75000"/>
-                </a:schemeClr>
-              </a:solidFill>
-            </a:rPr>
-            <a:t>cell</a:t>
-          </a:r>
-          <a:r>
-            <a:rPr lang="fr-FR" sz="1050" dirty="0" smtClean="0">
-              <a:solidFill>
-                <a:schemeClr val="accent3">
-                  <a:lumMod val="75000"/>
-                </a:schemeClr>
-              </a:solidFill>
-            </a:rPr>
-            <a:t> </a:t>
-          </a:r>
-          <a:r>
-            <a:rPr lang="fr-FR" sz="1050" dirty="0" err="1" smtClean="0">
-              <a:solidFill>
-                <a:schemeClr val="accent3">
-                  <a:lumMod val="75000"/>
-                </a:schemeClr>
-              </a:solidFill>
-            </a:rPr>
-            <a:t>authoritiES</a:t>
-          </a:r>
-          <a:endParaRPr lang="fr-FR" sz="1050" dirty="0">
+          <a:endParaRPr lang="en-US" sz="1050" noProof="0" dirty="0">
             <a:solidFill>
               <a:schemeClr val="accent3">
                 <a:lumMod val="75000"/>
@@ -2374,7 +2346,7 @@
         <a:bodyPr/>
         <a:lstStyle/>
         <a:p>
-          <a:endParaRPr lang="fr-FR" sz="1050">
+          <a:endParaRPr lang="en-US" sz="1050" noProof="0" dirty="0">
             <a:solidFill>
               <a:schemeClr val="accent3">
                 <a:lumMod val="75000"/>
@@ -2426,7 +2398,7 @@
         <a:lstStyle/>
         <a:p>
           <a:r>
-            <a:rPr lang="fr-FR" sz="1050" dirty="0" smtClean="0">
+            <a:rPr lang="en-US" sz="1050" noProof="0" dirty="0" smtClean="0">
               <a:solidFill>
                 <a:schemeClr val="accent3">
                   <a:lumMod val="75000"/>
@@ -2435,6 +2407,13 @@
             </a:rPr>
             <a:t> Scientific publications</a:t>
           </a:r>
+          <a:endParaRPr lang="en-US" sz="1050" noProof="0" dirty="0" smtClean="0">
+            <a:solidFill>
+              <a:schemeClr val="accent3">
+                <a:lumMod val="75000"/>
+              </a:schemeClr>
+            </a:solidFill>
+          </a:endParaRPr>
         </a:p>
       </dgm:t>
     </dgm:pt>
@@ -2468,46 +2447,16 @@
         <a:lstStyle/>
         <a:p>
           <a:r>
-            <a:rPr lang="fr-FR" sz="1050" dirty="0" smtClean="0">
+            <a:rPr lang="en-US" sz="1050" noProof="0" dirty="0" smtClean="0">
               <a:solidFill>
                 <a:schemeClr val="accent3">
                   <a:lumMod val="75000"/>
                 </a:schemeClr>
               </a:solidFill>
             </a:rPr>
-            <a:t> </a:t>
+            <a:t> Company websites</a:t>
           </a:r>
-          <a:r>
-            <a:rPr lang="fr-FR" sz="1050" dirty="0" err="1" smtClean="0">
-              <a:solidFill>
-                <a:schemeClr val="accent3">
-                  <a:lumMod val="75000"/>
-                </a:schemeClr>
-              </a:solidFill>
-            </a:rPr>
-            <a:t>Company</a:t>
-          </a:r>
-          <a:r>
-            <a:rPr lang="fr-FR" sz="1050" dirty="0" smtClean="0">
-              <a:solidFill>
-                <a:schemeClr val="accent3">
-                  <a:lumMod val="75000"/>
-                </a:schemeClr>
-              </a:solidFill>
-            </a:rPr>
-            <a:t> </a:t>
-          </a:r>
-          <a:r>
-            <a:rPr lang="fr-FR" sz="1050" dirty="0" err="1" smtClean="0">
-              <a:solidFill>
-                <a:schemeClr val="accent3">
-                  <a:lumMod val="75000"/>
-                </a:schemeClr>
-              </a:solidFill>
-            </a:rPr>
-            <a:t>websites</a:t>
-          </a:r>
-          <a:endParaRPr lang="fr-FR" sz="1050" dirty="0" smtClean="0">
+          <a:endParaRPr lang="en-US" sz="1050" noProof="0" dirty="0" smtClean="0">
             <a:solidFill>
               <a:schemeClr val="accent3">
                 <a:lumMod val="75000"/>
@@ -2547,35 +2496,22 @@
         <a:lstStyle/>
         <a:p>
           <a:r>
-            <a:rPr lang="fr-FR" sz="1050" dirty="0" smtClean="0">
+            <a:rPr lang="en-US" sz="1050" noProof="0" dirty="0" smtClean="0">
               <a:solidFill>
                 <a:schemeClr val="accent3">
                   <a:lumMod val="75000"/>
                 </a:schemeClr>
               </a:solidFill>
             </a:rPr>
-            <a:t> </a:t>
+            <a:t> Newspapers and magazines</a:t>
           </a:r>
-          <a:r>
-            <a:rPr lang="fr-FR" sz="1050" dirty="0" err="1" smtClean="0">
-              <a:solidFill>
-                <a:schemeClr val="accent3">
-                  <a:lumMod val="75000"/>
-                </a:schemeClr>
-              </a:solidFill>
-            </a:rPr>
-            <a:t>Newspapers</a:t>
-          </a:r>
-          <a:r>
-            <a:rPr lang="fr-FR" sz="1050" dirty="0" smtClean="0">
-              <a:solidFill>
-                <a:schemeClr val="accent3">
-                  <a:lumMod val="75000"/>
-                </a:schemeClr>
-              </a:solidFill>
-            </a:rPr>
-            <a:t> and magazines</a:t>
-          </a:r>
+          <a:endParaRPr lang="en-US" sz="1050" noProof="0" dirty="0" smtClean="0">
+            <a:solidFill>
+              <a:schemeClr val="accent3">
+                <a:lumMod val="75000"/>
+              </a:schemeClr>
+            </a:solidFill>
+          </a:endParaRPr>
         </a:p>
       </dgm:t>
     </dgm:pt>
@@ -2609,46 +2545,16 @@
         <a:lstStyle/>
         <a:p>
           <a:r>
-            <a:rPr lang="fr-FR" sz="1050" dirty="0" smtClean="0">
+            <a:rPr lang="en-US" sz="1050" noProof="0" dirty="0" smtClean="0">
               <a:solidFill>
                 <a:schemeClr val="accent3">
                   <a:lumMod val="75000"/>
                 </a:schemeClr>
               </a:solidFill>
             </a:rPr>
-            <a:t> </a:t>
+            <a:t> Governmental authorities</a:t>
           </a:r>
-          <a:r>
-            <a:rPr lang="fr-FR" sz="1050" dirty="0" err="1" smtClean="0">
-              <a:solidFill>
-                <a:schemeClr val="accent3">
-                  <a:lumMod val="75000"/>
-                </a:schemeClr>
-              </a:solidFill>
-            </a:rPr>
-            <a:t>Governmental</a:t>
-          </a:r>
-          <a:r>
-            <a:rPr lang="fr-FR" sz="1050" dirty="0" smtClean="0">
-              <a:solidFill>
-                <a:schemeClr val="accent3">
-                  <a:lumMod val="75000"/>
-                </a:schemeClr>
-              </a:solidFill>
-            </a:rPr>
-            <a:t> </a:t>
-          </a:r>
-          <a:r>
-            <a:rPr lang="fr-FR" sz="1050" dirty="0" err="1" smtClean="0">
-              <a:solidFill>
-                <a:schemeClr val="accent3">
-                  <a:lumMod val="75000"/>
-                </a:schemeClr>
-              </a:solidFill>
-            </a:rPr>
-            <a:t>authorities</a:t>
-          </a:r>
-          <a:endParaRPr lang="fr-FR" sz="1050" dirty="0" smtClean="0">
+          <a:endParaRPr lang="en-US" sz="1050" noProof="0" dirty="0" smtClean="0">
             <a:solidFill>
               <a:schemeClr val="accent3">
                 <a:lumMod val="75000"/>
@@ -2688,46 +2594,16 @@
         <a:lstStyle/>
         <a:p>
           <a:r>
-            <a:rPr lang="fr-FR" sz="1050" dirty="0" smtClean="0">
+            <a:rPr lang="en-US" sz="1050" noProof="0" dirty="0" smtClean="0">
               <a:solidFill>
                 <a:schemeClr val="accent3">
                   <a:lumMod val="75000"/>
                 </a:schemeClr>
               </a:solidFill>
             </a:rPr>
-            <a:t> </a:t>
+            <a:t> Statistic databases</a:t>
           </a:r>
-          <a:r>
-            <a:rPr lang="fr-FR" sz="1050" dirty="0" err="1" smtClean="0">
-              <a:solidFill>
-                <a:schemeClr val="accent3">
-                  <a:lumMod val="75000"/>
-                </a:schemeClr>
-              </a:solidFill>
-            </a:rPr>
-            <a:t>Statistic</a:t>
-          </a:r>
-          <a:r>
-            <a:rPr lang="fr-FR" sz="1050" dirty="0" smtClean="0">
-              <a:solidFill>
-                <a:schemeClr val="accent3">
-                  <a:lumMod val="75000"/>
-                </a:schemeClr>
-              </a:solidFill>
-            </a:rPr>
-            <a:t> </a:t>
-          </a:r>
-          <a:r>
-            <a:rPr lang="fr-FR" sz="1050" dirty="0" err="1" smtClean="0">
-              <a:solidFill>
-                <a:schemeClr val="accent3">
-                  <a:lumMod val="75000"/>
-                </a:schemeClr>
-              </a:solidFill>
-            </a:rPr>
-            <a:t>databases</a:t>
-          </a:r>
-          <a:endParaRPr lang="fr-FR" sz="1050" dirty="0" smtClean="0">
+          <a:endParaRPr lang="en-US" sz="1050" noProof="0" dirty="0" smtClean="0">
             <a:solidFill>
               <a:schemeClr val="accent3">
                 <a:lumMod val="75000"/>
@@ -2767,7 +2643,7 @@
         <a:lstStyle/>
         <a:p>
           <a:r>
-            <a:rPr lang="fr-FR" sz="1050" dirty="0" smtClean="0">
+            <a:rPr lang="en-US" sz="1050" noProof="0" dirty="0" smtClean="0">
               <a:solidFill>
                 <a:schemeClr val="accent3">
                   <a:lumMod val="75000"/>
@@ -2776,6 +2652,13 @@
             </a:rPr>
             <a:t> Online Tools</a:t>
           </a:r>
+          <a:endParaRPr lang="en-US" sz="1050" noProof="0" dirty="0" smtClean="0">
+            <a:solidFill>
+              <a:schemeClr val="accent3">
+                <a:lumMod val="75000"/>
+              </a:schemeClr>
+            </a:solidFill>
+          </a:endParaRPr>
         </a:p>
       </dgm:t>
     </dgm:pt>
@@ -2809,7 +2692,7 @@
         <a:lstStyle/>
         <a:p>
           <a:r>
-            <a:rPr lang="fr-FR" sz="1050" dirty="0" smtClean="0">
+            <a:rPr lang="en-US" sz="1050" noProof="0" dirty="0" smtClean="0">
               <a:solidFill>
                 <a:schemeClr val="accent3">
                   <a:lumMod val="75000"/>
@@ -2818,6 +2701,13 @@
             </a:rPr>
             <a:t> Software</a:t>
           </a:r>
+          <a:endParaRPr lang="en-US" sz="1050" noProof="0" dirty="0" smtClean="0">
+            <a:solidFill>
+              <a:schemeClr val="accent3">
+                <a:lumMod val="75000"/>
+              </a:schemeClr>
+            </a:solidFill>
+          </a:endParaRPr>
         </a:p>
       </dgm:t>
     </dgm:pt>
@@ -2890,7 +2780,7 @@
         <a:lstStyle/>
         <a:p>
           <a:r>
-            <a:rPr lang="fr-FR" sz="1050" dirty="0" smtClean="0">
+            <a:rPr lang="en-US" sz="1050" noProof="0" dirty="0" smtClean="0">
               <a:solidFill>
                 <a:schemeClr val="accent3">
                   <a:lumMod val="75000"/>
@@ -2899,6 +2789,13 @@
             </a:rPr>
             <a:t> Introduction</a:t>
           </a:r>
+          <a:endParaRPr lang="en-US" sz="1050" noProof="0" dirty="0" smtClean="0">
+            <a:solidFill>
+              <a:schemeClr val="accent3">
+                <a:lumMod val="75000"/>
+              </a:schemeClr>
+            </a:solidFill>
+          </a:endParaRPr>
         </a:p>
       </dgm:t>
     </dgm:pt>
@@ -2932,35 +2829,22 @@
         <a:lstStyle/>
         <a:p>
           <a:r>
-            <a:rPr lang="fr-FR" sz="1050" dirty="0" smtClean="0">
+            <a:rPr lang="en-US" sz="1050" noProof="0" dirty="0" smtClean="0">
               <a:solidFill>
                 <a:schemeClr val="accent3">
                   <a:lumMod val="75000"/>
                 </a:schemeClr>
               </a:solidFill>
             </a:rPr>
-            <a:t> </a:t>
+            <a:t> GitHub page</a:t>
           </a:r>
-          <a:r>
-            <a:rPr lang="fr-FR" sz="1050" dirty="0" err="1" smtClean="0">
-              <a:solidFill>
-                <a:schemeClr val="accent3">
-                  <a:lumMod val="75000"/>
-                </a:schemeClr>
-              </a:solidFill>
-            </a:rPr>
-            <a:t>Github</a:t>
-          </a:r>
-          <a:r>
-            <a:rPr lang="fr-FR" sz="1050" dirty="0" smtClean="0">
-              <a:solidFill>
-                <a:schemeClr val="accent3">
-                  <a:lumMod val="75000"/>
-                </a:schemeClr>
-              </a:solidFill>
-            </a:rPr>
-            <a:t> page</a:t>
-          </a:r>
+          <a:endParaRPr lang="en-US" sz="1050" noProof="0" dirty="0" smtClean="0">
+            <a:solidFill>
+              <a:schemeClr val="accent3">
+                <a:lumMod val="75000"/>
+              </a:schemeClr>
+            </a:solidFill>
+          </a:endParaRPr>
         </a:p>
       </dgm:t>
     </dgm:pt>
@@ -2993,7 +2877,7 @@
         <a:bodyPr/>
         <a:lstStyle/>
         <a:p>
-          <a:endParaRPr lang="fr-FR" sz="1050" dirty="0" smtClean="0">
+          <a:endParaRPr lang="en-US" sz="1050" noProof="0" dirty="0" smtClean="0">
             <a:solidFill>
               <a:schemeClr val="accent3">
                 <a:lumMod val="75000"/>
@@ -3163,7 +3047,7 @@
         <a:lstStyle/>
         <a:p>
           <a:r>
-            <a:rPr lang="fr-FR" sz="1050" dirty="0" smtClean="0">
+            <a:rPr lang="en-US" sz="1050" noProof="0" dirty="0" smtClean="0">
               <a:solidFill>
                 <a:schemeClr val="accent3">
                   <a:lumMod val="75000"/>
@@ -3172,6 +3056,13 @@
             </a:rPr>
             <a:t> Product description</a:t>
           </a:r>
+          <a:endParaRPr lang="en-US" sz="1050" noProof="0" dirty="0" smtClean="0">
+            <a:solidFill>
+              <a:schemeClr val="accent3">
+                <a:lumMod val="75000"/>
+              </a:schemeClr>
+            </a:solidFill>
+          </a:endParaRPr>
         </a:p>
       </dgm:t>
     </dgm:pt>
@@ -3205,35 +3096,22 @@
         <a:lstStyle/>
         <a:p>
           <a:r>
-            <a:rPr lang="fr-FR" sz="1050" dirty="0" smtClean="0">
+            <a:rPr lang="en-US" sz="1050" noProof="0" dirty="0" smtClean="0">
               <a:solidFill>
                 <a:schemeClr val="accent3">
                   <a:lumMod val="75000"/>
                 </a:schemeClr>
               </a:solidFill>
             </a:rPr>
-            <a:t> </a:t>
+            <a:t> Market description</a:t>
           </a:r>
-          <a:r>
-            <a:rPr lang="fr-FR" sz="1050" dirty="0" err="1" smtClean="0">
-              <a:solidFill>
-                <a:schemeClr val="accent3">
-                  <a:lumMod val="75000"/>
-                </a:schemeClr>
-              </a:solidFill>
-            </a:rPr>
-            <a:t>Market</a:t>
-          </a:r>
-          <a:r>
-            <a:rPr lang="fr-FR" sz="1050" dirty="0" smtClean="0">
-              <a:solidFill>
-                <a:schemeClr val="accent3">
-                  <a:lumMod val="75000"/>
-                </a:schemeClr>
-              </a:solidFill>
-            </a:rPr>
-            <a:t> description</a:t>
-          </a:r>
+          <a:endParaRPr lang="en-US" sz="1050" noProof="0" dirty="0" smtClean="0">
+            <a:solidFill>
+              <a:schemeClr val="accent3">
+                <a:lumMod val="75000"/>
+              </a:schemeClr>
+            </a:solidFill>
+          </a:endParaRPr>
         </a:p>
       </dgm:t>
     </dgm:pt>
@@ -3267,26 +3145,16 @@
         <a:lstStyle/>
         <a:p>
           <a:r>
-            <a:rPr lang="fr-FR" sz="1050" dirty="0" smtClean="0">
+            <a:rPr lang="en-US" sz="1050" noProof="0" dirty="0" smtClean="0">
               <a:solidFill>
                 <a:schemeClr val="accent3">
                   <a:lumMod val="75000"/>
                 </a:schemeClr>
               </a:solidFill>
             </a:rPr>
-            <a:t> Policy </a:t>
+            <a:t> Policy framework</a:t>
           </a:r>
-          <a:r>
-            <a:rPr lang="fr-FR" sz="1050" dirty="0" err="1" smtClean="0">
-              <a:solidFill>
-                <a:schemeClr val="accent3">
-                  <a:lumMod val="75000"/>
-                </a:schemeClr>
-              </a:solidFill>
-            </a:rPr>
-            <a:t>framework</a:t>
-          </a:r>
-          <a:endParaRPr lang="fr-FR" sz="1050" dirty="0" smtClean="0">
+          <a:endParaRPr lang="en-US" sz="1050" noProof="0" dirty="0" smtClean="0">
             <a:solidFill>
               <a:schemeClr val="accent3">
                 <a:lumMod val="75000"/>
@@ -3326,7 +3194,7 @@
         <a:lstStyle/>
         <a:p>
           <a:r>
-            <a:rPr lang="fr-FR" sz="1050" dirty="0" smtClean="0">
+            <a:rPr lang="en-US" sz="1050" noProof="0" dirty="0" smtClean="0">
               <a:solidFill>
                 <a:schemeClr val="accent3">
                   <a:lumMod val="75000"/>
@@ -3335,6 +3203,13 @@
             </a:rPr>
             <a:t> Future perspective</a:t>
           </a:r>
+          <a:endParaRPr lang="en-US" sz="1050" noProof="0" dirty="0" smtClean="0">
+            <a:solidFill>
+              <a:schemeClr val="accent3">
+                <a:lumMod val="75000"/>
+              </a:schemeClr>
+            </a:solidFill>
+          </a:endParaRPr>
         </a:p>
       </dgm:t>
     </dgm:pt>
@@ -3368,7 +3243,7 @@
         <a:lstStyle/>
         <a:p>
           <a:r>
-            <a:rPr lang="fr-FR" sz="1050" dirty="0" smtClean="0">
+            <a:rPr lang="en-US" sz="1050" noProof="0" dirty="0" smtClean="0">
               <a:solidFill>
                 <a:schemeClr val="accent3">
                   <a:lumMod val="75000"/>
@@ -3377,6 +3252,13 @@
             </a:rPr>
             <a:t> Conclusion</a:t>
           </a:r>
+          <a:endParaRPr lang="en-US" sz="1050" noProof="0" dirty="0" smtClean="0">
+            <a:solidFill>
+              <a:schemeClr val="accent3">
+                <a:lumMod val="75000"/>
+              </a:schemeClr>
+            </a:solidFill>
+          </a:endParaRPr>
         </a:p>
       </dgm:t>
     </dgm:pt>
@@ -3787,10 +3669,24 @@
     <dgm:pt modelId="{34E0EB66-5006-4A57-B5EC-D5DAD4DCAAD8}" type="parTrans" cxnId="{B68DA213-A0EC-4E2D-BFAD-FB4A32754442}">
       <dgm:prSet/>
       <dgm:spPr/>
+      <dgm:t>
+        <a:bodyPr/>
+        <a:lstStyle/>
+        <a:p>
+          <a:endParaRPr lang="en-US"/>
+        </a:p>
+      </dgm:t>
     </dgm:pt>
     <dgm:pt modelId="{EB9952C1-7CED-419D-AA04-CBC94BDBCAA5}" type="sibTrans" cxnId="{B68DA213-A0EC-4E2D-BFAD-FB4A32754442}">
       <dgm:prSet/>
       <dgm:spPr/>
+      <dgm:t>
+        <a:bodyPr/>
+        <a:lstStyle/>
+        <a:p>
+          <a:endParaRPr lang="en-US"/>
+        </a:p>
+      </dgm:t>
     </dgm:pt>
     <dgm:pt modelId="{BCC200FD-3EDA-402F-9FA0-E859602A5A1D}">
       <dgm:prSet custT="1"/>
@@ -3822,10 +3718,24 @@
     <dgm:pt modelId="{875838BA-E0E0-438A-85B2-AC0EA2C1DB02}" type="parTrans" cxnId="{2B85F91F-55BD-4B02-AA08-C0B65713F31F}">
       <dgm:prSet/>
       <dgm:spPr/>
+      <dgm:t>
+        <a:bodyPr/>
+        <a:lstStyle/>
+        <a:p>
+          <a:endParaRPr lang="en-US"/>
+        </a:p>
+      </dgm:t>
     </dgm:pt>
     <dgm:pt modelId="{B448DEC5-1698-4538-8792-F53B01B2F969}" type="sibTrans" cxnId="{2B85F91F-55BD-4B02-AA08-C0B65713F31F}">
       <dgm:prSet/>
       <dgm:spPr/>
+      <dgm:t>
+        <a:bodyPr/>
+        <a:lstStyle/>
+        <a:p>
+          <a:endParaRPr lang="en-US"/>
+        </a:p>
+      </dgm:t>
     </dgm:pt>
     <dgm:pt modelId="{71E9AA40-D3B4-4753-B77F-6CFE495E434F}" type="pres">
       <dgm:prSet presAssocID="{5252D8DF-F7ED-47A9-8F1F-1C3DE6A4722F}" presName="Name0" presStyleCnt="0">
@@ -3896,7 +3806,7 @@
       </dgm:t>
     </dgm:pt>
     <dgm:pt modelId="{21D06AF9-7B68-4C50-825D-0A7D198CBF3A}" type="pres">
-      <dgm:prSet presAssocID="{2BE55610-4D28-42E0-8267-558A7085E18F}" presName="node" presStyleLbl="node1" presStyleIdx="2" presStyleCnt="4">
+      <dgm:prSet presAssocID="{2BE55610-4D28-42E0-8267-558A7085E18F}" presName="node" presStyleLbl="node1" presStyleIdx="2" presStyleCnt="4" custLinFactNeighborX="1">
         <dgm:presLayoutVars>
           <dgm:bulletEnabled val="1"/>
         </dgm:presLayoutVars>
@@ -4107,7 +4017,7 @@
             </a:spcAft>
           </a:pPr>
           <a:r>
-            <a:rPr lang="fr-FR" sz="1400" kern="1200" smtClean="0">
+            <a:rPr lang="en-US" sz="1400" kern="1200" noProof="0" dirty="0" smtClean="0">
               <a:solidFill>
                 <a:schemeClr val="accent3">
                   <a:lumMod val="75000"/>
@@ -4116,7 +4026,7 @@
             </a:rPr>
             <a:t>RESOURCES</a:t>
           </a:r>
-          <a:endParaRPr lang="fr-FR" sz="1400" kern="1200" dirty="0">
+          <a:endParaRPr lang="en-US" sz="1400" kern="1200" noProof="0" dirty="0">
             <a:solidFill>
               <a:schemeClr val="accent3">
                 <a:lumMod val="75000"/>
@@ -4138,46 +4048,16 @@
             <a:buChar char="••"/>
           </a:pPr>
           <a:r>
-            <a:rPr lang="fr-FR" sz="1050" kern="1200" dirty="0" smtClean="0">
+            <a:rPr lang="en-US" sz="1050" kern="1200" noProof="0" dirty="0" smtClean="0">
               <a:solidFill>
                 <a:schemeClr val="accent3">
                   <a:lumMod val="75000"/>
                 </a:schemeClr>
               </a:solidFill>
             </a:rPr>
-            <a:t> Fuel </a:t>
+            <a:t> Fuel cell authorities</a:t>
           </a:r>
-          <a:r>
-            <a:rPr lang="fr-FR" sz="1050" kern="1200" dirty="0" err="1" smtClean="0">
-              <a:solidFill>
-                <a:schemeClr val="accent3">
-                  <a:lumMod val="75000"/>
-                </a:schemeClr>
-              </a:solidFill>
-            </a:rPr>
-            <a:t>cell</a:t>
-          </a:r>
-          <a:r>
-            <a:rPr lang="fr-FR" sz="1050" kern="1200" dirty="0" smtClean="0">
-              <a:solidFill>
-                <a:schemeClr val="accent3">
-                  <a:lumMod val="75000"/>
-                </a:schemeClr>
-              </a:solidFill>
-            </a:rPr>
-            <a:t> </a:t>
-          </a:r>
-          <a:r>
-            <a:rPr lang="fr-FR" sz="1050" kern="1200" dirty="0" err="1" smtClean="0">
-              <a:solidFill>
-                <a:schemeClr val="accent3">
-                  <a:lumMod val="75000"/>
-                </a:schemeClr>
-              </a:solidFill>
-            </a:rPr>
-            <a:t>authoritiES</a:t>
-          </a:r>
-          <a:endParaRPr lang="fr-FR" sz="1050" kern="1200" dirty="0">
+          <a:endParaRPr lang="en-US" sz="1050" kern="1200" noProof="0" dirty="0">
             <a:solidFill>
               <a:schemeClr val="accent3">
                 <a:lumMod val="75000"/>
@@ -4199,7 +4079,7 @@
             <a:buChar char="••"/>
           </a:pPr>
           <a:r>
-            <a:rPr lang="fr-FR" sz="1050" kern="1200" dirty="0" smtClean="0">
+            <a:rPr lang="en-US" sz="1050" kern="1200" noProof="0" dirty="0" smtClean="0">
               <a:solidFill>
                 <a:schemeClr val="accent3">
                   <a:lumMod val="75000"/>
@@ -4208,61 +4088,7 @@
             </a:rPr>
             <a:t> Scientific publications</a:t>
           </a:r>
-        </a:p>
-        <a:p>
-          <a:pPr marL="57150" lvl="1" indent="-57150" algn="l" defTabSz="466725">
-            <a:lnSpc>
-              <a:spcPct val="90000"/>
-            </a:lnSpc>
-            <a:spcBef>
-              <a:spcPct val="0"/>
-            </a:spcBef>
-            <a:spcAft>
-              <a:spcPct val="15000"/>
-            </a:spcAft>
-            <a:buChar char="••"/>
-          </a:pPr>
-          <a:r>
-            <a:rPr lang="fr-FR" sz="1050" kern="1200" dirty="0" smtClean="0">
-              <a:solidFill>
-                <a:schemeClr val="accent3">
-                  <a:lumMod val="75000"/>
-                </a:schemeClr>
-              </a:solidFill>
-            </a:rPr>
-            <a:t> </a:t>
-          </a:r>
-          <a:r>
-            <a:rPr lang="fr-FR" sz="1050" kern="1200" dirty="0" err="1" smtClean="0">
-              <a:solidFill>
-                <a:schemeClr val="accent3">
-                  <a:lumMod val="75000"/>
-                </a:schemeClr>
-              </a:solidFill>
-            </a:rPr>
-            <a:t>Company</a:t>
-          </a:r>
-          <a:r>
-            <a:rPr lang="fr-FR" sz="1050" kern="1200" dirty="0" smtClean="0">
-              <a:solidFill>
-                <a:schemeClr val="accent3">
-                  <a:lumMod val="75000"/>
-                </a:schemeClr>
-              </a:solidFill>
-            </a:rPr>
-            <a:t> </a:t>
-          </a:r>
-          <a:r>
-            <a:rPr lang="fr-FR" sz="1050" kern="1200" dirty="0" err="1" smtClean="0">
-              <a:solidFill>
-                <a:schemeClr val="accent3">
-                  <a:lumMod val="75000"/>
-                </a:schemeClr>
-              </a:solidFill>
-            </a:rPr>
-            <a:t>websites</a:t>
-          </a:r>
-          <a:endParaRPr lang="fr-FR" sz="1050" kern="1200" dirty="0" smtClean="0">
+          <a:endParaRPr lang="en-US" sz="1050" kern="1200" noProof="0" dirty="0" smtClean="0">
             <a:solidFill>
               <a:schemeClr val="accent3">
                 <a:lumMod val="75000"/>
@@ -4284,90 +4110,16 @@
             <a:buChar char="••"/>
           </a:pPr>
           <a:r>
-            <a:rPr lang="fr-FR" sz="1050" kern="1200" dirty="0" smtClean="0">
+            <a:rPr lang="en-US" sz="1050" kern="1200" noProof="0" dirty="0" smtClean="0">
               <a:solidFill>
                 <a:schemeClr val="accent3">
                   <a:lumMod val="75000"/>
                 </a:schemeClr>
               </a:solidFill>
             </a:rPr>
-            <a:t> </a:t>
+            <a:t> Company websites</a:t>
           </a:r>
-          <a:r>
-            <a:rPr lang="fr-FR" sz="1050" kern="1200" dirty="0" err="1" smtClean="0">
-              <a:solidFill>
-                <a:schemeClr val="accent3">
-                  <a:lumMod val="75000"/>
-                </a:schemeClr>
-              </a:solidFill>
-            </a:rPr>
-            <a:t>Newspapers</a:t>
-          </a:r>
-          <a:r>
-            <a:rPr lang="fr-FR" sz="1050" kern="1200" dirty="0" smtClean="0">
-              <a:solidFill>
-                <a:schemeClr val="accent3">
-                  <a:lumMod val="75000"/>
-                </a:schemeClr>
-              </a:solidFill>
-            </a:rPr>
-            <a:t> and magazines</a:t>
-          </a:r>
-        </a:p>
-        <a:p>
-          <a:pPr marL="57150" lvl="1" indent="-57150" algn="l" defTabSz="466725">
-            <a:lnSpc>
-              <a:spcPct val="90000"/>
-            </a:lnSpc>
-            <a:spcBef>
-              <a:spcPct val="0"/>
-            </a:spcBef>
-            <a:spcAft>
-              <a:spcPct val="15000"/>
-            </a:spcAft>
-            <a:buChar char="••"/>
-          </a:pPr>
-          <a:r>
-            <a:rPr lang="fr-FR" sz="1050" kern="1200" dirty="0" smtClean="0">
-              <a:solidFill>
-                <a:schemeClr val="accent3">
-                  <a:lumMod val="75000"/>
-                </a:schemeClr>
-              </a:solidFill>
-            </a:rPr>
-            <a:t> </a:t>
-          </a:r>
-          <a:r>
-            <a:rPr lang="fr-FR" sz="1050" kern="1200" dirty="0" err="1" smtClean="0">
-              <a:solidFill>
-                <a:schemeClr val="accent3">
-                  <a:lumMod val="75000"/>
-                </a:schemeClr>
-              </a:solidFill>
-            </a:rPr>
-            <a:t>Governmental</a:t>
-          </a:r>
-          <a:r>
-            <a:rPr lang="fr-FR" sz="1050" kern="1200" dirty="0" smtClean="0">
-              <a:solidFill>
-                <a:schemeClr val="accent3">
-                  <a:lumMod val="75000"/>
-                </a:schemeClr>
-              </a:solidFill>
-            </a:rPr>
-            <a:t> </a:t>
-          </a:r>
-          <a:r>
-            <a:rPr lang="fr-FR" sz="1050" kern="1200" dirty="0" err="1" smtClean="0">
-              <a:solidFill>
-                <a:schemeClr val="accent3">
-                  <a:lumMod val="75000"/>
-                </a:schemeClr>
-              </a:solidFill>
-            </a:rPr>
-            <a:t>authorities</a:t>
-          </a:r>
-          <a:endParaRPr lang="fr-FR" sz="1050" kern="1200" dirty="0" smtClean="0">
+          <a:endParaRPr lang="en-US" sz="1050" kern="1200" noProof="0" dirty="0" smtClean="0">
             <a:solidFill>
               <a:schemeClr val="accent3">
                 <a:lumMod val="75000"/>
@@ -4389,46 +4141,16 @@
             <a:buChar char="••"/>
           </a:pPr>
           <a:r>
-            <a:rPr lang="fr-FR" sz="1050" kern="1200" dirty="0" smtClean="0">
+            <a:rPr lang="en-US" sz="1050" kern="1200" noProof="0" dirty="0" smtClean="0">
               <a:solidFill>
                 <a:schemeClr val="accent3">
                   <a:lumMod val="75000"/>
                 </a:schemeClr>
               </a:solidFill>
             </a:rPr>
-            <a:t> </a:t>
+            <a:t> Newspapers and magazines</a:t>
           </a:r>
-          <a:r>
-            <a:rPr lang="fr-FR" sz="1050" kern="1200" dirty="0" err="1" smtClean="0">
-              <a:solidFill>
-                <a:schemeClr val="accent3">
-                  <a:lumMod val="75000"/>
-                </a:schemeClr>
-              </a:solidFill>
-            </a:rPr>
-            <a:t>Statistic</a:t>
-          </a:r>
-          <a:r>
-            <a:rPr lang="fr-FR" sz="1050" kern="1200" dirty="0" smtClean="0">
-              <a:solidFill>
-                <a:schemeClr val="accent3">
-                  <a:lumMod val="75000"/>
-                </a:schemeClr>
-              </a:solidFill>
-            </a:rPr>
-            <a:t> </a:t>
-          </a:r>
-          <a:r>
-            <a:rPr lang="fr-FR" sz="1050" kern="1200" dirty="0" err="1" smtClean="0">
-              <a:solidFill>
-                <a:schemeClr val="accent3">
-                  <a:lumMod val="75000"/>
-                </a:schemeClr>
-              </a:solidFill>
-            </a:rPr>
-            <a:t>databases</a:t>
-          </a:r>
-          <a:endParaRPr lang="fr-FR" sz="1050" kern="1200" dirty="0" smtClean="0">
+          <a:endParaRPr lang="en-US" sz="1050" kern="1200" noProof="0" dirty="0" smtClean="0">
             <a:solidFill>
               <a:schemeClr val="accent3">
                 <a:lumMod val="75000"/>
@@ -4450,15 +4172,22 @@
             <a:buChar char="••"/>
           </a:pPr>
           <a:r>
-            <a:rPr lang="fr-FR" sz="1050" kern="1200" dirty="0" smtClean="0">
+            <a:rPr lang="en-US" sz="1050" kern="1200" noProof="0" dirty="0" smtClean="0">
               <a:solidFill>
                 <a:schemeClr val="accent3">
                   <a:lumMod val="75000"/>
                 </a:schemeClr>
               </a:solidFill>
             </a:rPr>
-            <a:t> Online Tools</a:t>
+            <a:t> Governmental authorities</a:t>
           </a:r>
+          <a:endParaRPr lang="en-US" sz="1050" kern="1200" noProof="0" dirty="0" smtClean="0">
+            <a:solidFill>
+              <a:schemeClr val="accent3">
+                <a:lumMod val="75000"/>
+              </a:schemeClr>
+            </a:solidFill>
+          </a:endParaRPr>
         </a:p>
         <a:p>
           <a:pPr marL="57150" lvl="1" indent="-57150" algn="l" defTabSz="466725">
@@ -4474,15 +4203,22 @@
             <a:buChar char="••"/>
           </a:pPr>
           <a:r>
-            <a:rPr lang="fr-FR" sz="1050" kern="1200" dirty="0" smtClean="0">
+            <a:rPr lang="en-US" sz="1050" kern="1200" noProof="0" dirty="0" smtClean="0">
               <a:solidFill>
                 <a:schemeClr val="accent3">
                   <a:lumMod val="75000"/>
                 </a:schemeClr>
               </a:solidFill>
             </a:rPr>
-            <a:t> Software</a:t>
+            <a:t> Statistic databases</a:t>
           </a:r>
+          <a:endParaRPr lang="en-US" sz="1050" kern="1200" noProof="0" dirty="0" smtClean="0">
+            <a:solidFill>
+              <a:schemeClr val="accent3">
+                <a:lumMod val="75000"/>
+              </a:schemeClr>
+            </a:solidFill>
+          </a:endParaRPr>
         </a:p>
         <a:p>
           <a:pPr marL="57150" lvl="1" indent="-57150" algn="l" defTabSz="466725">
@@ -4497,7 +4233,69 @@
             </a:spcAft>
             <a:buChar char="••"/>
           </a:pPr>
-          <a:endParaRPr lang="fr-FR" sz="1050" kern="1200">
+          <a:r>
+            <a:rPr lang="en-US" sz="1050" kern="1200" noProof="0" dirty="0" smtClean="0">
+              <a:solidFill>
+                <a:schemeClr val="accent3">
+                  <a:lumMod val="75000"/>
+                </a:schemeClr>
+              </a:solidFill>
+            </a:rPr>
+            <a:t> Online Tools</a:t>
+          </a:r>
+          <a:endParaRPr lang="en-US" sz="1050" kern="1200" noProof="0" dirty="0" smtClean="0">
+            <a:solidFill>
+              <a:schemeClr val="accent3">
+                <a:lumMod val="75000"/>
+              </a:schemeClr>
+            </a:solidFill>
+          </a:endParaRPr>
+        </a:p>
+        <a:p>
+          <a:pPr marL="57150" lvl="1" indent="-57150" algn="l" defTabSz="466725">
+            <a:lnSpc>
+              <a:spcPct val="90000"/>
+            </a:lnSpc>
+            <a:spcBef>
+              <a:spcPct val="0"/>
+            </a:spcBef>
+            <a:spcAft>
+              <a:spcPct val="15000"/>
+            </a:spcAft>
+            <a:buChar char="••"/>
+          </a:pPr>
+          <a:r>
+            <a:rPr lang="en-US" sz="1050" kern="1200" noProof="0" dirty="0" smtClean="0">
+              <a:solidFill>
+                <a:schemeClr val="accent3">
+                  <a:lumMod val="75000"/>
+                </a:schemeClr>
+              </a:solidFill>
+            </a:rPr>
+            <a:t> Software</a:t>
+          </a:r>
+          <a:endParaRPr lang="en-US" sz="1050" kern="1200" noProof="0" dirty="0" smtClean="0">
+            <a:solidFill>
+              <a:schemeClr val="accent3">
+                <a:lumMod val="75000"/>
+              </a:schemeClr>
+            </a:solidFill>
+          </a:endParaRPr>
+        </a:p>
+        <a:p>
+          <a:pPr marL="57150" lvl="1" indent="-57150" algn="l" defTabSz="466725">
+            <a:lnSpc>
+              <a:spcPct val="90000"/>
+            </a:lnSpc>
+            <a:spcBef>
+              <a:spcPct val="0"/>
+            </a:spcBef>
+            <a:spcAft>
+              <a:spcPct val="15000"/>
+            </a:spcAft>
+            <a:buChar char="••"/>
+          </a:pPr>
+          <a:endParaRPr lang="en-US" sz="1050" kern="1200" noProof="0" dirty="0">
             <a:solidFill>
               <a:schemeClr val="accent3">
                 <a:lumMod val="75000"/>
@@ -4976,7 +4774,7 @@
       </dsp:nvSpPr>
       <dsp:spPr>
         <a:xfrm rot="16200000">
-          <a:off x="3841019" y="666691"/>
+          <a:off x="3841020" y="666691"/>
           <a:ext cx="3428999" cy="2095616"/>
         </a:xfrm>
         <a:prstGeom prst="flowChartManualOperation">
@@ -5036,7 +4834,7 @@
             </a:spcAft>
           </a:pPr>
           <a:r>
-            <a:rPr lang="fr-FR" sz="1400" kern="1200" dirty="0" smtClean="0">
+            <a:rPr lang="en-US" sz="1400" kern="1200" noProof="0" dirty="0" smtClean="0">
               <a:solidFill>
                 <a:schemeClr val="accent3">
                   <a:lumMod val="75000"/>
@@ -5045,7 +4843,7 @@
             </a:rPr>
             <a:t>OUTPUTS</a:t>
           </a:r>
-          <a:endParaRPr lang="fr-FR" sz="1400" kern="1200" dirty="0">
+          <a:endParaRPr lang="en-US" sz="1400" kern="1200" noProof="0" dirty="0">
             <a:solidFill>
               <a:schemeClr val="accent3">
                 <a:lumMod val="75000"/>
@@ -5067,7 +4865,7 @@
             <a:buChar char="••"/>
           </a:pPr>
           <a:r>
-            <a:rPr lang="fr-FR" sz="1050" kern="1200" dirty="0" smtClean="0">
+            <a:rPr lang="en-US" sz="1050" kern="1200" noProof="0" dirty="0" smtClean="0">
               <a:solidFill>
                 <a:schemeClr val="accent3">
                   <a:lumMod val="75000"/>
@@ -5076,7 +4874,7 @@
             </a:rPr>
             <a:t> IAR </a:t>
           </a:r>
-          <a:endParaRPr lang="fr-FR" sz="1050" kern="1200" dirty="0">
+          <a:endParaRPr lang="en-US" sz="1050" kern="1200" noProof="0" dirty="0">
             <a:solidFill>
               <a:schemeClr val="accent3">
                 <a:lumMod val="75000"/>
@@ -5098,7 +4896,7 @@
             <a:buChar char="••"/>
           </a:pPr>
           <a:r>
-            <a:rPr lang="fr-FR" sz="1050" kern="1200" dirty="0" smtClean="0">
+            <a:rPr lang="en-US" sz="1050" kern="1200" noProof="0" dirty="0" smtClean="0">
               <a:solidFill>
                 <a:schemeClr val="accent3">
                   <a:lumMod val="75000"/>
@@ -5107,109 +4905,7 @@
             </a:rPr>
             <a:t> Introduction</a:t>
           </a:r>
-        </a:p>
-        <a:p>
-          <a:pPr marL="114300" lvl="2" indent="-57150" algn="l" defTabSz="466725">
-            <a:lnSpc>
-              <a:spcPct val="90000"/>
-            </a:lnSpc>
-            <a:spcBef>
-              <a:spcPct val="0"/>
-            </a:spcBef>
-            <a:spcAft>
-              <a:spcPct val="15000"/>
-            </a:spcAft>
-            <a:buChar char="••"/>
-          </a:pPr>
-          <a:r>
-            <a:rPr lang="fr-FR" sz="1050" kern="1200" dirty="0" smtClean="0">
-              <a:solidFill>
-                <a:schemeClr val="accent3">
-                  <a:lumMod val="75000"/>
-                </a:schemeClr>
-              </a:solidFill>
-            </a:rPr>
-            <a:t> Product description</a:t>
-          </a:r>
-        </a:p>
-        <a:p>
-          <a:pPr marL="114300" lvl="2" indent="-57150" algn="l" defTabSz="466725">
-            <a:lnSpc>
-              <a:spcPct val="90000"/>
-            </a:lnSpc>
-            <a:spcBef>
-              <a:spcPct val="0"/>
-            </a:spcBef>
-            <a:spcAft>
-              <a:spcPct val="15000"/>
-            </a:spcAft>
-            <a:buChar char="••"/>
-          </a:pPr>
-          <a:r>
-            <a:rPr lang="fr-FR" sz="1050" kern="1200" dirty="0" smtClean="0">
-              <a:solidFill>
-                <a:schemeClr val="accent3">
-                  <a:lumMod val="75000"/>
-                </a:schemeClr>
-              </a:solidFill>
-            </a:rPr>
-            <a:t> </a:t>
-          </a:r>
-          <a:r>
-            <a:rPr lang="fr-FR" sz="1050" kern="1200" dirty="0" err="1" smtClean="0">
-              <a:solidFill>
-                <a:schemeClr val="accent3">
-                  <a:lumMod val="75000"/>
-                </a:schemeClr>
-              </a:solidFill>
-            </a:rPr>
-            <a:t>Market</a:t>
-          </a:r>
-          <a:r>
-            <a:rPr lang="fr-FR" sz="1050" kern="1200" dirty="0" smtClean="0">
-              <a:solidFill>
-                <a:schemeClr val="accent3">
-                  <a:lumMod val="75000"/>
-                </a:schemeClr>
-              </a:solidFill>
-            </a:rPr>
-            <a:t> description</a:t>
-          </a:r>
-        </a:p>
-        <a:p>
-          <a:pPr marL="114300" lvl="2" indent="-57150" algn="l" defTabSz="466725">
-            <a:lnSpc>
-              <a:spcPct val="90000"/>
-            </a:lnSpc>
-            <a:spcBef>
-              <a:spcPct val="0"/>
-            </a:spcBef>
-            <a:spcAft>
-              <a:spcPct val="15000"/>
-            </a:spcAft>
-            <a:buChar char="••"/>
-          </a:pPr>
-          <a:r>
-            <a:rPr lang="fr-FR" sz="1050" kern="1200" dirty="0" smtClean="0">
-              <a:solidFill>
-                <a:schemeClr val="accent3">
-                  <a:lumMod val="75000"/>
-                </a:schemeClr>
-              </a:solidFill>
-            </a:rPr>
-            <a:t> Policy </a:t>
-          </a:r>
-          <a:r>
-            <a:rPr lang="fr-FR" sz="1050" kern="1200" dirty="0" err="1" smtClean="0">
-              <a:solidFill>
-                <a:schemeClr val="accent3">
-                  <a:lumMod val="75000"/>
-                </a:schemeClr>
-              </a:solidFill>
-            </a:rPr>
-            <a:t>framework</a:t>
-          </a:r>
-          <a:endParaRPr lang="fr-FR" sz="1050" kern="1200" dirty="0" smtClean="0">
+          <a:endParaRPr lang="en-US" sz="1050" kern="1200" noProof="0" dirty="0" smtClean="0">
             <a:solidFill>
               <a:schemeClr val="accent3">
                 <a:lumMod val="75000"/>
@@ -5231,15 +4927,22 @@
             <a:buChar char="••"/>
           </a:pPr>
           <a:r>
-            <a:rPr lang="fr-FR" sz="1050" kern="1200" dirty="0" smtClean="0">
+            <a:rPr lang="en-US" sz="1050" kern="1200" noProof="0" dirty="0" smtClean="0">
               <a:solidFill>
                 <a:schemeClr val="accent3">
                   <a:lumMod val="75000"/>
                 </a:schemeClr>
               </a:solidFill>
             </a:rPr>
-            <a:t> Future perspective</a:t>
+            <a:t> Product description</a:t>
           </a:r>
+          <a:endParaRPr lang="en-US" sz="1050" kern="1200" noProof="0" dirty="0" smtClean="0">
+            <a:solidFill>
+              <a:schemeClr val="accent3">
+                <a:lumMod val="75000"/>
+              </a:schemeClr>
+            </a:solidFill>
+          </a:endParaRPr>
         </a:p>
         <a:p>
           <a:pPr marL="114300" lvl="2" indent="-57150" algn="l" defTabSz="466725">
@@ -5255,7 +4958,100 @@
             <a:buChar char="••"/>
           </a:pPr>
           <a:r>
-            <a:rPr lang="fr-FR" sz="1050" kern="1200" dirty="0" smtClean="0">
+            <a:rPr lang="en-US" sz="1050" kern="1200" noProof="0" dirty="0" smtClean="0">
+              <a:solidFill>
+                <a:schemeClr val="accent3">
+                  <a:lumMod val="75000"/>
+                </a:schemeClr>
+              </a:solidFill>
+            </a:rPr>
+            <a:t> Market description</a:t>
+          </a:r>
+          <a:endParaRPr lang="en-US" sz="1050" kern="1200" noProof="0" dirty="0" smtClean="0">
+            <a:solidFill>
+              <a:schemeClr val="accent3">
+                <a:lumMod val="75000"/>
+              </a:schemeClr>
+            </a:solidFill>
+          </a:endParaRPr>
+        </a:p>
+        <a:p>
+          <a:pPr marL="114300" lvl="2" indent="-57150" algn="l" defTabSz="466725">
+            <a:lnSpc>
+              <a:spcPct val="90000"/>
+            </a:lnSpc>
+            <a:spcBef>
+              <a:spcPct val="0"/>
+            </a:spcBef>
+            <a:spcAft>
+              <a:spcPct val="15000"/>
+            </a:spcAft>
+            <a:buChar char="••"/>
+          </a:pPr>
+          <a:r>
+            <a:rPr lang="en-US" sz="1050" kern="1200" noProof="0" dirty="0" smtClean="0">
+              <a:solidFill>
+                <a:schemeClr val="accent3">
+                  <a:lumMod val="75000"/>
+                </a:schemeClr>
+              </a:solidFill>
+            </a:rPr>
+            <a:t> Policy framework</a:t>
+          </a:r>
+          <a:endParaRPr lang="en-US" sz="1050" kern="1200" noProof="0" dirty="0" smtClean="0">
+            <a:solidFill>
+              <a:schemeClr val="accent3">
+                <a:lumMod val="75000"/>
+              </a:schemeClr>
+            </a:solidFill>
+          </a:endParaRPr>
+        </a:p>
+        <a:p>
+          <a:pPr marL="114300" lvl="2" indent="-57150" algn="l" defTabSz="466725">
+            <a:lnSpc>
+              <a:spcPct val="90000"/>
+            </a:lnSpc>
+            <a:spcBef>
+              <a:spcPct val="0"/>
+            </a:spcBef>
+            <a:spcAft>
+              <a:spcPct val="15000"/>
+            </a:spcAft>
+            <a:buChar char="••"/>
+          </a:pPr>
+          <a:r>
+            <a:rPr lang="en-US" sz="1050" kern="1200" noProof="0" dirty="0" smtClean="0">
+              <a:solidFill>
+                <a:schemeClr val="accent3">
+                  <a:lumMod val="75000"/>
+                </a:schemeClr>
+              </a:solidFill>
+            </a:rPr>
+            <a:t> Future perspective</a:t>
+          </a:r>
+          <a:endParaRPr lang="en-US" sz="1050" kern="1200" noProof="0" dirty="0" smtClean="0">
+            <a:solidFill>
+              <a:schemeClr val="accent3">
+                <a:lumMod val="75000"/>
+              </a:schemeClr>
+            </a:solidFill>
+          </a:endParaRPr>
+        </a:p>
+        <a:p>
+          <a:pPr marL="114300" lvl="2" indent="-57150" algn="l" defTabSz="466725">
+            <a:lnSpc>
+              <a:spcPct val="90000"/>
+            </a:lnSpc>
+            <a:spcBef>
+              <a:spcPct val="0"/>
+            </a:spcBef>
+            <a:spcAft>
+              <a:spcPct val="15000"/>
+            </a:spcAft>
+            <a:buChar char="••"/>
+          </a:pPr>
+          <a:r>
+            <a:rPr lang="en-US" sz="1050" kern="1200" noProof="0" dirty="0" smtClean="0">
               <a:solidFill>
                 <a:schemeClr val="accent3">
                   <a:lumMod val="75000"/>
@@ -5264,6 +5060,13 @@
             </a:rPr>
             <a:t> Conclusion</a:t>
           </a:r>
+          <a:endParaRPr lang="en-US" sz="1050" kern="1200" noProof="0" dirty="0" smtClean="0">
+            <a:solidFill>
+              <a:schemeClr val="accent3">
+                <a:lumMod val="75000"/>
+              </a:schemeClr>
+            </a:solidFill>
+          </a:endParaRPr>
         </a:p>
         <a:p>
           <a:pPr marL="57150" lvl="1" indent="-57150" algn="l" defTabSz="466725">
@@ -5279,35 +5082,22 @@
             <a:buChar char="••"/>
           </a:pPr>
           <a:r>
-            <a:rPr lang="fr-FR" sz="1050" kern="1200" dirty="0" smtClean="0">
+            <a:rPr lang="en-US" sz="1050" kern="1200" noProof="0" dirty="0" smtClean="0">
               <a:solidFill>
                 <a:schemeClr val="accent3">
                   <a:lumMod val="75000"/>
                 </a:schemeClr>
               </a:solidFill>
             </a:rPr>
-            <a:t> </a:t>
+            <a:t> GitHub page</a:t>
           </a:r>
-          <a:r>
-            <a:rPr lang="fr-FR" sz="1050" kern="1200" dirty="0" err="1" smtClean="0">
-              <a:solidFill>
-                <a:schemeClr val="accent3">
-                  <a:lumMod val="75000"/>
-                </a:schemeClr>
-              </a:solidFill>
-            </a:rPr>
-            <a:t>Github</a:t>
-          </a:r>
-          <a:r>
-            <a:rPr lang="fr-FR" sz="1050" kern="1200" dirty="0" smtClean="0">
-              <a:solidFill>
-                <a:schemeClr val="accent3">
-                  <a:lumMod val="75000"/>
-                </a:schemeClr>
-              </a:solidFill>
-            </a:rPr>
-            <a:t> page</a:t>
-          </a:r>
+          <a:endParaRPr lang="en-US" sz="1050" kern="1200" noProof="0" dirty="0" smtClean="0">
+            <a:solidFill>
+              <a:schemeClr val="accent3">
+                <a:lumMod val="75000"/>
+              </a:schemeClr>
+            </a:solidFill>
+          </a:endParaRPr>
         </a:p>
         <a:p>
           <a:pPr marL="57150" lvl="1" indent="-57150" algn="l" defTabSz="466725">
@@ -5322,7 +5112,7 @@
             </a:spcAft>
             <a:buChar char="••"/>
           </a:pPr>
-          <a:endParaRPr lang="fr-FR" sz="1050" kern="1200" dirty="0" smtClean="0">
+          <a:endParaRPr lang="en-US" sz="1050" kern="1200" noProof="0" dirty="0" smtClean="0">
             <a:solidFill>
               <a:schemeClr val="accent3">
                 <a:lumMod val="75000"/>
@@ -5332,7 +5122,7 @@
         </a:p>
       </dsp:txBody>
       <dsp:txXfrm rot="5400000">
-        <a:off x="4507711" y="685799"/>
+        <a:off x="4507712" y="685799"/>
         <a:ext cx="2095616" cy="2057399"/>
       </dsp:txXfrm>
     </dsp:sp>
@@ -6877,7 +6667,7 @@
           <a:p>
             <a:fld id="{DDCCA47B-3C97-470F-9E92-6634E455912F}" type="datetimeFigureOut">
               <a:rPr lang="en-US" smtClean="0"/>
-              <a:t>6/15/2015</a:t>
+              <a:t>6/16/2015</a:t>
             </a:fld>
             <a:endParaRPr lang="en-US"/>
           </a:p>
@@ -7036,7 +6826,7 @@
           <a:p>
             <a:fld id="{3C34E867-41F4-48E7-8B36-52D0CC1AAFEA}" type="slidenum">
               <a:rPr lang="en-US" smtClean="0"/>
-              <a:t>‹N°›</a:t>
+              <a:t>‹#›</a:t>
             </a:fld>
             <a:endParaRPr lang="en-US"/>
           </a:p>
@@ -7164,6 +6954,90 @@
       </p:grpSpPr>
       <p:sp>
         <p:nvSpPr>
+          <p:cNvPr id="2" name="Slide Image Placeholder 1"/>
+          <p:cNvSpPr>
+            <a:spLocks noGrp="1" noRot="1" noChangeAspect="1"/>
+          </p:cNvSpPr>
+          <p:nvPr>
+            <p:ph type="sldImg"/>
+          </p:nvPr>
+        </p:nvSpPr>
+        <p:spPr/>
+      </p:sp>
+      <p:sp>
+        <p:nvSpPr>
+          <p:cNvPr id="3" name="Notes Placeholder 2"/>
+          <p:cNvSpPr>
+            <a:spLocks noGrp="1"/>
+          </p:cNvSpPr>
+          <p:nvPr>
+            <p:ph type="body" idx="1"/>
+          </p:nvPr>
+        </p:nvSpPr>
+        <p:spPr/>
+        <p:txBody>
+          <a:bodyPr/>
+          <a:lstStyle/>
+          <a:p>
+            <a:endParaRPr lang="en-US"/>
+          </a:p>
+        </p:txBody>
+      </p:sp>
+      <p:sp>
+        <p:nvSpPr>
+          <p:cNvPr id="4" name="Slide Number Placeholder 3"/>
+          <p:cNvSpPr>
+            <a:spLocks noGrp="1"/>
+          </p:cNvSpPr>
+          <p:nvPr>
+            <p:ph type="sldNum" sz="quarter" idx="10"/>
+          </p:nvPr>
+        </p:nvSpPr>
+        <p:spPr/>
+        <p:txBody>
+          <a:bodyPr/>
+          <a:lstStyle/>
+          <a:p>
+            <a:fld id="{3C34E867-41F4-48E7-8B36-52D0CC1AAFEA}" type="slidenum">
+              <a:rPr lang="en-US" smtClean="0"/>
+              <a:t>1</a:t>
+            </a:fld>
+            <a:endParaRPr lang="en-US"/>
+          </a:p>
+        </p:txBody>
+      </p:sp>
+    </p:spTree>
+    <p:extLst>
+      <p:ext uri="{BB962C8B-B14F-4D97-AF65-F5344CB8AC3E}">
+        <p14:creationId xmlns:p14="http://schemas.microsoft.com/office/powerpoint/2010/main" val="1586194550"/>
+      </p:ext>
+    </p:extLst>
+  </p:cSld>
+  <p:clrMapOvr>
+    <a:masterClrMapping/>
+  </p:clrMapOvr>
+</p:notes>
+</file>
+
+<file path=ppt/notesSlides/notesSlide2.xml><?xml version="1.0" encoding="utf-8"?>
+<p:notes xmlns:a="http://schemas.openxmlformats.org/drawingml/2006/main" xmlns:r="http://schemas.openxmlformats.org/officeDocument/2006/relationships" xmlns:p="http://schemas.openxmlformats.org/presentationml/2006/main">
+  <p:cSld>
+    <p:spTree>
+      <p:nvGrpSpPr>
+        <p:cNvPr id="1" name=""/>
+        <p:cNvGrpSpPr/>
+        <p:nvPr/>
+      </p:nvGrpSpPr>
+      <p:grpSpPr>
+        <a:xfrm>
+          <a:off x="0" y="0"/>
+          <a:ext cx="0" cy="0"/>
+          <a:chOff x="0" y="0"/>
+          <a:chExt cx="0" cy="0"/>
+        </a:xfrm>
+      </p:grpSpPr>
+      <p:sp>
+        <p:nvSpPr>
           <p:cNvPr id="2" name="Espace réservé de l'image des diapositives 1"/>
           <p:cNvSpPr>
             <a:spLocks noGrp="1" noRot="1" noChangeAspect="1"/>
@@ -7210,7 +7084,7 @@
           <a:p>
             <a:fld id="{3C34E867-41F4-48E7-8B36-52D0CC1AAFEA}" type="slidenum">
               <a:rPr lang="en-US" smtClean="0"/>
-              <a:t>4</a:t>
+              <a:t>5</a:t>
             </a:fld>
             <a:endParaRPr lang="en-US"/>
           </a:p>
@@ -7220,6 +7094,90 @@
     <p:extLst>
       <p:ext uri="{BB962C8B-B14F-4D97-AF65-F5344CB8AC3E}">
         <p14:creationId xmlns:p14="http://schemas.microsoft.com/office/powerpoint/2010/main" val="1339342605"/>
+      </p:ext>
+    </p:extLst>
+  </p:cSld>
+  <p:clrMapOvr>
+    <a:masterClrMapping/>
+  </p:clrMapOvr>
+</p:notes>
+</file>
+
+<file path=ppt/notesSlides/notesSlide3.xml><?xml version="1.0" encoding="utf-8"?>
+<p:notes xmlns:a="http://schemas.openxmlformats.org/drawingml/2006/main" xmlns:r="http://schemas.openxmlformats.org/officeDocument/2006/relationships" xmlns:p="http://schemas.openxmlformats.org/presentationml/2006/main">
+  <p:cSld>
+    <p:spTree>
+      <p:nvGrpSpPr>
+        <p:cNvPr id="1" name=""/>
+        <p:cNvGrpSpPr/>
+        <p:nvPr/>
+      </p:nvGrpSpPr>
+      <p:grpSpPr>
+        <a:xfrm>
+          <a:off x="0" y="0"/>
+          <a:ext cx="0" cy="0"/>
+          <a:chOff x="0" y="0"/>
+          <a:chExt cx="0" cy="0"/>
+        </a:xfrm>
+      </p:grpSpPr>
+      <p:sp>
+        <p:nvSpPr>
+          <p:cNvPr id="2" name="Slide Image Placeholder 1"/>
+          <p:cNvSpPr>
+            <a:spLocks noGrp="1" noRot="1" noChangeAspect="1"/>
+          </p:cNvSpPr>
+          <p:nvPr>
+            <p:ph type="sldImg"/>
+          </p:nvPr>
+        </p:nvSpPr>
+        <p:spPr/>
+      </p:sp>
+      <p:sp>
+        <p:nvSpPr>
+          <p:cNvPr id="3" name="Notes Placeholder 2"/>
+          <p:cNvSpPr>
+            <a:spLocks noGrp="1"/>
+          </p:cNvSpPr>
+          <p:nvPr>
+            <p:ph type="body" idx="1"/>
+          </p:nvPr>
+        </p:nvSpPr>
+        <p:spPr/>
+        <p:txBody>
+          <a:bodyPr/>
+          <a:lstStyle/>
+          <a:p>
+            <a:endParaRPr lang="en-US" dirty="0"/>
+          </a:p>
+        </p:txBody>
+      </p:sp>
+      <p:sp>
+        <p:nvSpPr>
+          <p:cNvPr id="4" name="Slide Number Placeholder 3"/>
+          <p:cNvSpPr>
+            <a:spLocks noGrp="1"/>
+          </p:cNvSpPr>
+          <p:nvPr>
+            <p:ph type="sldNum" sz="quarter" idx="10"/>
+          </p:nvPr>
+        </p:nvSpPr>
+        <p:spPr/>
+        <p:txBody>
+          <a:bodyPr/>
+          <a:lstStyle/>
+          <a:p>
+            <a:fld id="{3C34E867-41F4-48E7-8B36-52D0CC1AAFEA}" type="slidenum">
+              <a:rPr lang="en-US" smtClean="0"/>
+              <a:t>9</a:t>
+            </a:fld>
+            <a:endParaRPr lang="en-US"/>
+          </a:p>
+        </p:txBody>
+      </p:sp>
+    </p:spTree>
+    <p:extLst>
+      <p:ext uri="{BB962C8B-B14F-4D97-AF65-F5344CB8AC3E}">
+        <p14:creationId xmlns:p14="http://schemas.microsoft.com/office/powerpoint/2010/main" val="3438248141"/>
       </p:ext>
     </p:extLst>
   </p:cSld>
@@ -7453,9 +7411,9 @@
           <a:bodyPr/>
           <a:lstStyle/>
           <a:p>
-            <a:fld id="{02594452-2088-46C7-8121-271356E8511E}" type="datetime1">
+            <a:fld id="{2C5C61E9-1969-4DE7-B3D9-D872FA8B372C}" type="datetime1">
               <a:rPr lang="fr-FR" smtClean="0"/>
-              <a:t>15/06/2015</a:t>
+              <a:t>16/06/2015</a:t>
             </a:fld>
             <a:endParaRPr lang="fr-FR"/>
           </a:p>
@@ -7478,7 +7436,7 @@
           <a:p>
             <a:r>
               <a:rPr lang="fr-FR" smtClean="0"/>
-              <a:t>Banmbu - 20/05/2015</a:t>
+              <a:t>Bambu - 17.06.2015</a:t>
             </a:r>
             <a:endParaRPr lang="fr-FR"/>
           </a:p>
@@ -7501,7 +7459,7 @@
           <a:p>
             <a:fld id="{D376626B-8044-4126-A03C-8C0AE257EC41}" type="slidenum">
               <a:rPr lang="fr-FR" smtClean="0"/>
-              <a:t>‹N°›</a:t>
+              <a:t>‹#›</a:t>
             </a:fld>
             <a:endParaRPr lang="fr-FR"/>
           </a:p>
@@ -7665,9 +7623,9 @@
           <a:bodyPr/>
           <a:lstStyle/>
           <a:p>
-            <a:fld id="{FF739EE9-E6DE-4CFF-9ECE-0F54FDE20F4B}" type="datetime1">
+            <a:fld id="{058393AD-105C-431A-A838-9B58B6F2F924}" type="datetime1">
               <a:rPr lang="fr-FR" smtClean="0"/>
-              <a:t>15/06/2015</a:t>
+              <a:t>16/06/2015</a:t>
             </a:fld>
             <a:endParaRPr lang="fr-FR"/>
           </a:p>
@@ -7690,7 +7648,7 @@
           <a:p>
             <a:r>
               <a:rPr lang="fr-FR" smtClean="0"/>
-              <a:t>Banmbu - 20/05/2015</a:t>
+              <a:t>Bambu - 17.06.2015</a:t>
             </a:r>
             <a:endParaRPr lang="fr-FR"/>
           </a:p>
@@ -7713,7 +7671,7 @@
           <a:p>
             <a:fld id="{D376626B-8044-4126-A03C-8C0AE257EC41}" type="slidenum">
               <a:rPr lang="fr-FR" smtClean="0"/>
-              <a:t>‹N°›</a:t>
+              <a:t>‹#›</a:t>
             </a:fld>
             <a:endParaRPr lang="fr-FR"/>
           </a:p>
@@ -7925,9 +7883,9 @@
           <a:bodyPr/>
           <a:lstStyle/>
           <a:p>
-            <a:fld id="{058B513E-FE9D-418D-A202-255A4E4C6AC5}" type="datetime1">
+            <a:fld id="{B4A90EAD-181F-478D-BFB5-37F5DAD19610}" type="datetime1">
               <a:rPr lang="fr-FR" smtClean="0"/>
-              <a:t>15/06/2015</a:t>
+              <a:t>16/06/2015</a:t>
             </a:fld>
             <a:endParaRPr lang="fr-FR"/>
           </a:p>
@@ -7950,7 +7908,7 @@
           <a:p>
             <a:r>
               <a:rPr lang="fr-FR" smtClean="0"/>
-              <a:t>Banmbu - 20/05/2015</a:t>
+              <a:t>Bambu - 17.06.2015</a:t>
             </a:r>
             <a:endParaRPr lang="fr-FR"/>
           </a:p>
@@ -7973,7 +7931,7 @@
           <a:p>
             <a:fld id="{D376626B-8044-4126-A03C-8C0AE257EC41}" type="slidenum">
               <a:rPr lang="fr-FR" smtClean="0"/>
-              <a:t>‹N°›</a:t>
+              <a:t>‹#›</a:t>
             </a:fld>
             <a:endParaRPr lang="fr-FR"/>
           </a:p>
@@ -8099,9 +8057,9 @@
           <a:bodyPr/>
           <a:lstStyle/>
           <a:p>
-            <a:fld id="{B3951D82-E167-4565-95B5-D8341A5A6D5B}" type="datetime1">
+            <a:fld id="{3099D2FA-A7EE-4C7E-B927-FD90FB82F630}" type="datetime1">
               <a:rPr lang="fr-FR" smtClean="0"/>
-              <a:t>15/06/2015</a:t>
+              <a:t>16/06/2015</a:t>
             </a:fld>
             <a:endParaRPr lang="fr-FR"/>
           </a:p>
@@ -8124,7 +8082,7 @@
           <a:p>
             <a:r>
               <a:rPr lang="fr-FR" smtClean="0"/>
-              <a:t>Banmbu - 20/05/2015</a:t>
+              <a:t>Bambu - 17.06.2015</a:t>
             </a:r>
             <a:endParaRPr lang="fr-FR"/>
           </a:p>
@@ -8147,7 +8105,7 @@
           <a:p>
             <a:fld id="{D376626B-8044-4126-A03C-8C0AE257EC41}" type="slidenum">
               <a:rPr lang="fr-FR" smtClean="0"/>
-              <a:t>‹N°›</a:t>
+              <a:t>‹#›</a:t>
             </a:fld>
             <a:endParaRPr lang="fr-FR"/>
           </a:p>
@@ -8446,9 +8404,9 @@
           <a:bodyPr/>
           <a:lstStyle/>
           <a:p>
-            <a:fld id="{6F395423-CF2A-41A1-B998-779941211E29}" type="datetime1">
+            <a:fld id="{311C7551-15CD-4926-937B-70B1D507B698}" type="datetime1">
               <a:rPr lang="fr-FR" smtClean="0"/>
-              <a:t>15/06/2015</a:t>
+              <a:t>16/06/2015</a:t>
             </a:fld>
             <a:endParaRPr lang="fr-FR"/>
           </a:p>
@@ -8471,7 +8429,7 @@
           <a:p>
             <a:r>
               <a:rPr lang="fr-FR" smtClean="0"/>
-              <a:t>Banmbu - 20/05/2015</a:t>
+              <a:t>Bambu - 17.06.2015</a:t>
             </a:r>
             <a:endParaRPr lang="fr-FR"/>
           </a:p>
@@ -8494,7 +8452,7 @@
           <a:p>
             <a:fld id="{D376626B-8044-4126-A03C-8C0AE257EC41}" type="slidenum">
               <a:rPr lang="fr-FR" smtClean="0"/>
-              <a:t>‹N°›</a:t>
+              <a:t>‹#›</a:t>
             </a:fld>
             <a:endParaRPr lang="fr-FR"/>
           </a:p>
@@ -8725,9 +8683,9 @@
           <a:bodyPr/>
           <a:lstStyle/>
           <a:p>
-            <a:fld id="{7B31CB30-7913-4FD5-8453-6D9FF22AA427}" type="datetime1">
+            <a:fld id="{FED2ED52-2116-43A1-A3DA-BEF214973798}" type="datetime1">
               <a:rPr lang="fr-FR" smtClean="0"/>
-              <a:t>15/06/2015</a:t>
+              <a:t>16/06/2015</a:t>
             </a:fld>
             <a:endParaRPr lang="fr-FR"/>
           </a:p>
@@ -8750,7 +8708,7 @@
           <a:p>
             <a:r>
               <a:rPr lang="fr-FR" smtClean="0"/>
-              <a:t>Banmbu - 20/05/2015</a:t>
+              <a:t>Bambu - 17.06.2015</a:t>
             </a:r>
             <a:endParaRPr lang="fr-FR"/>
           </a:p>
@@ -8773,7 +8731,7 @@
           <a:p>
             <a:fld id="{D376626B-8044-4126-A03C-8C0AE257EC41}" type="slidenum">
               <a:rPr lang="fr-FR" smtClean="0"/>
-              <a:t>‹N°›</a:t>
+              <a:t>‹#›</a:t>
             </a:fld>
             <a:endParaRPr lang="fr-FR"/>
           </a:p>
@@ -9108,9 +9066,9 @@
           <a:bodyPr/>
           <a:lstStyle/>
           <a:p>
-            <a:fld id="{8F14C0EE-E481-43F3-94DA-D1A25CEC40DE}" type="datetime1">
+            <a:fld id="{4B971E29-9863-4D58-9B4C-278F70DD2FC4}" type="datetime1">
               <a:rPr lang="fr-FR" smtClean="0"/>
-              <a:t>15/06/2015</a:t>
+              <a:t>16/06/2015</a:t>
             </a:fld>
             <a:endParaRPr lang="fr-FR"/>
           </a:p>
@@ -9133,7 +9091,7 @@
           <a:p>
             <a:r>
               <a:rPr lang="fr-FR" smtClean="0"/>
-              <a:t>Banmbu - 20/05/2015</a:t>
+              <a:t>Bambu - 17.06.2015</a:t>
             </a:r>
             <a:endParaRPr lang="fr-FR"/>
           </a:p>
@@ -9156,7 +9114,7 @@
           <a:p>
             <a:fld id="{D376626B-8044-4126-A03C-8C0AE257EC41}" type="slidenum">
               <a:rPr lang="fr-FR" smtClean="0"/>
-              <a:t>‹N°›</a:t>
+              <a:t>‹#›</a:t>
             </a:fld>
             <a:endParaRPr lang="fr-FR"/>
           </a:p>
@@ -9230,9 +9188,9 @@
           <a:bodyPr/>
           <a:lstStyle/>
           <a:p>
-            <a:fld id="{531EB399-98EB-4874-922C-FD316CDCF690}" type="datetime1">
+            <a:fld id="{9253C44B-7212-4A52-B992-5A7FEEE78D27}" type="datetime1">
               <a:rPr lang="fr-FR" smtClean="0"/>
-              <a:t>15/06/2015</a:t>
+              <a:t>16/06/2015</a:t>
             </a:fld>
             <a:endParaRPr lang="fr-FR"/>
           </a:p>
@@ -9255,7 +9213,7 @@
           <a:p>
             <a:r>
               <a:rPr lang="fr-FR" smtClean="0"/>
-              <a:t>Banmbu - 20/05/2015</a:t>
+              <a:t>Bambu - 17.06.2015</a:t>
             </a:r>
             <a:endParaRPr lang="fr-FR"/>
           </a:p>
@@ -9278,7 +9236,7 @@
           <a:p>
             <a:fld id="{D376626B-8044-4126-A03C-8C0AE257EC41}" type="slidenum">
               <a:rPr lang="fr-FR" smtClean="0"/>
-              <a:t>‹N°›</a:t>
+              <a:t>‹#›</a:t>
             </a:fld>
             <a:endParaRPr lang="fr-FR"/>
           </a:p>
@@ -9405,9 +9363,9 @@
           <a:bodyPr/>
           <a:lstStyle/>
           <a:p>
-            <a:fld id="{3ECF0B9D-8152-464B-A496-6DA29EB38900}" type="datetime1">
+            <a:fld id="{0943EA57-E6C3-4C48-A8CC-B6619773AA7F}" type="datetime1">
               <a:rPr lang="fr-FR" smtClean="0"/>
-              <a:t>15/06/2015</a:t>
+              <a:t>16/06/2015</a:t>
             </a:fld>
             <a:endParaRPr lang="fr-FR"/>
           </a:p>
@@ -9438,7 +9396,7 @@
           <a:p>
             <a:r>
               <a:rPr lang="fr-FR" smtClean="0"/>
-              <a:t>Banmbu - 20/05/2015</a:t>
+              <a:t>Bambu - 17.06.2015</a:t>
             </a:r>
             <a:endParaRPr lang="fr-FR"/>
           </a:p>
@@ -9461,7 +9419,7 @@
           <a:p>
             <a:fld id="{D376626B-8044-4126-A03C-8C0AE257EC41}" type="slidenum">
               <a:rPr lang="fr-FR" smtClean="0"/>
-              <a:t>‹N°›</a:t>
+              <a:t>‹#›</a:t>
             </a:fld>
             <a:endParaRPr lang="fr-FR"/>
           </a:p>
@@ -9763,9 +9721,9 @@
             </a:lvl1pPr>
           </a:lstStyle>
           <a:p>
-            <a:fld id="{EB72BB81-321C-47C9-8EF1-F64E7E3280BC}" type="datetime1">
+            <a:fld id="{ED5FB9D2-93C7-43A2-909C-57D7B44C3E30}" type="datetime1">
               <a:rPr lang="fr-FR" smtClean="0"/>
-              <a:t>15/06/2015</a:t>
+              <a:t>16/06/2015</a:t>
             </a:fld>
             <a:endParaRPr lang="fr-FR"/>
           </a:p>
@@ -9801,7 +9759,7 @@
           <a:p>
             <a:r>
               <a:rPr lang="fr-FR" smtClean="0"/>
-              <a:t>Banmbu - 20/05/2015</a:t>
+              <a:t>Bambu - 17.06.2015</a:t>
             </a:r>
             <a:endParaRPr lang="fr-FR"/>
           </a:p>
@@ -9832,7 +9790,7 @@
           <a:p>
             <a:fld id="{D376626B-8044-4126-A03C-8C0AE257EC41}" type="slidenum">
               <a:rPr lang="fr-FR" smtClean="0"/>
-              <a:t>‹N°›</a:t>
+              <a:t>‹#›</a:t>
             </a:fld>
             <a:endParaRPr lang="fr-FR"/>
           </a:p>
@@ -10144,9 +10102,9 @@
           <a:bodyPr/>
           <a:lstStyle/>
           <a:p>
-            <a:fld id="{310F2307-685A-4E72-8E0A-45F85857C52E}" type="datetime1">
+            <a:fld id="{F1976278-7E84-470F-B715-7B2B030F838D}" type="datetime1">
               <a:rPr lang="fr-FR" smtClean="0"/>
-              <a:t>15/06/2015</a:t>
+              <a:t>16/06/2015</a:t>
             </a:fld>
             <a:endParaRPr lang="fr-FR"/>
           </a:p>
@@ -10169,7 +10127,7 @@
           <a:p>
             <a:r>
               <a:rPr lang="fr-FR" smtClean="0"/>
-              <a:t>Banmbu - 20/05/2015</a:t>
+              <a:t>Bambu - 17.06.2015</a:t>
             </a:r>
             <a:endParaRPr lang="fr-FR"/>
           </a:p>
@@ -10192,7 +10150,7 @@
           <a:p>
             <a:fld id="{D376626B-8044-4126-A03C-8C0AE257EC41}" type="slidenum">
               <a:rPr lang="fr-FR" smtClean="0"/>
-              <a:t>‹N°›</a:t>
+              <a:t>‹#›</a:t>
             </a:fld>
             <a:endParaRPr lang="fr-FR"/>
           </a:p>
@@ -10435,9 +10393,9 @@
             </a:lvl1pPr>
           </a:lstStyle>
           <a:p>
-            <a:fld id="{B82A1CD3-8443-43C6-8EE4-FA26CE5A5F83}" type="datetime1">
+            <a:fld id="{74A8B278-FC62-4207-A2FC-36512D99DBFC}" type="datetime1">
               <a:rPr lang="fr-FR" smtClean="0"/>
-              <a:t>15/06/2015</a:t>
+              <a:t>16/06/2015</a:t>
             </a:fld>
             <a:endParaRPr lang="fr-FR"/>
           </a:p>
@@ -10476,7 +10434,7 @@
           <a:p>
             <a:r>
               <a:rPr lang="fr-FR" smtClean="0"/>
-              <a:t>Banmbu - 20/05/2015</a:t>
+              <a:t>Bambu - 17.06.2015</a:t>
             </a:r>
             <a:endParaRPr lang="fr-FR"/>
           </a:p>
@@ -10515,7 +10473,7 @@
           <a:p>
             <a:fld id="{D376626B-8044-4126-A03C-8C0AE257EC41}" type="slidenum">
               <a:rPr lang="fr-FR" smtClean="0"/>
-              <a:t>‹N°›</a:t>
+              <a:t>‹#›</a:t>
             </a:fld>
             <a:endParaRPr lang="fr-FR"/>
           </a:p>
@@ -11014,109 +10972,7 @@
       </p:grpSpPr>
       <p:sp>
         <p:nvSpPr>
-          <p:cNvPr id="2" name="Title 1"/>
-          <p:cNvSpPr>
-            <a:spLocks noGrp="1"/>
-          </p:cNvSpPr>
-          <p:nvPr>
-            <p:ph type="ctrTitle"/>
-          </p:nvPr>
-        </p:nvSpPr>
-        <p:spPr/>
-        <p:txBody>
-          <a:bodyPr>
-            <a:normAutofit/>
-          </a:bodyPr>
-          <a:lstStyle/>
-          <a:p>
-            <a:r>
-              <a:rPr lang="en-US" sz="6000" dirty="0" smtClean="0"/>
-              <a:t>FUEL CELL INDUSTRY ANALYSIS REPORT</a:t>
-            </a:r>
-            <a:endParaRPr lang="en-US" sz="6000" dirty="0"/>
-          </a:p>
-        </p:txBody>
-      </p:sp>
-      <p:sp>
-        <p:nvSpPr>
-          <p:cNvPr id="3" name="Subtitle 2"/>
-          <p:cNvSpPr>
-            <a:spLocks noGrp="1"/>
-          </p:cNvSpPr>
-          <p:nvPr>
-            <p:ph type="subTitle" idx="1"/>
-          </p:nvPr>
-        </p:nvSpPr>
-        <p:spPr/>
-        <p:txBody>
-          <a:bodyPr/>
-          <a:lstStyle/>
-          <a:p>
-            <a:r>
-              <a:rPr lang="en-US" dirty="0" smtClean="0"/>
-              <a:t>Global Manufacturing Strategy</a:t>
-            </a:r>
-            <a:endParaRPr lang="en-US" dirty="0"/>
-          </a:p>
-        </p:txBody>
-      </p:sp>
-      <p:sp>
-        <p:nvSpPr>
-          <p:cNvPr id="4" name="Rectangle 3"/>
-          <p:cNvSpPr>
-            <a:spLocks noChangeAspect="1"/>
-          </p:cNvSpPr>
-          <p:nvPr/>
-        </p:nvSpPr>
-        <p:spPr>
-          <a:xfrm>
-            <a:off x="1407474" y="-288109"/>
-            <a:ext cx="9601301" cy="4778518"/>
-          </a:xfrm>
-          <a:prstGeom prst="rect">
-            <a:avLst/>
-          </a:prstGeom>
-          <a:blipFill dpi="0" rotWithShape="1">
-            <a:blip r:embed="rId2">
-              <a:alphaModFix amt="5000"/>
-            </a:blip>
-            <a:srcRect/>
-            <a:stretch>
-              <a:fillRect/>
-            </a:stretch>
-          </a:blipFill>
-          <a:ln>
-            <a:noFill/>
-          </a:ln>
-        </p:spPr>
-        <p:style>
-          <a:lnRef idx="2">
-            <a:schemeClr val="accent1">
-              <a:shade val="50000"/>
-            </a:schemeClr>
-          </a:lnRef>
-          <a:fillRef idx="1">
-            <a:schemeClr val="accent1"/>
-          </a:fillRef>
-          <a:effectRef idx="0">
-            <a:schemeClr val="accent1"/>
-          </a:effectRef>
-          <a:fontRef idx="minor">
-            <a:schemeClr val="lt1"/>
-          </a:fontRef>
-        </p:style>
-        <p:txBody>
-          <a:bodyPr rtlCol="0" anchor="ctr"/>
-          <a:lstStyle/>
-          <a:p>
-            <a:pPr algn="ctr"/>
-            <a:endParaRPr lang="de-DE"/>
-          </a:p>
-        </p:txBody>
-      </p:sp>
-      <p:sp>
-        <p:nvSpPr>
-          <p:cNvPr id="5" name="Espace réservé du pied de page 4"/>
+          <p:cNvPr id="2" name="Footer Placeholder 1"/>
           <p:cNvSpPr>
             <a:spLocks noGrp="1"/>
           </p:cNvSpPr>
@@ -11130,12 +10986,8 @@
           <a:lstStyle/>
           <a:p>
             <a:r>
-              <a:rPr lang="fr-FR" dirty="0" err="1" smtClean="0"/>
-              <a:t>Bambu</a:t>
-            </a:r>
-            <a:r>
-              <a:rPr lang="fr-FR" dirty="0" smtClean="0"/>
-              <a:t> - 17/06/2015</a:t>
+              <a:rPr lang="fr-FR" smtClean="0"/>
+              <a:t>Bambu - 17.06.2015</a:t>
             </a:r>
             <a:endParaRPr lang="fr-FR" dirty="0"/>
           </a:p>
@@ -11143,7 +10995,7 @@
       </p:sp>
       <p:sp>
         <p:nvSpPr>
-          <p:cNvPr id="6" name="Espace réservé du numéro de diapositive 5"/>
+          <p:cNvPr id="3" name="Slide Number Placeholder 2"/>
           <p:cNvSpPr>
             <a:spLocks noGrp="1"/>
           </p:cNvSpPr>
@@ -11158,17 +11010,328 @@
           <a:p>
             <a:fld id="{D376626B-8044-4126-A03C-8C0AE257EC41}" type="slidenum">
               <a:rPr lang="fr-FR" smtClean="0"/>
-              <a:pPr/>
               <a:t>1</a:t>
             </a:fld>
-            <a:endParaRPr lang="fr-FR" dirty="0"/>
+            <a:endParaRPr lang="fr-FR"/>
           </a:p>
         </p:txBody>
       </p:sp>
+      <p:pic>
+        <p:nvPicPr>
+          <p:cNvPr id="1026" name="Picture 2" descr="http://ichef.bbci.co.uk/news/660/media/images/81731000/jpg/_81731613_458847426.jpg"/>
+          <p:cNvPicPr>
+            <a:picLocks noChangeAspect="1" noChangeArrowheads="1"/>
+          </p:cNvPicPr>
+          <p:nvPr/>
+        </p:nvPicPr>
+        <p:blipFill>
+          <a:blip r:embed="rId3">
+            <a:extLst>
+              <a:ext uri="{28A0092B-C50C-407E-A947-70E740481C1C}">
+                <a14:useLocalDpi xmlns:a14="http://schemas.microsoft.com/office/drawing/2010/main" val="0"/>
+              </a:ext>
+            </a:extLst>
+          </a:blip>
+          <a:srcRect/>
+          <a:stretch>
+            <a:fillRect/>
+          </a:stretch>
+        </p:blipFill>
+        <p:spPr bwMode="auto">
+          <a:xfrm>
+            <a:off x="1579031" y="254113"/>
+            <a:ext cx="2814038" cy="1581831"/>
+          </a:xfrm>
+          <a:prstGeom prst="rect">
+            <a:avLst/>
+          </a:prstGeom>
+          <a:noFill/>
+          <a:extLst>
+            <a:ext uri="{909E8E84-426E-40DD-AFC4-6F175D3DCCD1}">
+              <a14:hiddenFill xmlns:a14="http://schemas.microsoft.com/office/drawing/2010/main">
+                <a:solidFill>
+                  <a:srgbClr val="FFFFFF"/>
+                </a:solidFill>
+              </a14:hiddenFill>
+            </a:ext>
+          </a:extLst>
+        </p:spPr>
+      </p:pic>
+      <p:sp>
+        <p:nvSpPr>
+          <p:cNvPr id="4" name="TextBox 3"/>
+          <p:cNvSpPr txBox="1"/>
+          <p:nvPr/>
+        </p:nvSpPr>
+        <p:spPr>
+          <a:xfrm>
+            <a:off x="5617029" y="1045029"/>
+            <a:ext cx="4557485" cy="3970318"/>
+          </a:xfrm>
+          <a:prstGeom prst="rect">
+            <a:avLst/>
+          </a:prstGeom>
+          <a:noFill/>
+        </p:spPr>
+        <p:txBody>
+          <a:bodyPr wrap="square" rtlCol="0">
+            <a:spAutoFit/>
+          </a:bodyPr>
+          <a:lstStyle/>
+          <a:p>
+            <a:r>
+              <a:rPr lang="de-DE" dirty="0" err="1" smtClean="0"/>
+              <a:t>Photo</a:t>
+            </a:r>
+            <a:r>
+              <a:rPr lang="de-DE" dirty="0" smtClean="0"/>
+              <a:t> </a:t>
+            </a:r>
+            <a:r>
+              <a:rPr lang="de-DE" dirty="0" err="1" smtClean="0"/>
+              <a:t>from</a:t>
+            </a:r>
+            <a:r>
+              <a:rPr lang="de-DE" dirty="0" smtClean="0"/>
+              <a:t> </a:t>
+            </a:r>
+            <a:r>
+              <a:rPr lang="de-DE" dirty="0" err="1" smtClean="0"/>
+              <a:t>space</a:t>
+            </a:r>
+            <a:r>
+              <a:rPr lang="en-US" dirty="0" smtClean="0"/>
+              <a:t> to earth with question “what do you so” </a:t>
+            </a:r>
+            <a:r>
+              <a:rPr lang="en-US" dirty="0" smtClean="0">
+                <a:sym typeface="Wingdings" panose="05000000000000000000" pitchFamily="2" charset="2"/>
+              </a:rPr>
+              <a:t>hydrogen as XX% is hydrogen</a:t>
+            </a:r>
+            <a:endParaRPr lang="en-US" dirty="0" smtClean="0"/>
+          </a:p>
+          <a:p>
+            <a:endParaRPr lang="de-DE" dirty="0" smtClean="0"/>
+          </a:p>
+          <a:p>
+            <a:endParaRPr lang="de-DE" dirty="0"/>
+          </a:p>
+          <a:p>
+            <a:endParaRPr lang="de-DE" dirty="0" smtClean="0"/>
+          </a:p>
+          <a:p>
+            <a:endParaRPr lang="de-DE" dirty="0"/>
+          </a:p>
+          <a:p>
+            <a:r>
+              <a:rPr lang="de-DE" dirty="0" err="1" smtClean="0"/>
+              <a:t>Several</a:t>
+            </a:r>
+            <a:r>
+              <a:rPr lang="de-DE" dirty="0" smtClean="0"/>
+              <a:t> non </a:t>
+            </a:r>
+            <a:r>
+              <a:rPr lang="de-DE" dirty="0" err="1" smtClean="0"/>
+              <a:t>related</a:t>
+            </a:r>
+            <a:r>
+              <a:rPr lang="de-DE" dirty="0" smtClean="0"/>
+              <a:t> </a:t>
+            </a:r>
+            <a:r>
+              <a:rPr lang="de-DE" dirty="0" err="1" smtClean="0"/>
+              <a:t>pictures</a:t>
+            </a:r>
+            <a:r>
+              <a:rPr lang="de-DE" dirty="0" smtClean="0"/>
+              <a:t> </a:t>
+            </a:r>
+            <a:r>
+              <a:rPr lang="de-DE" dirty="0" err="1" smtClean="0"/>
+              <a:t>of</a:t>
+            </a:r>
+            <a:r>
+              <a:rPr lang="de-DE" dirty="0" smtClean="0"/>
+              <a:t> hydrogen, </a:t>
+            </a:r>
+            <a:r>
+              <a:rPr lang="de-DE" dirty="0" err="1" smtClean="0"/>
+              <a:t>question</a:t>
+            </a:r>
+            <a:r>
+              <a:rPr lang="de-DE" dirty="0" smtClean="0"/>
+              <a:t> </a:t>
+            </a:r>
+            <a:r>
+              <a:rPr lang="de-DE" dirty="0" err="1" smtClean="0"/>
+              <a:t>before</a:t>
+            </a:r>
+            <a:r>
+              <a:rPr lang="de-DE" dirty="0" smtClean="0"/>
+              <a:t> </a:t>
+            </a:r>
+            <a:r>
+              <a:rPr lang="de-DE" dirty="0" err="1" smtClean="0"/>
+              <a:t>the</a:t>
+            </a:r>
+            <a:r>
+              <a:rPr lang="de-DE" dirty="0" smtClean="0"/>
+              <a:t> </a:t>
+            </a:r>
+            <a:r>
+              <a:rPr lang="de-DE" dirty="0" err="1" smtClean="0"/>
+              <a:t>statement</a:t>
+            </a:r>
+            <a:r>
+              <a:rPr lang="de-DE" dirty="0" smtClean="0"/>
+              <a:t> „</a:t>
+            </a:r>
+            <a:r>
+              <a:rPr lang="de-DE" dirty="0" err="1" smtClean="0"/>
+              <a:t>what</a:t>
+            </a:r>
+            <a:r>
+              <a:rPr lang="de-DE" dirty="0" smtClean="0"/>
+              <a:t> do </a:t>
+            </a:r>
+            <a:r>
+              <a:rPr lang="de-DE" dirty="0" err="1" smtClean="0"/>
+              <a:t>they</a:t>
+            </a:r>
+            <a:r>
+              <a:rPr lang="de-DE" dirty="0" smtClean="0"/>
+              <a:t> </a:t>
+            </a:r>
+            <a:r>
+              <a:rPr lang="de-DE" dirty="0" err="1" smtClean="0"/>
+              <a:t>have</a:t>
+            </a:r>
+            <a:r>
+              <a:rPr lang="de-DE" dirty="0" smtClean="0"/>
+              <a:t> in </a:t>
+            </a:r>
+            <a:r>
+              <a:rPr lang="de-DE" dirty="0" err="1" smtClean="0"/>
+              <a:t>common</a:t>
+            </a:r>
+            <a:r>
+              <a:rPr lang="de-DE" dirty="0" smtClean="0"/>
+              <a:t>“ </a:t>
+            </a:r>
+            <a:r>
+              <a:rPr lang="de-DE" dirty="0" smtClean="0">
+                <a:sym typeface="Wingdings" panose="05000000000000000000" pitchFamily="2" charset="2"/>
+              </a:rPr>
+              <a:t></a:t>
+            </a:r>
+            <a:r>
+              <a:rPr lang="de-DE" dirty="0" smtClean="0"/>
+              <a:t>hydrogen</a:t>
+            </a:r>
+            <a:endParaRPr lang="de-DE" dirty="0"/>
+          </a:p>
+          <a:p>
+            <a:endParaRPr lang="de-DE" dirty="0" smtClean="0"/>
+          </a:p>
+          <a:p>
+            <a:endParaRPr lang="de-DE" dirty="0"/>
+          </a:p>
+          <a:p>
+            <a:endParaRPr lang="de-DE" dirty="0" smtClean="0"/>
+          </a:p>
+          <a:p>
+            <a:endParaRPr lang="de-DE" dirty="0" smtClean="0"/>
+          </a:p>
+        </p:txBody>
+      </p:sp>
+      <p:pic>
+        <p:nvPicPr>
+          <p:cNvPr id="1030" name="Picture 6" descr="http://www.innercirclecorona.com/wp-content/uploads//2012/03/article-1280836382991-006ED8C000000258-625706_636x573.jpg"/>
+          <p:cNvPicPr>
+            <a:picLocks noChangeAspect="1" noChangeArrowheads="1"/>
+          </p:cNvPicPr>
+          <p:nvPr/>
+        </p:nvPicPr>
+        <p:blipFill>
+          <a:blip r:embed="rId4">
+            <a:extLst>
+              <a:ext uri="{28A0092B-C50C-407E-A947-70E740481C1C}">
+                <a14:useLocalDpi xmlns:a14="http://schemas.microsoft.com/office/drawing/2010/main" val="0"/>
+              </a:ext>
+            </a:extLst>
+          </a:blip>
+          <a:srcRect/>
+          <a:stretch>
+            <a:fillRect/>
+          </a:stretch>
+        </p:blipFill>
+        <p:spPr bwMode="auto">
+          <a:xfrm>
+            <a:off x="2707432" y="1957855"/>
+            <a:ext cx="2843806" cy="2293825"/>
+          </a:xfrm>
+          <a:prstGeom prst="rect">
+            <a:avLst/>
+          </a:prstGeom>
+          <a:noFill/>
+          <a:extLst>
+            <a:ext uri="{909E8E84-426E-40DD-AFC4-6F175D3DCCD1}">
+              <a14:hiddenFill xmlns:a14="http://schemas.microsoft.com/office/drawing/2010/main">
+                <a:solidFill>
+                  <a:srgbClr val="FFFFFF"/>
+                </a:solidFill>
+              </a14:hiddenFill>
+            </a:ext>
+          </a:extLst>
+        </p:spPr>
+      </p:pic>
+      <p:pic>
+        <p:nvPicPr>
+          <p:cNvPr id="1032" name="Picture 8" descr="http://images-of-elements.com/hydrogen.jpg"/>
+          <p:cNvPicPr>
+            <a:picLocks noChangeAspect="1" noChangeArrowheads="1"/>
+          </p:cNvPicPr>
+          <p:nvPr/>
+        </p:nvPicPr>
+        <p:blipFill>
+          <a:blip r:embed="rId5" cstate="print">
+            <a:extLst>
+              <a:ext uri="{28A0092B-C50C-407E-A947-70E740481C1C}">
+                <a14:useLocalDpi xmlns:a14="http://schemas.microsoft.com/office/drawing/2010/main" val="0"/>
+              </a:ext>
+            </a:extLst>
+          </a:blip>
+          <a:srcRect/>
+          <a:stretch>
+            <a:fillRect/>
+          </a:stretch>
+        </p:blipFill>
+        <p:spPr bwMode="auto">
+          <a:xfrm>
+            <a:off x="290285" y="2290232"/>
+            <a:ext cx="2171116" cy="2171117"/>
+          </a:xfrm>
+          <a:prstGeom prst="rect">
+            <a:avLst/>
+          </a:prstGeom>
+          <a:noFill/>
+          <a:extLst>
+            <a:ext uri="{909E8E84-426E-40DD-AFC4-6F175D3DCCD1}">
+              <a14:hiddenFill xmlns:a14="http://schemas.microsoft.com/office/drawing/2010/main">
+                <a:solidFill>
+                  <a:srgbClr val="FFFFFF"/>
+                </a:solidFill>
+              </a14:hiddenFill>
+            </a:ext>
+          </a:extLst>
+        </p:spPr>
+      </p:pic>
     </p:spTree>
     <p:extLst>
       <p:ext uri="{BB962C8B-B14F-4D97-AF65-F5344CB8AC3E}">
-        <p14:creationId xmlns:p14="http://schemas.microsoft.com/office/powerpoint/2010/main" val="2491292434"/>
+        <p14:creationId xmlns:p14="http://schemas.microsoft.com/office/powerpoint/2010/main" val="3994317280"/>
       </p:ext>
     </p:extLst>
   </p:cSld>
@@ -11202,6 +11365,168 @@
           <a:chExt cx="0" cy="0"/>
         </a:xfrm>
       </p:grpSpPr>
+      <p:pic>
+        <p:nvPicPr>
+          <p:cNvPr id="7" name="Picture 6"/>
+          <p:cNvPicPr>
+            <a:picLocks noChangeAspect="1"/>
+          </p:cNvPicPr>
+          <p:nvPr/>
+        </p:nvPicPr>
+        <p:blipFill>
+          <a:blip r:embed="rId2">
+            <a:extLst>
+              <a:ext uri="{28A0092B-C50C-407E-A947-70E740481C1C}">
+                <a14:useLocalDpi xmlns:a14="http://schemas.microsoft.com/office/drawing/2010/main" val="0"/>
+              </a:ext>
+            </a:extLst>
+          </a:blip>
+          <a:stretch>
+            <a:fillRect/>
+          </a:stretch>
+        </p:blipFill>
+        <p:spPr>
+          <a:xfrm>
+            <a:off x="1406434" y="47753"/>
+            <a:ext cx="9440091" cy="4537766"/>
+          </a:xfrm>
+          <a:prstGeom prst="rect">
+            <a:avLst/>
+          </a:prstGeom>
+        </p:spPr>
+      </p:pic>
+      <p:sp>
+        <p:nvSpPr>
+          <p:cNvPr id="2" name="Title 1"/>
+          <p:cNvSpPr>
+            <a:spLocks noGrp="1"/>
+          </p:cNvSpPr>
+          <p:nvPr>
+            <p:ph type="ctrTitle"/>
+          </p:nvPr>
+        </p:nvSpPr>
+        <p:spPr/>
+        <p:txBody>
+          <a:bodyPr>
+            <a:normAutofit/>
+          </a:bodyPr>
+          <a:lstStyle/>
+          <a:p>
+            <a:r>
+              <a:rPr lang="en-US" sz="6000" dirty="0" smtClean="0"/>
+              <a:t>FUEL CELL INDUSTRY ANALYSIS REPORT</a:t>
+            </a:r>
+            <a:endParaRPr lang="en-US" sz="6000" dirty="0"/>
+          </a:p>
+        </p:txBody>
+      </p:sp>
+      <p:sp>
+        <p:nvSpPr>
+          <p:cNvPr id="3" name="Subtitle 2"/>
+          <p:cNvSpPr>
+            <a:spLocks noGrp="1"/>
+          </p:cNvSpPr>
+          <p:nvPr>
+            <p:ph type="subTitle" idx="1"/>
+          </p:nvPr>
+        </p:nvSpPr>
+        <p:spPr/>
+        <p:txBody>
+          <a:bodyPr/>
+          <a:lstStyle/>
+          <a:p>
+            <a:r>
+              <a:rPr lang="en-US" dirty="0" smtClean="0"/>
+              <a:t>Global Manufacturing Strategy</a:t>
+            </a:r>
+            <a:endParaRPr lang="en-US" dirty="0"/>
+          </a:p>
+        </p:txBody>
+      </p:sp>
+      <p:sp>
+        <p:nvSpPr>
+          <p:cNvPr id="5" name="Espace réservé du pied de page 4"/>
+          <p:cNvSpPr>
+            <a:spLocks noGrp="1"/>
+          </p:cNvSpPr>
+          <p:nvPr>
+            <p:ph type="ftr" sz="quarter" idx="11"/>
+          </p:nvPr>
+        </p:nvSpPr>
+        <p:spPr/>
+        <p:txBody>
+          <a:bodyPr/>
+          <a:lstStyle/>
+          <a:p>
+            <a:r>
+              <a:rPr lang="fr-FR" smtClean="0"/>
+              <a:t>Bambu - 17.06.2015</a:t>
+            </a:r>
+            <a:endParaRPr lang="fr-FR" dirty="0"/>
+          </a:p>
+        </p:txBody>
+      </p:sp>
+      <p:sp>
+        <p:nvSpPr>
+          <p:cNvPr id="6" name="Espace réservé du numéro de diapositive 5"/>
+          <p:cNvSpPr>
+            <a:spLocks noGrp="1"/>
+          </p:cNvSpPr>
+          <p:nvPr>
+            <p:ph type="sldNum" sz="quarter" idx="12"/>
+          </p:nvPr>
+        </p:nvSpPr>
+        <p:spPr/>
+        <p:txBody>
+          <a:bodyPr/>
+          <a:lstStyle/>
+          <a:p>
+            <a:fld id="{D376626B-8044-4126-A03C-8C0AE257EC41}" type="slidenum">
+              <a:rPr lang="fr-FR" smtClean="0"/>
+              <a:pPr/>
+              <a:t>2</a:t>
+            </a:fld>
+            <a:endParaRPr lang="fr-FR" dirty="0"/>
+          </a:p>
+        </p:txBody>
+      </p:sp>
+    </p:spTree>
+    <p:extLst>
+      <p:ext uri="{BB962C8B-B14F-4D97-AF65-F5344CB8AC3E}">
+        <p14:creationId xmlns:p14="http://schemas.microsoft.com/office/powerpoint/2010/main" val="2491292434"/>
+      </p:ext>
+    </p:extLst>
+  </p:cSld>
+  <p:clrMapOvr>
+    <a:masterClrMapping/>
+  </p:clrMapOvr>
+  <p:timing>
+    <p:tnLst>
+      <p:par>
+        <p:cTn id="1" dur="indefinite" restart="never" nodeType="tmRoot"/>
+      </p:par>
+    </p:tnLst>
+  </p:timing>
+</p:sld>
+</file>
+
+<file path=ppt/slides/slide3.xml><?xml version="1.0" encoding="utf-8"?>
+<p:sld xmlns:a="http://schemas.openxmlformats.org/drawingml/2006/main" xmlns:r="http://schemas.openxmlformats.org/officeDocument/2006/relationships" xmlns:p="http://schemas.openxmlformats.org/presentationml/2006/main">
+  <p:cSld>
+    <p:spTree>
+      <p:nvGrpSpPr>
+        <p:cNvPr id="1" name=""/>
+        <p:cNvGrpSpPr/>
+        <p:nvPr/>
+      </p:nvGrpSpPr>
+      <p:grpSpPr>
+        <a:xfrm>
+          <a:off x="0" y="0"/>
+          <a:ext cx="0" cy="0"/>
+          <a:chOff x="0" y="0"/>
+          <a:chExt cx="0" cy="0"/>
+        </a:xfrm>
+      </p:grpSpPr>
       <p:sp>
         <p:nvSpPr>
           <p:cNvPr id="2" name="Titre 1"/>
@@ -11218,10 +11543,10 @@
           <a:lstStyle/>
           <a:p>
             <a:r>
-              <a:rPr lang="fr-FR" dirty="0" smtClean="0"/>
+              <a:rPr lang="en-US" dirty="0" smtClean="0"/>
               <a:t>BAMBU, THE TEAM</a:t>
             </a:r>
-            <a:endParaRPr lang="fr-FR" dirty="0"/>
+            <a:endParaRPr lang="en-US" dirty="0"/>
           </a:p>
         </p:txBody>
       </p:sp>
@@ -11235,7 +11560,7 @@
             <p:ph idx="1"/>
             <p:extLst>
               <p:ext uri="{D42A27DB-BD31-4B8C-83A1-F6EECF244321}">
-                <p14:modId xmlns:p14="http://schemas.microsoft.com/office/powerpoint/2010/main" val="1770901194"/>
+                <p14:modId xmlns:p14="http://schemas.microsoft.com/office/powerpoint/2010/main" val="2142305079"/>
               </p:ext>
             </p:extLst>
           </p:nvPr>
@@ -11315,7 +11640,7 @@
                     <a:bodyPr/>
                     <a:lstStyle/>
                     <a:p>
-                      <a:endParaRPr lang="fr-FR"/>
+                      <a:endParaRPr lang="fr-FR" dirty="0"/>
                     </a:p>
                   </a:txBody>
                   <a:tcPr>
@@ -11873,10 +12198,14 @@
           <a:lstStyle/>
           <a:p>
             <a:r>
-              <a:rPr lang="fr-FR" smtClean="0"/>
-              <a:t>Banmbu - 20/05/2015</a:t>
-            </a:r>
-            <a:endParaRPr lang="fr-FR"/>
+              <a:rPr lang="en-US" dirty="0" err="1" smtClean="0"/>
+              <a:t>Bambu</a:t>
+            </a:r>
+            <a:r>
+              <a:rPr lang="en-US" dirty="0" smtClean="0"/>
+              <a:t> - 17.06.2015</a:t>
+            </a:r>
+            <a:endParaRPr lang="en-US" dirty="0"/>
           </a:p>
         </p:txBody>
       </p:sp>
@@ -11896,10 +12225,10 @@
           <a:lstStyle/>
           <a:p>
             <a:fld id="{D376626B-8044-4126-A03C-8C0AE257EC41}" type="slidenum">
-              <a:rPr lang="fr-FR" smtClean="0"/>
-              <a:t>2</a:t>
+              <a:rPr lang="en-US" smtClean="0"/>
+              <a:t>3</a:t>
             </a:fld>
-            <a:endParaRPr lang="fr-FR"/>
+            <a:endParaRPr lang="en-US" dirty="0"/>
           </a:p>
         </p:txBody>
       </p:sp>
@@ -12155,7 +12484,7 @@
 </p:sld>
 </file>
 
-<file path=ppt/slides/slide3.xml><?xml version="1.0" encoding="utf-8"?>
+<file path=ppt/slides/slide4.xml><?xml version="1.0" encoding="utf-8"?>
 <p:sld xmlns:a="http://schemas.openxmlformats.org/drawingml/2006/main" xmlns:r="http://schemas.openxmlformats.org/officeDocument/2006/relationships" xmlns:p="http://schemas.openxmlformats.org/presentationml/2006/main">
   <p:cSld>
     <p:spTree>
@@ -12216,119 +12545,19 @@
           <a:lstStyle/>
           <a:p>
             <a:r>
-              <a:rPr lang="fr-FR" dirty="0" smtClean="0"/>
-              <a:t>In </a:t>
-            </a:r>
-            <a:r>
-              <a:rPr lang="fr-FR" dirty="0" err="1" smtClean="0"/>
-              <a:t>terms</a:t>
-            </a:r>
-            <a:r>
-              <a:rPr lang="fr-FR" dirty="0" smtClean="0"/>
-              <a:t> of </a:t>
-            </a:r>
-            <a:r>
-              <a:rPr lang="fr-FR" dirty="0" err="1" smtClean="0"/>
-              <a:t>number</a:t>
-            </a:r>
-            <a:r>
-              <a:rPr lang="fr-FR" dirty="0" smtClean="0"/>
-              <a:t> of </a:t>
-            </a:r>
-            <a:r>
-              <a:rPr lang="fr-FR" dirty="0" err="1" smtClean="0"/>
-              <a:t>molecules</a:t>
-            </a:r>
-            <a:r>
-              <a:rPr lang="fr-FR" dirty="0" smtClean="0"/>
-              <a:t>, </a:t>
-            </a:r>
-            <a:r>
-              <a:rPr lang="fr-FR" dirty="0" err="1" smtClean="0"/>
-              <a:t>Hydrogen</a:t>
-            </a:r>
-            <a:r>
-              <a:rPr lang="fr-FR" dirty="0" smtClean="0"/>
-              <a:t> </a:t>
-            </a:r>
-            <a:r>
-              <a:rPr lang="fr-FR" dirty="0" err="1" smtClean="0"/>
-              <a:t>is</a:t>
-            </a:r>
-            <a:r>
-              <a:rPr lang="fr-FR" dirty="0" smtClean="0"/>
-              <a:t> the </a:t>
-            </a:r>
-            <a:r>
-              <a:rPr lang="fr-FR" dirty="0" err="1" smtClean="0"/>
-              <a:t>most</a:t>
-            </a:r>
-            <a:r>
-              <a:rPr lang="fr-FR" dirty="0" smtClean="0"/>
-              <a:t> </a:t>
-            </a:r>
-            <a:r>
-              <a:rPr lang="fr-FR" dirty="0" err="1" smtClean="0"/>
-              <a:t>abundant</a:t>
-            </a:r>
-            <a:r>
-              <a:rPr lang="fr-FR" dirty="0" smtClean="0"/>
-              <a:t> </a:t>
-            </a:r>
-            <a:r>
-              <a:rPr lang="fr-FR" dirty="0" err="1" smtClean="0"/>
-              <a:t>gas</a:t>
-            </a:r>
-            <a:r>
-              <a:rPr lang="fr-FR" dirty="0" smtClean="0"/>
-              <a:t> on the Solar system.</a:t>
-            </a:r>
-          </a:p>
-          <a:p>
-            <a:endParaRPr lang="fr-FR" dirty="0"/>
-          </a:p>
-          <a:p>
-            <a:r>
-              <a:rPr lang="fr-FR" dirty="0" err="1" smtClean="0"/>
-              <a:t>Its</a:t>
-            </a:r>
-            <a:r>
-              <a:rPr lang="fr-FR" dirty="0" smtClean="0"/>
-              <a:t> </a:t>
-            </a:r>
-            <a:r>
-              <a:rPr lang="fr-FR" dirty="0" err="1" smtClean="0"/>
-              <a:t>combination</a:t>
-            </a:r>
-            <a:r>
-              <a:rPr lang="fr-FR" dirty="0" smtClean="0"/>
-              <a:t> </a:t>
-            </a:r>
-            <a:r>
-              <a:rPr lang="fr-FR" dirty="0" err="1" smtClean="0"/>
-              <a:t>with</a:t>
-            </a:r>
-            <a:r>
-              <a:rPr lang="fr-FR" dirty="0" smtClean="0"/>
-              <a:t> </a:t>
-            </a:r>
-            <a:r>
-              <a:rPr lang="fr-FR" dirty="0" err="1" smtClean="0"/>
-              <a:t>Oxygen</a:t>
-            </a:r>
-            <a:r>
-              <a:rPr lang="fr-FR" dirty="0" smtClean="0"/>
-              <a:t> </a:t>
-            </a:r>
-            <a:r>
-              <a:rPr lang="fr-FR" dirty="0" err="1" smtClean="0"/>
-              <a:t>can</a:t>
-            </a:r>
-            <a:r>
-              <a:rPr lang="fr-FR" dirty="0" smtClean="0"/>
-              <a:t> lead to</a:t>
-            </a:r>
-            <a:endParaRPr lang="fr-FR" dirty="0"/>
+              <a:rPr lang="en-US" dirty="0" smtClean="0"/>
+              <a:t>In terms of number of molecules, Hydrogen is the most abundant gas on the Solar system.</a:t>
+            </a:r>
+          </a:p>
+          <a:p>
+            <a:endParaRPr lang="en-US" dirty="0" smtClean="0"/>
+          </a:p>
+          <a:p>
+            <a:r>
+              <a:rPr lang="en-US" dirty="0" smtClean="0"/>
+              <a:t>Its combination with Oxygen can lead to</a:t>
+            </a:r>
+            <a:endParaRPr lang="en-US" dirty="0"/>
           </a:p>
         </p:txBody>
       </p:sp>
@@ -12349,9 +12578,9 @@
           <a:p>
             <a:r>
               <a:rPr lang="fr-FR" smtClean="0"/>
-              <a:t>Banmbu - 20/05/2015</a:t>
-            </a:r>
-            <a:endParaRPr lang="fr-FR"/>
+              <a:t>Bambu - 17.06.2015</a:t>
+            </a:r>
+            <a:endParaRPr lang="fr-FR" dirty="0"/>
           </a:p>
         </p:txBody>
       </p:sp>
@@ -12372,7 +12601,7 @@
           <a:p>
             <a:fld id="{D376626B-8044-4126-A03C-8C0AE257EC41}" type="slidenum">
               <a:rPr lang="fr-FR" smtClean="0"/>
-              <a:t>3</a:t>
+              <a:t>4</a:t>
             </a:fld>
             <a:endParaRPr lang="fr-FR"/>
           </a:p>
@@ -12478,7 +12707,7 @@
 </p:sld>
 </file>
 
-<file path=ppt/slides/slide4.xml><?xml version="1.0" encoding="utf-8"?>
+<file path=ppt/slides/slide5.xml><?xml version="1.0" encoding="utf-8"?>
 <p:sld xmlns:a="http://schemas.openxmlformats.org/drawingml/2006/main" xmlns:r="http://schemas.openxmlformats.org/officeDocument/2006/relationships" xmlns:p="http://schemas.openxmlformats.org/presentationml/2006/main">
   <p:cSld>
     <p:bg>
@@ -13280,7 +13509,7 @@
           <p:nvPr>
             <p:extLst>
               <p:ext uri="{D42A27DB-BD31-4B8C-83A1-F6EECF244321}">
-                <p14:modId xmlns:p14="http://schemas.microsoft.com/office/powerpoint/2010/main" val="932583963"/>
+                <p14:modId xmlns:p14="http://schemas.microsoft.com/office/powerpoint/2010/main" val="2098424711"/>
               </p:ext>
             </p:extLst>
           </p:nvPr>
@@ -13312,9 +13541,9 @@
           <a:p>
             <a:r>
               <a:rPr lang="fr-FR" smtClean="0"/>
-              <a:t>Banmbu - 20/05/2015</a:t>
-            </a:r>
-            <a:endParaRPr lang="fr-FR"/>
+              <a:t>Bambu - 17.06.2015</a:t>
+            </a:r>
+            <a:endParaRPr lang="fr-FR" dirty="0"/>
           </a:p>
         </p:txBody>
       </p:sp>
@@ -13335,7 +13564,7 @@
           <a:p>
             <a:fld id="{D376626B-8044-4126-A03C-8C0AE257EC41}" type="slidenum">
               <a:rPr lang="fr-FR" smtClean="0"/>
-              <a:t>4</a:t>
+              <a:t>5</a:t>
             </a:fld>
             <a:endParaRPr lang="fr-FR"/>
           </a:p>
@@ -13358,210 +13587,6 @@
       </p:par>
     </p:tnLst>
   </p:timing>
-</p:sld>
-</file>
-
-<file path=ppt/slides/slide5.xml><?xml version="1.0" encoding="utf-8"?>
-<p:sld xmlns:a="http://schemas.openxmlformats.org/drawingml/2006/main" xmlns:r="http://schemas.openxmlformats.org/officeDocument/2006/relationships" xmlns:p="http://schemas.openxmlformats.org/presentationml/2006/main">
-  <p:cSld>
-    <p:spTree>
-      <p:nvGrpSpPr>
-        <p:cNvPr id="1" name=""/>
-        <p:cNvGrpSpPr/>
-        <p:nvPr/>
-      </p:nvGrpSpPr>
-      <p:grpSpPr>
-        <a:xfrm>
-          <a:off x="0" y="0"/>
-          <a:ext cx="0" cy="0"/>
-          <a:chOff x="0" y="0"/>
-          <a:chExt cx="0" cy="0"/>
-        </a:xfrm>
-      </p:grpSpPr>
-      <p:sp>
-        <p:nvSpPr>
-          <p:cNvPr id="2" name="Titre 1"/>
-          <p:cNvSpPr>
-            <a:spLocks noGrp="1"/>
-          </p:cNvSpPr>
-          <p:nvPr>
-            <p:ph type="title"/>
-          </p:nvPr>
-        </p:nvSpPr>
-        <p:spPr/>
-        <p:txBody>
-          <a:bodyPr/>
-          <a:lstStyle/>
-          <a:p>
-            <a:r>
-              <a:rPr lang="fr-FR" dirty="0"/>
-              <a:t>RESOURCES</a:t>
-            </a:r>
-          </a:p>
-        </p:txBody>
-      </p:sp>
-      <p:sp>
-        <p:nvSpPr>
-          <p:cNvPr id="3" name="Espace réservé du contenu 2"/>
-          <p:cNvSpPr>
-            <a:spLocks noGrp="1"/>
-          </p:cNvSpPr>
-          <p:nvPr>
-            <p:ph sz="half" idx="1"/>
-          </p:nvPr>
-        </p:nvSpPr>
-        <p:spPr/>
-        <p:txBody>
-          <a:bodyPr/>
-          <a:lstStyle/>
-          <a:p>
-            <a:pPr marL="201159" lvl="1" indent="0">
-              <a:buNone/>
-            </a:pPr>
-            <a:r>
-              <a:rPr lang="fr-FR" dirty="0"/>
-              <a:t>ONLINE </a:t>
-            </a:r>
-            <a:r>
-              <a:rPr lang="fr-FR" dirty="0" err="1"/>
-              <a:t>TOols</a:t>
-            </a:r>
-            <a:endParaRPr lang="fr-FR" dirty="0"/>
-          </a:p>
-          <a:p>
-            <a:pPr lvl="1"/>
-            <a:r>
-              <a:rPr lang="en-US" dirty="0" smtClean="0"/>
-              <a:t>GitHub</a:t>
-            </a:r>
-            <a:endParaRPr lang="fr-FR" dirty="0"/>
-          </a:p>
-          <a:p>
-            <a:pPr lvl="1"/>
-            <a:r>
-              <a:rPr lang="en-US" dirty="0" err="1"/>
-              <a:t>Teambition</a:t>
-            </a:r>
-            <a:endParaRPr lang="fr-FR" dirty="0"/>
-          </a:p>
-          <a:p>
-            <a:endParaRPr lang="fr-FR" dirty="0"/>
-          </a:p>
-        </p:txBody>
-      </p:sp>
-      <p:sp>
-        <p:nvSpPr>
-          <p:cNvPr id="4" name="Espace réservé du contenu 3"/>
-          <p:cNvSpPr>
-            <a:spLocks noGrp="1"/>
-          </p:cNvSpPr>
-          <p:nvPr>
-            <p:ph sz="half" idx="2"/>
-          </p:nvPr>
-        </p:nvSpPr>
-        <p:spPr/>
-        <p:txBody>
-          <a:bodyPr/>
-          <a:lstStyle/>
-          <a:p>
-            <a:pPr marL="201159" lvl="1" indent="0">
-              <a:buNone/>
-            </a:pPr>
-            <a:r>
-              <a:rPr lang="fr-FR" dirty="0" smtClean="0"/>
-              <a:t>SOFTWARES</a:t>
-            </a:r>
-            <a:endParaRPr lang="en-US" dirty="0" smtClean="0"/>
-          </a:p>
-          <a:p>
-            <a:pPr lvl="1"/>
-            <a:r>
-              <a:rPr lang="en-US" dirty="0" smtClean="0"/>
-              <a:t>MS </a:t>
-            </a:r>
-            <a:r>
-              <a:rPr lang="en-US" dirty="0"/>
-              <a:t>Office</a:t>
-            </a:r>
-            <a:endParaRPr lang="fr-FR" dirty="0"/>
-          </a:p>
-          <a:p>
-            <a:pPr lvl="1"/>
-            <a:r>
-              <a:rPr lang="en-US" dirty="0"/>
-              <a:t>Atom</a:t>
-            </a:r>
-            <a:endParaRPr lang="fr-FR" dirty="0"/>
-          </a:p>
-          <a:p>
-            <a:pPr lvl="1"/>
-            <a:r>
-              <a:rPr lang="en-US" dirty="0" err="1"/>
-              <a:t>Citavi</a:t>
-            </a:r>
-            <a:endParaRPr lang="fr-FR" dirty="0"/>
-          </a:p>
-          <a:p>
-            <a:endParaRPr lang="fr-FR" dirty="0"/>
-          </a:p>
-        </p:txBody>
-      </p:sp>
-      <p:sp>
-        <p:nvSpPr>
-          <p:cNvPr id="5" name="Espace réservé du pied de page 4"/>
-          <p:cNvSpPr>
-            <a:spLocks noGrp="1"/>
-          </p:cNvSpPr>
-          <p:nvPr>
-            <p:ph type="ftr" sz="quarter" idx="11"/>
-          </p:nvPr>
-        </p:nvSpPr>
-        <p:spPr/>
-        <p:txBody>
-          <a:bodyPr/>
-          <a:lstStyle/>
-          <a:p>
-            <a:r>
-              <a:rPr lang="fr-FR" smtClean="0"/>
-              <a:t>Banmbu - 20/05/2015</a:t>
-            </a:r>
-            <a:endParaRPr lang="fr-FR"/>
-          </a:p>
-        </p:txBody>
-      </p:sp>
-      <p:sp>
-        <p:nvSpPr>
-          <p:cNvPr id="6" name="Espace réservé du numéro de diapositive 5"/>
-          <p:cNvSpPr>
-            <a:spLocks noGrp="1"/>
-          </p:cNvSpPr>
-          <p:nvPr>
-            <p:ph type="sldNum" sz="quarter" idx="12"/>
-          </p:nvPr>
-        </p:nvSpPr>
-        <p:spPr/>
-        <p:txBody>
-          <a:bodyPr/>
-          <a:lstStyle/>
-          <a:p>
-            <a:fld id="{D376626B-8044-4126-A03C-8C0AE257EC41}" type="slidenum">
-              <a:rPr lang="fr-FR" smtClean="0"/>
-              <a:t>5</a:t>
-            </a:fld>
-            <a:endParaRPr lang="fr-FR"/>
-          </a:p>
-        </p:txBody>
-      </p:sp>
-    </p:spTree>
-    <p:extLst>
-      <p:ext uri="{BB962C8B-B14F-4D97-AF65-F5344CB8AC3E}">
-        <p14:creationId xmlns:p14="http://schemas.microsoft.com/office/powerpoint/2010/main" val="3119211585"/>
-      </p:ext>
-    </p:extLst>
-  </p:cSld>
-  <p:clrMapOvr>
-    <a:masterClrMapping/>
-  </p:clrMapOvr>
 </p:sld>
 </file>
 
@@ -13598,6 +13623,451 @@
           <a:lstStyle/>
           <a:p>
             <a:r>
+              <a:rPr lang="fr-FR" dirty="0"/>
+              <a:t>RESOURCES</a:t>
+            </a:r>
+          </a:p>
+        </p:txBody>
+      </p:sp>
+      <p:sp>
+        <p:nvSpPr>
+          <p:cNvPr id="3" name="Espace réservé du contenu 2"/>
+          <p:cNvSpPr>
+            <a:spLocks noGrp="1"/>
+          </p:cNvSpPr>
+          <p:nvPr>
+            <p:ph sz="half" idx="1"/>
+          </p:nvPr>
+        </p:nvSpPr>
+        <p:spPr/>
+        <p:txBody>
+          <a:bodyPr/>
+          <a:lstStyle/>
+          <a:p>
+            <a:pPr marL="201159" lvl="1" indent="0">
+              <a:buNone/>
+            </a:pPr>
+            <a:r>
+              <a:rPr lang="fr-FR" dirty="0"/>
+              <a:t>ONLINE </a:t>
+            </a:r>
+            <a:r>
+              <a:rPr lang="fr-FR" dirty="0" err="1"/>
+              <a:t>TOols</a:t>
+            </a:r>
+            <a:endParaRPr lang="fr-FR" dirty="0"/>
+          </a:p>
+          <a:p>
+            <a:pPr lvl="1"/>
+            <a:r>
+              <a:rPr lang="en-US" dirty="0" smtClean="0"/>
+              <a:t>GitHub</a:t>
+            </a:r>
+            <a:endParaRPr lang="fr-FR" dirty="0"/>
+          </a:p>
+          <a:p>
+            <a:pPr lvl="1"/>
+            <a:r>
+              <a:rPr lang="en-US" dirty="0" err="1"/>
+              <a:t>Teambition</a:t>
+            </a:r>
+            <a:endParaRPr lang="fr-FR" dirty="0"/>
+          </a:p>
+          <a:p>
+            <a:endParaRPr lang="fr-FR" dirty="0"/>
+          </a:p>
+        </p:txBody>
+      </p:sp>
+      <p:sp>
+        <p:nvSpPr>
+          <p:cNvPr id="4" name="Espace réservé du contenu 3"/>
+          <p:cNvSpPr>
+            <a:spLocks noGrp="1"/>
+          </p:cNvSpPr>
+          <p:nvPr>
+            <p:ph sz="half" idx="2"/>
+          </p:nvPr>
+        </p:nvSpPr>
+        <p:spPr/>
+        <p:txBody>
+          <a:bodyPr/>
+          <a:lstStyle/>
+          <a:p>
+            <a:pPr marL="201159" lvl="1" indent="0">
+              <a:buNone/>
+            </a:pPr>
+            <a:r>
+              <a:rPr lang="fr-FR" dirty="0" smtClean="0"/>
+              <a:t>SOFTWARES</a:t>
+            </a:r>
+            <a:endParaRPr lang="en-US" dirty="0" smtClean="0"/>
+          </a:p>
+          <a:p>
+            <a:pPr lvl="1"/>
+            <a:r>
+              <a:rPr lang="en-US" dirty="0" smtClean="0"/>
+              <a:t>MS </a:t>
+            </a:r>
+            <a:r>
+              <a:rPr lang="en-US" dirty="0"/>
+              <a:t>Office</a:t>
+            </a:r>
+            <a:endParaRPr lang="fr-FR" dirty="0"/>
+          </a:p>
+          <a:p>
+            <a:pPr lvl="1"/>
+            <a:r>
+              <a:rPr lang="en-US" dirty="0"/>
+              <a:t>Atom</a:t>
+            </a:r>
+            <a:endParaRPr lang="fr-FR" dirty="0"/>
+          </a:p>
+          <a:p>
+            <a:pPr lvl="1"/>
+            <a:r>
+              <a:rPr lang="en-US" dirty="0" err="1"/>
+              <a:t>Citavi</a:t>
+            </a:r>
+            <a:endParaRPr lang="fr-FR" dirty="0"/>
+          </a:p>
+          <a:p>
+            <a:endParaRPr lang="fr-FR" dirty="0"/>
+          </a:p>
+        </p:txBody>
+      </p:sp>
+      <p:sp>
+        <p:nvSpPr>
+          <p:cNvPr id="5" name="Espace réservé du pied de page 4"/>
+          <p:cNvSpPr>
+            <a:spLocks noGrp="1"/>
+          </p:cNvSpPr>
+          <p:nvPr>
+            <p:ph type="ftr" sz="quarter" idx="11"/>
+          </p:nvPr>
+        </p:nvSpPr>
+        <p:spPr/>
+        <p:txBody>
+          <a:bodyPr/>
+          <a:lstStyle/>
+          <a:p>
+            <a:r>
+              <a:rPr lang="fr-FR" smtClean="0"/>
+              <a:t>Bambu - 17.06.2015</a:t>
+            </a:r>
+            <a:endParaRPr lang="fr-FR" dirty="0"/>
+          </a:p>
+        </p:txBody>
+      </p:sp>
+      <p:sp>
+        <p:nvSpPr>
+          <p:cNvPr id="6" name="Espace réservé du numéro de diapositive 5"/>
+          <p:cNvSpPr>
+            <a:spLocks noGrp="1"/>
+          </p:cNvSpPr>
+          <p:nvPr>
+            <p:ph type="sldNum" sz="quarter" idx="12"/>
+          </p:nvPr>
+        </p:nvSpPr>
+        <p:spPr/>
+        <p:txBody>
+          <a:bodyPr/>
+          <a:lstStyle/>
+          <a:p>
+            <a:fld id="{D376626B-8044-4126-A03C-8C0AE257EC41}" type="slidenum">
+              <a:rPr lang="fr-FR" smtClean="0"/>
+              <a:t>6</a:t>
+            </a:fld>
+            <a:endParaRPr lang="fr-FR"/>
+          </a:p>
+        </p:txBody>
+      </p:sp>
+      <p:pic>
+        <p:nvPicPr>
+          <p:cNvPr id="7" name="Picture 6"/>
+          <p:cNvPicPr>
+            <a:picLocks noChangeAspect="1"/>
+          </p:cNvPicPr>
+          <p:nvPr/>
+        </p:nvPicPr>
+        <p:blipFill>
+          <a:blip r:embed="rId2"/>
+          <a:stretch>
+            <a:fillRect/>
+          </a:stretch>
+        </p:blipFill>
+        <p:spPr>
+          <a:xfrm>
+            <a:off x="380172" y="2954486"/>
+            <a:ext cx="4212472" cy="2190222"/>
+          </a:xfrm>
+          <a:prstGeom prst="rect">
+            <a:avLst/>
+          </a:prstGeom>
+        </p:spPr>
+      </p:pic>
+      <p:pic>
+        <p:nvPicPr>
+          <p:cNvPr id="8" name="Picture 7"/>
+          <p:cNvPicPr>
+            <a:picLocks noChangeAspect="1"/>
+          </p:cNvPicPr>
+          <p:nvPr/>
+        </p:nvPicPr>
+        <p:blipFill>
+          <a:blip r:embed="rId3"/>
+          <a:stretch>
+            <a:fillRect/>
+          </a:stretch>
+        </p:blipFill>
+        <p:spPr>
+          <a:xfrm>
+            <a:off x="4720317" y="3604904"/>
+            <a:ext cx="4107539" cy="2440758"/>
+          </a:xfrm>
+          <a:prstGeom prst="rect">
+            <a:avLst/>
+          </a:prstGeom>
+        </p:spPr>
+      </p:pic>
+      <p:pic>
+        <p:nvPicPr>
+          <p:cNvPr id="9" name="Picture 8"/>
+          <p:cNvPicPr>
+            <a:picLocks noChangeAspect="1"/>
+          </p:cNvPicPr>
+          <p:nvPr/>
+        </p:nvPicPr>
+        <p:blipFill>
+          <a:blip r:embed="rId4"/>
+          <a:stretch>
+            <a:fillRect/>
+          </a:stretch>
+        </p:blipFill>
+        <p:spPr>
+          <a:xfrm>
+            <a:off x="7532642" y="2295681"/>
+            <a:ext cx="3814513" cy="2266638"/>
+          </a:xfrm>
+          <a:prstGeom prst="rect">
+            <a:avLst/>
+          </a:prstGeom>
+        </p:spPr>
+      </p:pic>
+      <p:pic>
+        <p:nvPicPr>
+          <p:cNvPr id="10" name="Picture 9"/>
+          <p:cNvPicPr>
+            <a:picLocks noChangeAspect="1"/>
+          </p:cNvPicPr>
+          <p:nvPr/>
+        </p:nvPicPr>
+        <p:blipFill>
+          <a:blip r:embed="rId5"/>
+          <a:stretch>
+            <a:fillRect/>
+          </a:stretch>
+        </p:blipFill>
+        <p:spPr>
+          <a:xfrm>
+            <a:off x="359468" y="4176065"/>
+            <a:ext cx="3495365" cy="1811905"/>
+          </a:xfrm>
+          <a:prstGeom prst="rect">
+            <a:avLst/>
+          </a:prstGeom>
+        </p:spPr>
+      </p:pic>
+    </p:spTree>
+    <p:extLst>
+      <p:ext uri="{BB962C8B-B14F-4D97-AF65-F5344CB8AC3E}">
+        <p14:creationId xmlns:p14="http://schemas.microsoft.com/office/powerpoint/2010/main" val="3119211585"/>
+      </p:ext>
+    </p:extLst>
+  </p:cSld>
+  <p:clrMapOvr>
+    <a:masterClrMapping/>
+  </p:clrMapOvr>
+</p:sld>
+</file>
+
+<file path=ppt/slides/slide7.xml><?xml version="1.0" encoding="utf-8"?>
+<p:sld xmlns:a="http://schemas.openxmlformats.org/drawingml/2006/main" xmlns:r="http://schemas.openxmlformats.org/officeDocument/2006/relationships" xmlns:p="http://schemas.openxmlformats.org/presentationml/2006/main">
+  <p:cSld>
+    <p:spTree>
+      <p:nvGrpSpPr>
+        <p:cNvPr id="1" name=""/>
+        <p:cNvGrpSpPr/>
+        <p:nvPr/>
+      </p:nvGrpSpPr>
+      <p:grpSpPr>
+        <a:xfrm>
+          <a:off x="0" y="0"/>
+          <a:ext cx="0" cy="0"/>
+          <a:chOff x="0" y="0"/>
+          <a:chExt cx="0" cy="0"/>
+        </a:xfrm>
+      </p:grpSpPr>
+      <p:sp>
+        <p:nvSpPr>
+          <p:cNvPr id="2" name="Title 1"/>
+          <p:cNvSpPr>
+            <a:spLocks noGrp="1"/>
+          </p:cNvSpPr>
+          <p:nvPr>
+            <p:ph type="title"/>
+          </p:nvPr>
+        </p:nvSpPr>
+        <p:spPr/>
+        <p:txBody>
+          <a:bodyPr/>
+          <a:lstStyle/>
+          <a:p>
+            <a:r>
+              <a:rPr lang="de-DE" dirty="0" smtClean="0"/>
+              <a:t>Website</a:t>
+            </a:r>
+            <a:endParaRPr lang="en-US" dirty="0"/>
+          </a:p>
+        </p:txBody>
+      </p:sp>
+      <p:sp>
+        <p:nvSpPr>
+          <p:cNvPr id="3" name="Content Placeholder 2"/>
+          <p:cNvSpPr>
+            <a:spLocks noGrp="1"/>
+          </p:cNvSpPr>
+          <p:nvPr>
+            <p:ph idx="1"/>
+          </p:nvPr>
+        </p:nvSpPr>
+        <p:spPr/>
+        <p:txBody>
+          <a:bodyPr/>
+          <a:lstStyle/>
+          <a:p>
+            <a:r>
+              <a:rPr lang="en-US" dirty="0"/>
+              <a:t>http://bambugms.github.io/Industry-Analysis-Report/</a:t>
+            </a:r>
+          </a:p>
+        </p:txBody>
+      </p:sp>
+      <p:sp>
+        <p:nvSpPr>
+          <p:cNvPr id="4" name="Footer Placeholder 3"/>
+          <p:cNvSpPr>
+            <a:spLocks noGrp="1"/>
+          </p:cNvSpPr>
+          <p:nvPr>
+            <p:ph type="ftr" sz="quarter" idx="11"/>
+          </p:nvPr>
+        </p:nvSpPr>
+        <p:spPr/>
+        <p:txBody>
+          <a:bodyPr/>
+          <a:lstStyle/>
+          <a:p>
+            <a:r>
+              <a:rPr lang="fr-FR" smtClean="0"/>
+              <a:t>Bambu - 17.06.2015</a:t>
+            </a:r>
+            <a:endParaRPr lang="fr-FR"/>
+          </a:p>
+        </p:txBody>
+      </p:sp>
+      <p:sp>
+        <p:nvSpPr>
+          <p:cNvPr id="5" name="Slide Number Placeholder 4"/>
+          <p:cNvSpPr>
+            <a:spLocks noGrp="1"/>
+          </p:cNvSpPr>
+          <p:nvPr>
+            <p:ph type="sldNum" sz="quarter" idx="12"/>
+          </p:nvPr>
+        </p:nvSpPr>
+        <p:spPr/>
+        <p:txBody>
+          <a:bodyPr/>
+          <a:lstStyle/>
+          <a:p>
+            <a:fld id="{D376626B-8044-4126-A03C-8C0AE257EC41}" type="slidenum">
+              <a:rPr lang="fr-FR" smtClean="0"/>
+              <a:t>7</a:t>
+            </a:fld>
+            <a:endParaRPr lang="fr-FR"/>
+          </a:p>
+        </p:txBody>
+      </p:sp>
+      <p:pic>
+        <p:nvPicPr>
+          <p:cNvPr id="6" name="Picture 5"/>
+          <p:cNvPicPr>
+            <a:picLocks noChangeAspect="1"/>
+          </p:cNvPicPr>
+          <p:nvPr/>
+        </p:nvPicPr>
+        <p:blipFill>
+          <a:blip r:embed="rId2"/>
+          <a:stretch>
+            <a:fillRect/>
+          </a:stretch>
+        </p:blipFill>
+        <p:spPr>
+          <a:xfrm>
+            <a:off x="2830286" y="2359859"/>
+            <a:ext cx="7339466" cy="3804586"/>
+          </a:xfrm>
+          <a:prstGeom prst="rect">
+            <a:avLst/>
+          </a:prstGeom>
+        </p:spPr>
+      </p:pic>
+    </p:spTree>
+    <p:extLst>
+      <p:ext uri="{BB962C8B-B14F-4D97-AF65-F5344CB8AC3E}">
+        <p14:creationId xmlns:p14="http://schemas.microsoft.com/office/powerpoint/2010/main" val="2326599382"/>
+      </p:ext>
+    </p:extLst>
+  </p:cSld>
+  <p:clrMapOvr>
+    <a:masterClrMapping/>
+  </p:clrMapOvr>
+</p:sld>
+</file>
+
+<file path=ppt/slides/slide8.xml><?xml version="1.0" encoding="utf-8"?>
+<p:sld xmlns:a="http://schemas.openxmlformats.org/drawingml/2006/main" xmlns:r="http://schemas.openxmlformats.org/officeDocument/2006/relationships" xmlns:p="http://schemas.openxmlformats.org/presentationml/2006/main">
+  <p:cSld>
+    <p:spTree>
+      <p:nvGrpSpPr>
+        <p:cNvPr id="1" name=""/>
+        <p:cNvGrpSpPr/>
+        <p:nvPr/>
+      </p:nvGrpSpPr>
+      <p:grpSpPr>
+        <a:xfrm>
+          <a:off x="0" y="0"/>
+          <a:ext cx="0" cy="0"/>
+          <a:chOff x="0" y="0"/>
+          <a:chExt cx="0" cy="0"/>
+        </a:xfrm>
+      </p:grpSpPr>
+      <p:sp>
+        <p:nvSpPr>
+          <p:cNvPr id="2" name="Titre 1"/>
+          <p:cNvSpPr>
+            <a:spLocks noGrp="1"/>
+          </p:cNvSpPr>
+          <p:nvPr>
+            <p:ph type="title"/>
+          </p:nvPr>
+        </p:nvSpPr>
+        <p:spPr/>
+        <p:txBody>
+          <a:bodyPr/>
+          <a:lstStyle/>
+          <a:p>
+            <a:r>
               <a:rPr lang="fr-FR" dirty="0" smtClean="0"/>
               <a:t>WORK PROCESS</a:t>
             </a:r>
@@ -13622,9 +14092,9 @@
           <a:p>
             <a:r>
               <a:rPr lang="fr-FR" smtClean="0"/>
-              <a:t>Banmbu - 20/05/2015</a:t>
-            </a:r>
-            <a:endParaRPr lang="fr-FR"/>
+              <a:t>Bambu - 17.06.2015</a:t>
+            </a:r>
+            <a:endParaRPr lang="fr-FR" dirty="0"/>
           </a:p>
         </p:txBody>
       </p:sp>
@@ -13645,7 +14115,7 @@
           <a:p>
             <a:fld id="{D376626B-8044-4126-A03C-8C0AE257EC41}" type="slidenum">
               <a:rPr lang="fr-FR" smtClean="0"/>
-              <a:t>6</a:t>
+              <a:t>8</a:t>
             </a:fld>
             <a:endParaRPr lang="fr-FR"/>
           </a:p>
@@ -13737,113 +14207,34 @@
           </a:p>
         </p:txBody>
       </p:sp>
-    </p:spTree>
-    <p:extLst>
-      <p:ext uri="{BB962C8B-B14F-4D97-AF65-F5344CB8AC3E}">
-        <p14:creationId xmlns:p14="http://schemas.microsoft.com/office/powerpoint/2010/main" val="2466803531"/>
-      </p:ext>
-    </p:extLst>
-  </p:cSld>
-  <p:clrMapOvr>
-    <a:masterClrMapping/>
-  </p:clrMapOvr>
-</p:sld>
-</file>
-
-<file path=ppt/slides/slide7.xml><?xml version="1.0" encoding="utf-8"?>
-<p:sld xmlns:a="http://schemas.openxmlformats.org/drawingml/2006/main" xmlns:r="http://schemas.openxmlformats.org/officeDocument/2006/relationships" xmlns:p="http://schemas.openxmlformats.org/presentationml/2006/main">
-  <p:cSld>
-    <p:spTree>
-      <p:nvGrpSpPr>
-        <p:cNvPr id="1" name=""/>
-        <p:cNvGrpSpPr/>
-        <p:nvPr/>
-      </p:nvGrpSpPr>
-      <p:grpSpPr>
-        <a:xfrm>
-          <a:off x="0" y="0"/>
-          <a:ext cx="0" cy="0"/>
-          <a:chOff x="0" y="0"/>
-          <a:chExt cx="0" cy="0"/>
-        </a:xfrm>
-      </p:grpSpPr>
       <p:sp>
         <p:nvSpPr>
-          <p:cNvPr id="2" name="Title 1"/>
-          <p:cNvSpPr>
-            <a:spLocks noGrp="1"/>
-          </p:cNvSpPr>
-          <p:nvPr>
-            <p:ph type="ctrTitle"/>
-          </p:nvPr>
-        </p:nvSpPr>
-        <p:spPr/>
-        <p:txBody>
-          <a:bodyPr>
-            <a:normAutofit/>
-          </a:bodyPr>
-          <a:lstStyle/>
-          <a:p>
-            <a:pPr algn="ctr"/>
-            <a:r>
-              <a:rPr lang="en-US" sz="6000" i="1" dirty="0" smtClean="0"/>
-              <a:t>THANK YOU FOR YOUR ATTENTION!</a:t>
-            </a:r>
-            <a:endParaRPr lang="en-US" sz="6000" i="1" dirty="0"/>
-          </a:p>
-        </p:txBody>
-      </p:sp>
-      <p:sp>
-        <p:nvSpPr>
-          <p:cNvPr id="3" name="Subtitle 2"/>
-          <p:cNvSpPr>
-            <a:spLocks noGrp="1"/>
-          </p:cNvSpPr>
-          <p:nvPr>
-            <p:ph type="subTitle" idx="1"/>
-          </p:nvPr>
-        </p:nvSpPr>
-        <p:spPr/>
-        <p:txBody>
-          <a:bodyPr/>
-          <a:lstStyle/>
-          <a:p>
-            <a:pPr algn="ctr"/>
-            <a:r>
-              <a:rPr lang="en-US" dirty="0" smtClean="0"/>
-              <a:t>Feel free to ask questions if you have some.</a:t>
-            </a:r>
-            <a:endParaRPr lang="en-US" dirty="0"/>
-          </a:p>
-        </p:txBody>
-      </p:sp>
-      <p:sp>
-        <p:nvSpPr>
-          <p:cNvPr id="4" name="Rectangle 3"/>
-          <p:cNvSpPr>
-            <a:spLocks noChangeAspect="1"/>
-          </p:cNvSpPr>
+          <p:cNvPr id="7" name="Line Callout 3 (Accent Bar) 6"/>
+          <p:cNvSpPr/>
           <p:nvPr/>
         </p:nvSpPr>
         <p:spPr>
           <a:xfrm>
-            <a:off x="1407474" y="-288109"/>
-            <a:ext cx="9601301" cy="4778518"/>
+            <a:off x="1019331" y="1882203"/>
+            <a:ext cx="1678899" cy="998919"/>
           </a:xfrm>
-          <a:prstGeom prst="rect">
-            <a:avLst/>
+          <a:prstGeom prst="accentCallout3">
+            <a:avLst>
+              <a:gd name="adj1" fmla="val 18750"/>
+              <a:gd name="adj2" fmla="val -8333"/>
+              <a:gd name="adj3" fmla="val 18750"/>
+              <a:gd name="adj4" fmla="val -16667"/>
+              <a:gd name="adj5" fmla="val 100000"/>
+              <a:gd name="adj6" fmla="val -16667"/>
+              <a:gd name="adj7" fmla="val 216543"/>
+              <a:gd name="adj8" fmla="val 36838"/>
+            </a:avLst>
           </a:prstGeom>
-          <a:blipFill dpi="0" rotWithShape="1">
-            <a:blip r:embed="rId2">
-              <a:alphaModFix amt="5000"/>
-            </a:blip>
-            <a:srcRect/>
-            <a:stretch>
-              <a:fillRect/>
-            </a:stretch>
-          </a:blipFill>
+          <a:noFill/>
           <a:ln>
-            <a:noFill/>
+            <a:solidFill>
+              <a:schemeClr val="accent2"/>
+            </a:solidFill>
           </a:ln>
         </p:spPr>
         <p:style>
@@ -13867,7 +14258,767 @@
           <a:lstStyle/>
           <a:p>
             <a:pPr algn="ctr"/>
-            <a:endParaRPr lang="de-DE"/>
+            <a:r>
+              <a:rPr lang="de-DE" dirty="0" smtClean="0">
+                <a:solidFill>
+                  <a:sysClr val="windowText" lastClr="000000"/>
+                </a:solidFill>
+              </a:rPr>
+              <a:t>First </a:t>
+            </a:r>
+            <a:r>
+              <a:rPr lang="de-DE" dirty="0" err="1" smtClean="0">
+                <a:solidFill>
+                  <a:sysClr val="windowText" lastClr="000000"/>
+                </a:solidFill>
+              </a:rPr>
+              <a:t>class</a:t>
+            </a:r>
+            <a:r>
+              <a:rPr lang="de-DE" dirty="0" smtClean="0">
+                <a:solidFill>
+                  <a:sysClr val="windowText" lastClr="000000"/>
+                </a:solidFill>
+              </a:rPr>
+              <a:t>, </a:t>
+            </a:r>
+            <a:r>
+              <a:rPr lang="de-DE" dirty="0" err="1" smtClean="0">
+                <a:solidFill>
+                  <a:sysClr val="windowText" lastClr="000000"/>
+                </a:solidFill>
+              </a:rPr>
+              <a:t>group</a:t>
+            </a:r>
+            <a:r>
+              <a:rPr lang="de-DE" dirty="0" smtClean="0">
+                <a:solidFill>
+                  <a:sysClr val="windowText" lastClr="000000"/>
+                </a:solidFill>
+              </a:rPr>
+              <a:t> </a:t>
+            </a:r>
+            <a:r>
+              <a:rPr lang="de-DE" dirty="0" err="1" smtClean="0">
+                <a:solidFill>
+                  <a:sysClr val="windowText" lastClr="000000"/>
+                </a:solidFill>
+              </a:rPr>
+              <a:t>building</a:t>
+            </a:r>
+            <a:r>
+              <a:rPr lang="de-DE" dirty="0" smtClean="0">
+                <a:solidFill>
+                  <a:sysClr val="windowText" lastClr="000000"/>
+                </a:solidFill>
+              </a:rPr>
+              <a:t>, Kick off,</a:t>
+            </a:r>
+          </a:p>
+          <a:p>
+            <a:pPr algn="ctr"/>
+            <a:r>
+              <a:rPr lang="de-DE" dirty="0" err="1" smtClean="0">
+                <a:solidFill>
+                  <a:sysClr val="windowText" lastClr="000000"/>
+                </a:solidFill>
+              </a:rPr>
+              <a:t>Finding</a:t>
+            </a:r>
+            <a:r>
+              <a:rPr lang="de-DE" dirty="0" smtClean="0">
+                <a:solidFill>
+                  <a:sysClr val="windowText" lastClr="000000"/>
+                </a:solidFill>
+              </a:rPr>
+              <a:t> a </a:t>
+            </a:r>
+            <a:r>
+              <a:rPr lang="de-DE" dirty="0" err="1" smtClean="0">
+                <a:solidFill>
+                  <a:sysClr val="windowText" lastClr="000000"/>
+                </a:solidFill>
+              </a:rPr>
+              <a:t>topic</a:t>
+            </a:r>
+            <a:endParaRPr lang="en-US" dirty="0">
+              <a:solidFill>
+                <a:sysClr val="windowText" lastClr="000000"/>
+              </a:solidFill>
+            </a:endParaRPr>
+          </a:p>
+        </p:txBody>
+      </p:sp>
+      <p:sp>
+        <p:nvSpPr>
+          <p:cNvPr id="8" name="Line Callout 3 (Accent Bar) 7"/>
+          <p:cNvSpPr/>
+          <p:nvPr/>
+        </p:nvSpPr>
+        <p:spPr>
+          <a:xfrm>
+            <a:off x="3639842" y="1882203"/>
+            <a:ext cx="1678899" cy="998919"/>
+          </a:xfrm>
+          <a:prstGeom prst="accentCallout3">
+            <a:avLst>
+              <a:gd name="adj1" fmla="val 18750"/>
+              <a:gd name="adj2" fmla="val -8333"/>
+              <a:gd name="adj3" fmla="val 18750"/>
+              <a:gd name="adj4" fmla="val -16667"/>
+              <a:gd name="adj5" fmla="val 100000"/>
+              <a:gd name="adj6" fmla="val -16667"/>
+              <a:gd name="adj7" fmla="val 225213"/>
+              <a:gd name="adj8" fmla="val -65726"/>
+            </a:avLst>
+          </a:prstGeom>
+          <a:noFill/>
+          <a:ln>
+            <a:solidFill>
+              <a:schemeClr val="accent2"/>
+            </a:solidFill>
+          </a:ln>
+        </p:spPr>
+        <p:style>
+          <a:lnRef idx="2">
+            <a:schemeClr val="accent1">
+              <a:shade val="50000"/>
+            </a:schemeClr>
+          </a:lnRef>
+          <a:fillRef idx="1">
+            <a:schemeClr val="accent1"/>
+          </a:fillRef>
+          <a:effectRef idx="0">
+            <a:schemeClr val="accent1"/>
+          </a:effectRef>
+          <a:fontRef idx="minor">
+            <a:schemeClr val="lt1"/>
+          </a:fontRef>
+        </p:style>
+        <p:txBody>
+          <a:bodyPr rtlCol="0" anchor="ctr"/>
+          <a:lstStyle/>
+          <a:p>
+            <a:pPr algn="ctr"/>
+            <a:r>
+              <a:rPr lang="de-DE" dirty="0" err="1" smtClean="0">
+                <a:solidFill>
+                  <a:sysClr val="windowText" lastClr="000000"/>
+                </a:solidFill>
+              </a:rPr>
+              <a:t>Assigned</a:t>
+            </a:r>
+            <a:r>
+              <a:rPr lang="de-DE" dirty="0" smtClean="0">
+                <a:solidFill>
+                  <a:sysClr val="windowText" lastClr="000000"/>
+                </a:solidFill>
+              </a:rPr>
+              <a:t> a </a:t>
+            </a:r>
+            <a:r>
+              <a:rPr lang="de-DE" dirty="0" err="1" smtClean="0">
+                <a:solidFill>
+                  <a:sysClr val="windowText" lastClr="000000"/>
+                </a:solidFill>
+              </a:rPr>
+              <a:t>new</a:t>
+            </a:r>
+            <a:r>
+              <a:rPr lang="de-DE" dirty="0" smtClean="0">
+                <a:solidFill>
+                  <a:sysClr val="windowText" lastClr="000000"/>
+                </a:solidFill>
+              </a:rPr>
+              <a:t> </a:t>
+            </a:r>
+            <a:r>
+              <a:rPr lang="de-DE" dirty="0" err="1" smtClean="0">
+                <a:solidFill>
+                  <a:sysClr val="windowText" lastClr="000000"/>
+                </a:solidFill>
+              </a:rPr>
+              <a:t>teammember</a:t>
+            </a:r>
+            <a:endParaRPr lang="en-US" dirty="0">
+              <a:solidFill>
+                <a:sysClr val="windowText" lastClr="000000"/>
+              </a:solidFill>
+            </a:endParaRPr>
+          </a:p>
+        </p:txBody>
+      </p:sp>
+      <p:sp>
+        <p:nvSpPr>
+          <p:cNvPr id="9" name="Line Callout 3 (Accent Bar) 8"/>
+          <p:cNvSpPr/>
+          <p:nvPr/>
+        </p:nvSpPr>
+        <p:spPr>
+          <a:xfrm>
+            <a:off x="9061015" y="1787367"/>
+            <a:ext cx="1678899" cy="998919"/>
+          </a:xfrm>
+          <a:prstGeom prst="accentCallout3">
+            <a:avLst>
+              <a:gd name="adj1" fmla="val 18750"/>
+              <a:gd name="adj2" fmla="val -8333"/>
+              <a:gd name="adj3" fmla="val 18750"/>
+              <a:gd name="adj4" fmla="val -16667"/>
+              <a:gd name="adj5" fmla="val 100000"/>
+              <a:gd name="adj6" fmla="val -16667"/>
+              <a:gd name="adj7" fmla="val 226761"/>
+              <a:gd name="adj8" fmla="val -16847"/>
+            </a:avLst>
+          </a:prstGeom>
+          <a:noFill/>
+          <a:ln>
+            <a:solidFill>
+              <a:schemeClr val="accent2"/>
+            </a:solidFill>
+          </a:ln>
+        </p:spPr>
+        <p:style>
+          <a:lnRef idx="2">
+            <a:schemeClr val="accent1">
+              <a:shade val="50000"/>
+            </a:schemeClr>
+          </a:lnRef>
+          <a:fillRef idx="1">
+            <a:schemeClr val="accent1"/>
+          </a:fillRef>
+          <a:effectRef idx="0">
+            <a:schemeClr val="accent1"/>
+          </a:effectRef>
+          <a:fontRef idx="minor">
+            <a:schemeClr val="lt1"/>
+          </a:fontRef>
+        </p:style>
+        <p:txBody>
+          <a:bodyPr rtlCol="0" anchor="ctr"/>
+          <a:lstStyle/>
+          <a:p>
+            <a:pPr algn="ctr"/>
+            <a:r>
+              <a:rPr lang="de-DE" dirty="0" err="1" smtClean="0">
+                <a:solidFill>
+                  <a:sysClr val="windowText" lastClr="000000"/>
+                </a:solidFill>
+              </a:rPr>
+              <a:t>Assigned</a:t>
+            </a:r>
+            <a:r>
+              <a:rPr lang="de-DE" dirty="0" smtClean="0">
+                <a:solidFill>
+                  <a:sysClr val="windowText" lastClr="000000"/>
+                </a:solidFill>
+              </a:rPr>
+              <a:t> </a:t>
+            </a:r>
+            <a:r>
+              <a:rPr lang="de-DE" dirty="0" err="1" smtClean="0">
+                <a:solidFill>
+                  <a:sysClr val="windowText" lastClr="000000"/>
+                </a:solidFill>
+              </a:rPr>
+              <a:t>teammember</a:t>
+            </a:r>
+            <a:r>
+              <a:rPr lang="de-DE" dirty="0" smtClean="0">
+                <a:solidFill>
+                  <a:sysClr val="windowText" lastClr="000000"/>
+                </a:solidFill>
+              </a:rPr>
+              <a:t> </a:t>
+            </a:r>
+            <a:r>
+              <a:rPr lang="de-DE" dirty="0" err="1" smtClean="0">
+                <a:solidFill>
+                  <a:sysClr val="windowText" lastClr="000000"/>
+                </a:solidFill>
+              </a:rPr>
+              <a:t>drops</a:t>
+            </a:r>
+            <a:r>
+              <a:rPr lang="de-DE" dirty="0" smtClean="0">
+                <a:solidFill>
+                  <a:sysClr val="windowText" lastClr="000000"/>
+                </a:solidFill>
+              </a:rPr>
+              <a:t> </a:t>
+            </a:r>
+            <a:r>
+              <a:rPr lang="de-DE" dirty="0" err="1" smtClean="0">
+                <a:solidFill>
+                  <a:sysClr val="windowText" lastClr="000000"/>
+                </a:solidFill>
+              </a:rPr>
+              <a:t>class</a:t>
+            </a:r>
+            <a:endParaRPr lang="en-US" dirty="0">
+              <a:solidFill>
+                <a:sysClr val="windowText" lastClr="000000"/>
+              </a:solidFill>
+            </a:endParaRPr>
+          </a:p>
+        </p:txBody>
+      </p:sp>
+      <p:sp>
+        <p:nvSpPr>
+          <p:cNvPr id="10" name="Line Callout 3 (Accent Bar) 9"/>
+          <p:cNvSpPr/>
+          <p:nvPr/>
+        </p:nvSpPr>
+        <p:spPr>
+          <a:xfrm>
+            <a:off x="4581455" y="5203460"/>
+            <a:ext cx="1678899" cy="998919"/>
+          </a:xfrm>
+          <a:prstGeom prst="accentCallout3">
+            <a:avLst>
+              <a:gd name="adj1" fmla="val 18750"/>
+              <a:gd name="adj2" fmla="val -8333"/>
+              <a:gd name="adj3" fmla="val 18750"/>
+              <a:gd name="adj4" fmla="val -16667"/>
+              <a:gd name="adj5" fmla="val -48564"/>
+              <a:gd name="adj6" fmla="val -16667"/>
+              <a:gd name="adj7" fmla="val -146613"/>
+              <a:gd name="adj8" fmla="val 38623"/>
+            </a:avLst>
+          </a:prstGeom>
+          <a:noFill/>
+          <a:ln>
+            <a:solidFill>
+              <a:schemeClr val="accent2"/>
+            </a:solidFill>
+          </a:ln>
+        </p:spPr>
+        <p:style>
+          <a:lnRef idx="2">
+            <a:schemeClr val="accent1">
+              <a:shade val="50000"/>
+            </a:schemeClr>
+          </a:lnRef>
+          <a:fillRef idx="1">
+            <a:schemeClr val="accent1"/>
+          </a:fillRef>
+          <a:effectRef idx="0">
+            <a:schemeClr val="accent1"/>
+          </a:effectRef>
+          <a:fontRef idx="minor">
+            <a:schemeClr val="lt1"/>
+          </a:fontRef>
+        </p:style>
+        <p:txBody>
+          <a:bodyPr rtlCol="0" anchor="ctr"/>
+          <a:lstStyle/>
+          <a:p>
+            <a:pPr algn="ctr"/>
+            <a:r>
+              <a:rPr lang="de-DE" dirty="0" smtClean="0">
+                <a:solidFill>
+                  <a:sysClr val="windowText" lastClr="000000"/>
+                </a:solidFill>
+              </a:rPr>
+              <a:t>First internal </a:t>
+            </a:r>
+            <a:r>
+              <a:rPr lang="de-DE" dirty="0" err="1" smtClean="0">
+                <a:solidFill>
+                  <a:sysClr val="windowText" lastClr="000000"/>
+                </a:solidFill>
+              </a:rPr>
+              <a:t>deadline</a:t>
+            </a:r>
+            <a:r>
+              <a:rPr lang="de-DE" dirty="0" smtClean="0">
+                <a:solidFill>
+                  <a:sysClr val="windowText" lastClr="000000"/>
+                </a:solidFill>
+              </a:rPr>
+              <a:t> „</a:t>
+            </a:r>
+            <a:r>
+              <a:rPr lang="de-DE" dirty="0" err="1" smtClean="0">
+                <a:solidFill>
+                  <a:sysClr val="windowText" lastClr="000000"/>
+                </a:solidFill>
+              </a:rPr>
+              <a:t>data</a:t>
+            </a:r>
+            <a:r>
+              <a:rPr lang="de-DE" dirty="0" smtClean="0">
+                <a:solidFill>
+                  <a:sysClr val="windowText" lastClr="000000"/>
+                </a:solidFill>
+              </a:rPr>
+              <a:t> </a:t>
+            </a:r>
+            <a:r>
+              <a:rPr lang="de-DE" dirty="0" err="1" smtClean="0">
+                <a:solidFill>
+                  <a:sysClr val="windowText" lastClr="000000"/>
+                </a:solidFill>
+              </a:rPr>
+              <a:t>research</a:t>
+            </a:r>
+            <a:endParaRPr lang="en-US" dirty="0">
+              <a:solidFill>
+                <a:sysClr val="windowText" lastClr="000000"/>
+              </a:solidFill>
+            </a:endParaRPr>
+          </a:p>
+        </p:txBody>
+      </p:sp>
+      <p:sp>
+        <p:nvSpPr>
+          <p:cNvPr id="11" name="Line Callout 3 (Accent Bar) 10"/>
+          <p:cNvSpPr/>
+          <p:nvPr/>
+        </p:nvSpPr>
+        <p:spPr>
+          <a:xfrm>
+            <a:off x="6260354" y="1882203"/>
+            <a:ext cx="1678899" cy="998919"/>
+          </a:xfrm>
+          <a:prstGeom prst="accentCallout3">
+            <a:avLst>
+              <a:gd name="adj1" fmla="val 18750"/>
+              <a:gd name="adj2" fmla="val -8333"/>
+              <a:gd name="adj3" fmla="val 18750"/>
+              <a:gd name="adj4" fmla="val -16667"/>
+              <a:gd name="adj5" fmla="val 100000"/>
+              <a:gd name="adj6" fmla="val -16667"/>
+              <a:gd name="adj7" fmla="val 245055"/>
+              <a:gd name="adj8" fmla="val 3802"/>
+            </a:avLst>
+          </a:prstGeom>
+          <a:noFill/>
+          <a:ln>
+            <a:solidFill>
+              <a:schemeClr val="accent2"/>
+            </a:solidFill>
+          </a:ln>
+        </p:spPr>
+        <p:style>
+          <a:lnRef idx="2">
+            <a:schemeClr val="accent1">
+              <a:shade val="50000"/>
+            </a:schemeClr>
+          </a:lnRef>
+          <a:fillRef idx="1">
+            <a:schemeClr val="accent1"/>
+          </a:fillRef>
+          <a:effectRef idx="0">
+            <a:schemeClr val="accent1"/>
+          </a:effectRef>
+          <a:fontRef idx="minor">
+            <a:schemeClr val="lt1"/>
+          </a:fontRef>
+        </p:style>
+        <p:txBody>
+          <a:bodyPr rtlCol="0" anchor="ctr"/>
+          <a:lstStyle/>
+          <a:p>
+            <a:pPr algn="ctr"/>
+            <a:r>
+              <a:rPr lang="de-DE" dirty="0" err="1" smtClean="0">
+                <a:solidFill>
+                  <a:sysClr val="windowText" lastClr="000000"/>
+                </a:solidFill>
+              </a:rPr>
+              <a:t>Midterms</a:t>
+            </a:r>
+            <a:r>
+              <a:rPr lang="de-DE" dirty="0" smtClean="0">
+                <a:solidFill>
+                  <a:sysClr val="windowText" lastClr="000000"/>
+                </a:solidFill>
+              </a:rPr>
+              <a:t> </a:t>
+            </a:r>
+            <a:r>
+              <a:rPr lang="de-DE" dirty="0" err="1" smtClean="0">
+                <a:solidFill>
+                  <a:sysClr val="windowText" lastClr="000000"/>
+                </a:solidFill>
+              </a:rPr>
+              <a:t>and</a:t>
+            </a:r>
+            <a:r>
+              <a:rPr lang="de-DE" dirty="0" smtClean="0">
+                <a:solidFill>
+                  <a:sysClr val="windowText" lastClr="000000"/>
+                </a:solidFill>
+              </a:rPr>
+              <a:t> May </a:t>
+            </a:r>
+            <a:r>
+              <a:rPr lang="de-DE" dirty="0" err="1" smtClean="0">
+                <a:solidFill>
+                  <a:sysClr val="windowText" lastClr="000000"/>
+                </a:solidFill>
+              </a:rPr>
+              <a:t>holiday</a:t>
+            </a:r>
+            <a:endParaRPr lang="en-US" dirty="0">
+              <a:solidFill>
+                <a:sysClr val="windowText" lastClr="000000"/>
+              </a:solidFill>
+            </a:endParaRPr>
+          </a:p>
+        </p:txBody>
+      </p:sp>
+      <p:sp>
+        <p:nvSpPr>
+          <p:cNvPr id="13" name="Line Callout 3 (Accent Bar) 12"/>
+          <p:cNvSpPr/>
+          <p:nvPr/>
+        </p:nvSpPr>
+        <p:spPr>
+          <a:xfrm flipH="1">
+            <a:off x="8631723" y="5203460"/>
+            <a:ext cx="1573541" cy="998919"/>
+          </a:xfrm>
+          <a:prstGeom prst="accentCallout3">
+            <a:avLst>
+              <a:gd name="adj1" fmla="val 18750"/>
+              <a:gd name="adj2" fmla="val -8333"/>
+              <a:gd name="adj3" fmla="val 18750"/>
+              <a:gd name="adj4" fmla="val -16667"/>
+              <a:gd name="adj5" fmla="val -48564"/>
+              <a:gd name="adj6" fmla="val -16667"/>
+              <a:gd name="adj7" fmla="val -91399"/>
+              <a:gd name="adj8" fmla="val -22977"/>
+            </a:avLst>
+          </a:prstGeom>
+          <a:noFill/>
+          <a:ln>
+            <a:solidFill>
+              <a:schemeClr val="accent2"/>
+            </a:solidFill>
+          </a:ln>
+        </p:spPr>
+        <p:style>
+          <a:lnRef idx="2">
+            <a:schemeClr val="accent1">
+              <a:shade val="50000"/>
+            </a:schemeClr>
+          </a:lnRef>
+          <a:fillRef idx="1">
+            <a:schemeClr val="accent1"/>
+          </a:fillRef>
+          <a:effectRef idx="0">
+            <a:schemeClr val="accent1"/>
+          </a:effectRef>
+          <a:fontRef idx="minor">
+            <a:schemeClr val="lt1"/>
+          </a:fontRef>
+        </p:style>
+        <p:txBody>
+          <a:bodyPr rtlCol="0" anchor="ctr"/>
+          <a:lstStyle/>
+          <a:p>
+            <a:pPr algn="ctr"/>
+            <a:r>
+              <a:rPr lang="de-DE" dirty="0" smtClean="0">
+                <a:solidFill>
+                  <a:sysClr val="windowText" lastClr="000000"/>
+                </a:solidFill>
+              </a:rPr>
+              <a:t>Final internal </a:t>
+            </a:r>
+            <a:r>
+              <a:rPr lang="de-DE" dirty="0" err="1" smtClean="0">
+                <a:solidFill>
+                  <a:sysClr val="windowText" lastClr="000000"/>
+                </a:solidFill>
+              </a:rPr>
+              <a:t>deadline</a:t>
+            </a:r>
+            <a:r>
+              <a:rPr lang="de-DE" dirty="0" smtClean="0">
+                <a:solidFill>
+                  <a:sysClr val="windowText" lastClr="000000"/>
+                </a:solidFill>
+              </a:rPr>
+              <a:t> </a:t>
+            </a:r>
+            <a:r>
+              <a:rPr lang="de-DE" dirty="0" err="1" smtClean="0">
+                <a:solidFill>
+                  <a:sysClr val="windowText" lastClr="000000"/>
+                </a:solidFill>
+              </a:rPr>
+              <a:t>for</a:t>
+            </a:r>
+            <a:r>
+              <a:rPr lang="de-DE" dirty="0" smtClean="0">
+                <a:solidFill>
+                  <a:sysClr val="windowText" lastClr="000000"/>
+                </a:solidFill>
+              </a:rPr>
+              <a:t> </a:t>
+            </a:r>
+            <a:r>
+              <a:rPr lang="de-DE" dirty="0" err="1" smtClean="0">
+                <a:solidFill>
+                  <a:sysClr val="windowText" lastClr="000000"/>
+                </a:solidFill>
+              </a:rPr>
+              <a:t>finishing</a:t>
+            </a:r>
+            <a:r>
+              <a:rPr lang="de-DE" dirty="0" smtClean="0">
+                <a:solidFill>
+                  <a:sysClr val="windowText" lastClr="000000"/>
+                </a:solidFill>
+              </a:rPr>
+              <a:t> </a:t>
+            </a:r>
+            <a:r>
+              <a:rPr lang="de-DE" dirty="0" err="1" smtClean="0">
+                <a:solidFill>
+                  <a:sysClr val="windowText" lastClr="000000"/>
+                </a:solidFill>
+              </a:rPr>
+              <a:t>the</a:t>
+            </a:r>
+            <a:r>
+              <a:rPr lang="de-DE" dirty="0" smtClean="0">
+                <a:solidFill>
+                  <a:sysClr val="windowText" lastClr="000000"/>
+                </a:solidFill>
+              </a:rPr>
+              <a:t> </a:t>
+            </a:r>
+            <a:r>
+              <a:rPr lang="de-DE" dirty="0" err="1" smtClean="0">
+                <a:solidFill>
+                  <a:sysClr val="windowText" lastClr="000000"/>
+                </a:solidFill>
+              </a:rPr>
+              <a:t>report</a:t>
+            </a:r>
+            <a:endParaRPr lang="de-DE" dirty="0" smtClean="0">
+              <a:solidFill>
+                <a:sysClr val="windowText" lastClr="000000"/>
+              </a:solidFill>
+            </a:endParaRPr>
+          </a:p>
+        </p:txBody>
+      </p:sp>
+    </p:spTree>
+    <p:extLst>
+      <p:ext uri="{BB962C8B-B14F-4D97-AF65-F5344CB8AC3E}">
+        <p14:creationId xmlns:p14="http://schemas.microsoft.com/office/powerpoint/2010/main" val="2466803531"/>
+      </p:ext>
+    </p:extLst>
+  </p:cSld>
+  <p:clrMapOvr>
+    <a:masterClrMapping/>
+  </p:clrMapOvr>
+</p:sld>
+</file>
+
+<file path=ppt/slides/slide9.xml><?xml version="1.0" encoding="utf-8"?>
+<p:sld xmlns:a="http://schemas.openxmlformats.org/drawingml/2006/main" xmlns:r="http://schemas.openxmlformats.org/officeDocument/2006/relationships" xmlns:p="http://schemas.openxmlformats.org/presentationml/2006/main">
+  <p:cSld>
+    <p:spTree>
+      <p:nvGrpSpPr>
+        <p:cNvPr id="1" name=""/>
+        <p:cNvGrpSpPr/>
+        <p:nvPr/>
+      </p:nvGrpSpPr>
+      <p:grpSpPr>
+        <a:xfrm>
+          <a:off x="0" y="0"/>
+          <a:ext cx="0" cy="0"/>
+          <a:chOff x="0" y="0"/>
+          <a:chExt cx="0" cy="0"/>
+        </a:xfrm>
+      </p:grpSpPr>
+      <p:pic>
+        <p:nvPicPr>
+          <p:cNvPr id="8" name="Picture 7"/>
+          <p:cNvPicPr>
+            <a:picLocks noChangeAspect="1"/>
+          </p:cNvPicPr>
+          <p:nvPr/>
+        </p:nvPicPr>
+        <p:blipFill>
+          <a:blip r:embed="rId3">
+            <a:extLst>
+              <a:ext uri="{28A0092B-C50C-407E-A947-70E740481C1C}">
+                <a14:useLocalDpi xmlns:a14="http://schemas.microsoft.com/office/drawing/2010/main" val="0"/>
+              </a:ext>
+            </a:extLst>
+          </a:blip>
+          <a:stretch>
+            <a:fillRect/>
+          </a:stretch>
+        </p:blipFill>
+        <p:spPr>
+          <a:xfrm>
+            <a:off x="1406434" y="47753"/>
+            <a:ext cx="9440091" cy="4537766"/>
+          </a:xfrm>
+          <a:prstGeom prst="rect">
+            <a:avLst/>
+          </a:prstGeom>
+        </p:spPr>
+      </p:pic>
+      <p:sp>
+        <p:nvSpPr>
+          <p:cNvPr id="2" name="Title 1"/>
+          <p:cNvSpPr>
+            <a:spLocks noGrp="1"/>
+          </p:cNvSpPr>
+          <p:nvPr>
+            <p:ph type="ctrTitle"/>
+          </p:nvPr>
+        </p:nvSpPr>
+        <p:spPr/>
+        <p:txBody>
+          <a:bodyPr>
+            <a:normAutofit/>
+          </a:bodyPr>
+          <a:lstStyle/>
+          <a:p>
+            <a:pPr algn="ctr"/>
+            <a:r>
+              <a:rPr lang="en-US" sz="6000" i="1" dirty="0" smtClean="0"/>
+              <a:t>THANK YOU FOR YOUR ATTENTION!</a:t>
+            </a:r>
+            <a:endParaRPr lang="en-US" sz="6000" i="1" dirty="0"/>
+          </a:p>
+        </p:txBody>
+      </p:sp>
+      <p:sp>
+        <p:nvSpPr>
+          <p:cNvPr id="3" name="Subtitle 2"/>
+          <p:cNvSpPr>
+            <a:spLocks noGrp="1"/>
+          </p:cNvSpPr>
+          <p:nvPr>
+            <p:ph type="subTitle" idx="1"/>
+          </p:nvPr>
+        </p:nvSpPr>
+        <p:spPr/>
+        <p:txBody>
+          <a:bodyPr/>
+          <a:lstStyle/>
+          <a:p>
+            <a:pPr algn="ctr"/>
+            <a:r>
+              <a:rPr lang="en-US" dirty="0" smtClean="0"/>
+              <a:t>Feel free to ask </a:t>
+            </a:r>
+            <a:r>
+              <a:rPr lang="en-US" dirty="0" err="1" smtClean="0"/>
+              <a:t>questionS</a:t>
+            </a:r>
+            <a:endParaRPr lang="en-US" dirty="0"/>
           </a:p>
         </p:txBody>
       </p:sp>
@@ -13887,12 +15038,8 @@
           <a:lstStyle/>
           <a:p>
             <a:r>
-              <a:rPr lang="fr-FR" dirty="0" err="1" smtClean="0"/>
-              <a:t>Bambu</a:t>
-            </a:r>
-            <a:r>
-              <a:rPr lang="fr-FR" dirty="0" smtClean="0"/>
-              <a:t> - 17/06/2015</a:t>
+              <a:rPr lang="fr-FR" smtClean="0"/>
+              <a:t>Bambu - 17.06.2015</a:t>
             </a:r>
             <a:endParaRPr lang="fr-FR" dirty="0"/>
           </a:p>
@@ -13916,7 +15063,7 @@
             <a:fld id="{D376626B-8044-4126-A03C-8C0AE257EC41}" type="slidenum">
               <a:rPr lang="fr-FR" smtClean="0"/>
               <a:pPr/>
-              <a:t>7</a:t>
+              <a:t>9</a:t>
             </a:fld>
             <a:endParaRPr lang="fr-FR" dirty="0"/>
           </a:p>

</xml_diff>